<commit_message>
update switch slides + adjust the code a bit
</commit_message>
<xml_diff>
--- a/slides/client/Switch.pptx
+++ b/slides/client/Switch.pptx
@@ -18,6 +18,8 @@
     <p:sldId id="263" r:id="rId15"/>
     <p:sldId id="264" r:id="rId16"/>
     <p:sldId id="265" r:id="rId17"/>
+    <p:sldId id="266" r:id="rId18"/>
+    <p:sldId id="267" r:id="rId19"/>
   </p:sldIdLst>
   <p:sldSz cx="24384000" cy="13716000"/>
   <p:notesSz cx="6858000" cy="9144000"/>
@@ -563,7 +565,7 @@
                 <a:latin typeface="+mn-lt"/>
                 <a:ea typeface="+mn-ea"/>
                 <a:cs typeface="+mn-cs"/>
-                <a:sym typeface="DIN Condensed"/>
+                <a:sym typeface="DIN Condensed Bold"/>
               </a:defRPr>
             </a:pPr>
           </a:p>
@@ -600,7 +602,7 @@
                 <a:latin typeface="+mn-lt"/>
                 <a:ea typeface="+mn-ea"/>
                 <a:cs typeface="+mn-cs"/>
-                <a:sym typeface="DIN Condensed"/>
+                <a:sym typeface="DIN Condensed Bold"/>
               </a:defRPr>
             </a:lvl1pPr>
           </a:lstStyle>
@@ -645,10 +647,10 @@
                 <a:solidFill>
                   <a:srgbClr val="A6AAA9"/>
                 </a:solidFill>
-                <a:latin typeface="DIN Alternate"/>
-                <a:ea typeface="DIN Alternate"/>
-                <a:cs typeface="DIN Alternate"/>
-                <a:sym typeface="DIN Alternate"/>
+                <a:latin typeface="DIN Alternate Bold"/>
+                <a:ea typeface="DIN Alternate Bold"/>
+                <a:cs typeface="DIN Alternate Bold"/>
+                <a:sym typeface="DIN Alternate Bold"/>
               </a:defRPr>
             </a:lvl1pPr>
             <a:lvl2pPr defTabSz="821531">
@@ -662,10 +664,10 @@
                 <a:solidFill>
                   <a:srgbClr val="A6AAA9"/>
                 </a:solidFill>
-                <a:latin typeface="DIN Alternate"/>
-                <a:ea typeface="DIN Alternate"/>
-                <a:cs typeface="DIN Alternate"/>
-                <a:sym typeface="DIN Alternate"/>
+                <a:latin typeface="DIN Alternate Bold"/>
+                <a:ea typeface="DIN Alternate Bold"/>
+                <a:cs typeface="DIN Alternate Bold"/>
+                <a:sym typeface="DIN Alternate Bold"/>
               </a:defRPr>
             </a:lvl2pPr>
             <a:lvl3pPr defTabSz="821531">
@@ -679,10 +681,10 @@
                 <a:solidFill>
                   <a:srgbClr val="A6AAA9"/>
                 </a:solidFill>
-                <a:latin typeface="DIN Alternate"/>
-                <a:ea typeface="DIN Alternate"/>
-                <a:cs typeface="DIN Alternate"/>
-                <a:sym typeface="DIN Alternate"/>
+                <a:latin typeface="DIN Alternate Bold"/>
+                <a:ea typeface="DIN Alternate Bold"/>
+                <a:cs typeface="DIN Alternate Bold"/>
+                <a:sym typeface="DIN Alternate Bold"/>
               </a:defRPr>
             </a:lvl3pPr>
             <a:lvl4pPr defTabSz="821531">
@@ -696,10 +698,10 @@
                 <a:solidFill>
                   <a:srgbClr val="A6AAA9"/>
                 </a:solidFill>
-                <a:latin typeface="DIN Alternate"/>
-                <a:ea typeface="DIN Alternate"/>
-                <a:cs typeface="DIN Alternate"/>
-                <a:sym typeface="DIN Alternate"/>
+                <a:latin typeface="DIN Alternate Bold"/>
+                <a:ea typeface="DIN Alternate Bold"/>
+                <a:cs typeface="DIN Alternate Bold"/>
+                <a:sym typeface="DIN Alternate Bold"/>
               </a:defRPr>
             </a:lvl4pPr>
             <a:lvl5pPr defTabSz="821531">
@@ -713,10 +715,10 @@
                 <a:solidFill>
                   <a:srgbClr val="A6AAA9"/>
                 </a:solidFill>
-                <a:latin typeface="DIN Alternate"/>
-                <a:ea typeface="DIN Alternate"/>
-                <a:cs typeface="DIN Alternate"/>
-                <a:sym typeface="DIN Alternate"/>
+                <a:latin typeface="DIN Alternate Bold"/>
+                <a:ea typeface="DIN Alternate Bold"/>
+                <a:cs typeface="DIN Alternate Bold"/>
+                <a:sym typeface="DIN Alternate Bold"/>
               </a:defRPr>
             </a:lvl5pPr>
           </a:lstStyle>
@@ -780,10 +782,10 @@
                 <a:solidFill>
                   <a:srgbClr val="838787"/>
                 </a:solidFill>
-                <a:latin typeface="DIN Alternate"/>
-                <a:ea typeface="DIN Alternate"/>
-                <a:cs typeface="DIN Alternate"/>
-                <a:sym typeface="DIN Alternate"/>
+                <a:latin typeface="DIN Alternate Bold"/>
+                <a:ea typeface="DIN Alternate Bold"/>
+                <a:cs typeface="DIN Alternate Bold"/>
+                <a:sym typeface="DIN Alternate Bold"/>
               </a:defRPr>
             </a:lvl1pPr>
           </a:lstStyle>
@@ -865,7 +867,7 @@
                 <a:latin typeface="+mn-lt"/>
                 <a:ea typeface="+mn-ea"/>
                 <a:cs typeface="+mn-cs"/>
-                <a:sym typeface="DIN Condensed"/>
+                <a:sym typeface="DIN Condensed Bold"/>
               </a:defRPr>
             </a:pPr>
           </a:p>
@@ -876,7 +878,7 @@
           <p:cNvPr id="108" name="Text"/>
           <p:cNvSpPr txBox="1"/>
           <p:nvPr>
-            <p:ph type="body" sz="quarter" idx="13"/>
+            <p:ph type="body" sz="quarter" idx="21"/>
           </p:nvPr>
         </p:nvSpPr>
         <p:spPr>
@@ -901,10 +903,10 @@
                 <a:solidFill>
                   <a:srgbClr val="838787"/>
                 </a:solidFill>
-                <a:latin typeface="DIN Alternate"/>
-                <a:ea typeface="DIN Alternate"/>
-                <a:cs typeface="DIN Alternate"/>
-                <a:sym typeface="DIN Alternate"/>
+                <a:latin typeface="DIN Alternate Bold"/>
+                <a:ea typeface="DIN Alternate Bold"/>
+                <a:cs typeface="DIN Alternate Bold"/>
+                <a:sym typeface="DIN Alternate Bold"/>
               </a:defRPr>
             </a:lvl1pPr>
           </a:lstStyle>
@@ -943,16 +945,16 @@
                 <a:schemeClr val="accent1"/>
               </a:buClr>
               <a:buSzPct val="104999"/>
-              <a:buFont typeface="Avenir Next"/>
+              <a:buFont typeface="Avenir Next Regular"/>
               <a:buChar char="▸"/>
               <a:defRPr sz="1500">
                 <a:solidFill>
                   <a:srgbClr val="FFFFFF"/>
                 </a:solidFill>
-                <a:latin typeface="Meslo LG M for Powerline"/>
-                <a:ea typeface="Meslo LG M for Powerline"/>
-                <a:cs typeface="Meslo LG M for Powerline"/>
-                <a:sym typeface="Meslo LG M for Powerline"/>
+                <a:latin typeface="Meslo LG M Regular for Powerline"/>
+                <a:ea typeface="Meslo LG M Regular for Powerline"/>
+                <a:cs typeface="Meslo LG M Regular for Powerline"/>
+                <a:sym typeface="Meslo LG M Regular for Powerline"/>
               </a:defRPr>
             </a:lvl1pPr>
             <a:lvl2pPr marL="640602" indent="-196102" algn="ctr" defTabSz="821531">
@@ -960,16 +962,16 @@
                 <a:schemeClr val="accent1"/>
               </a:buClr>
               <a:buSzPct val="104999"/>
-              <a:buFont typeface="Avenir Next"/>
+              <a:buFont typeface="Avenir Next Regular"/>
               <a:buChar char="▸"/>
               <a:defRPr sz="1500">
                 <a:solidFill>
                   <a:srgbClr val="FFFFFF"/>
                 </a:solidFill>
-                <a:latin typeface="Meslo LG M for Powerline"/>
-                <a:ea typeface="Meslo LG M for Powerline"/>
-                <a:cs typeface="Meslo LG M for Powerline"/>
-                <a:sym typeface="Meslo LG M for Powerline"/>
+                <a:latin typeface="Meslo LG M Regular for Powerline"/>
+                <a:ea typeface="Meslo LG M Regular for Powerline"/>
+                <a:cs typeface="Meslo LG M Regular for Powerline"/>
+                <a:sym typeface="Meslo LG M Regular for Powerline"/>
               </a:defRPr>
             </a:lvl2pPr>
             <a:lvl3pPr marL="1085102" indent="-196102" algn="ctr" defTabSz="821531">
@@ -977,16 +979,16 @@
                 <a:schemeClr val="accent1"/>
               </a:buClr>
               <a:buSzPct val="104999"/>
-              <a:buFont typeface="Avenir Next"/>
+              <a:buFont typeface="Avenir Next Regular"/>
               <a:buChar char="▸"/>
               <a:defRPr sz="1500">
                 <a:solidFill>
                   <a:srgbClr val="FFFFFF"/>
                 </a:solidFill>
-                <a:latin typeface="Meslo LG M for Powerline"/>
-                <a:ea typeface="Meslo LG M for Powerline"/>
-                <a:cs typeface="Meslo LG M for Powerline"/>
-                <a:sym typeface="Meslo LG M for Powerline"/>
+                <a:latin typeface="Meslo LG M Regular for Powerline"/>
+                <a:ea typeface="Meslo LG M Regular for Powerline"/>
+                <a:cs typeface="Meslo LG M Regular for Powerline"/>
+                <a:sym typeface="Meslo LG M Regular for Powerline"/>
               </a:defRPr>
             </a:lvl3pPr>
             <a:lvl4pPr marL="1529602" indent="-196102" algn="ctr" defTabSz="821531">
@@ -994,16 +996,16 @@
                 <a:schemeClr val="accent1"/>
               </a:buClr>
               <a:buSzPct val="104999"/>
-              <a:buFont typeface="Avenir Next"/>
+              <a:buFont typeface="Avenir Next Regular"/>
               <a:buChar char="▸"/>
               <a:defRPr sz="1500">
                 <a:solidFill>
                   <a:srgbClr val="FFFFFF"/>
                 </a:solidFill>
-                <a:latin typeface="Meslo LG M for Powerline"/>
-                <a:ea typeface="Meslo LG M for Powerline"/>
-                <a:cs typeface="Meslo LG M for Powerline"/>
-                <a:sym typeface="Meslo LG M for Powerline"/>
+                <a:latin typeface="Meslo LG M Regular for Powerline"/>
+                <a:ea typeface="Meslo LG M Regular for Powerline"/>
+                <a:cs typeface="Meslo LG M Regular for Powerline"/>
+                <a:sym typeface="Meslo LG M Regular for Powerline"/>
               </a:defRPr>
             </a:lvl4pPr>
             <a:lvl5pPr marL="1974102" indent="-196102" algn="ctr" defTabSz="821531">
@@ -1011,16 +1013,16 @@
                 <a:schemeClr val="accent1"/>
               </a:buClr>
               <a:buSzPct val="104999"/>
-              <a:buFont typeface="Avenir Next"/>
+              <a:buFont typeface="Avenir Next Regular"/>
               <a:buChar char="▸"/>
               <a:defRPr sz="1500">
                 <a:solidFill>
                   <a:srgbClr val="FFFFFF"/>
                 </a:solidFill>
-                <a:latin typeface="Meslo LG M for Powerline"/>
-                <a:ea typeface="Meslo LG M for Powerline"/>
-                <a:cs typeface="Meslo LG M for Powerline"/>
-                <a:sym typeface="Meslo LG M for Powerline"/>
+                <a:latin typeface="Meslo LG M Regular for Powerline"/>
+                <a:ea typeface="Meslo LG M Regular for Powerline"/>
+                <a:cs typeface="Meslo LG M Regular for Powerline"/>
+                <a:sym typeface="Meslo LG M Regular for Powerline"/>
               </a:defRPr>
             </a:lvl5pPr>
           </a:lstStyle>
@@ -1084,10 +1086,10 @@
                 <a:solidFill>
                   <a:srgbClr val="838787"/>
                 </a:solidFill>
-                <a:latin typeface="DIN Alternate"/>
-                <a:ea typeface="DIN Alternate"/>
-                <a:cs typeface="DIN Alternate"/>
-                <a:sym typeface="DIN Alternate"/>
+                <a:latin typeface="DIN Alternate Bold"/>
+                <a:ea typeface="DIN Alternate Bold"/>
+                <a:cs typeface="DIN Alternate Bold"/>
+                <a:sym typeface="DIN Alternate Bold"/>
               </a:defRPr>
             </a:lvl1pPr>
           </a:lstStyle>
@@ -1135,7 +1137,7 @@
           <p:cNvPr id="117" name="Image"/>
           <p:cNvSpPr/>
           <p:nvPr>
-            <p:ph type="pic" sz="half" idx="13"/>
+            <p:ph type="pic" sz="half" idx="21"/>
           </p:nvPr>
         </p:nvSpPr>
         <p:spPr>
@@ -1160,7 +1162,7 @@
           <p:cNvPr id="118" name="Image"/>
           <p:cNvSpPr/>
           <p:nvPr>
-            <p:ph type="pic" sz="half" idx="14"/>
+            <p:ph type="pic" sz="half" idx="22"/>
           </p:nvPr>
         </p:nvSpPr>
         <p:spPr>
@@ -1185,7 +1187,7 @@
           <p:cNvPr id="119" name="Image"/>
           <p:cNvSpPr/>
           <p:nvPr>
-            <p:ph type="pic" idx="15"/>
+            <p:ph type="pic" idx="23"/>
           </p:nvPr>
         </p:nvSpPr>
         <p:spPr>
@@ -1233,10 +1235,10 @@
                 <a:solidFill>
                   <a:srgbClr val="838787"/>
                 </a:solidFill>
-                <a:latin typeface="DIN Alternate"/>
-                <a:ea typeface="DIN Alternate"/>
-                <a:cs typeface="DIN Alternate"/>
-                <a:sym typeface="DIN Alternate"/>
+                <a:latin typeface="DIN Alternate Bold"/>
+                <a:ea typeface="DIN Alternate Bold"/>
+                <a:cs typeface="DIN Alternate Bold"/>
+                <a:sym typeface="DIN Alternate Bold"/>
               </a:defRPr>
             </a:lvl1pPr>
           </a:lstStyle>
@@ -1318,7 +1320,7 @@
                 <a:latin typeface="+mn-lt"/>
                 <a:ea typeface="+mn-ea"/>
                 <a:cs typeface="+mn-cs"/>
-                <a:sym typeface="DIN Condensed"/>
+                <a:sym typeface="DIN Condensed Bold"/>
               </a:defRPr>
             </a:pPr>
           </a:p>
@@ -1429,7 +1431,7 @@
                 <a:latin typeface="+mn-lt"/>
                 <a:ea typeface="+mn-ea"/>
                 <a:cs typeface="+mn-cs"/>
-                <a:sym typeface="DIN Condensed"/>
+                <a:sym typeface="DIN Condensed Bold"/>
               </a:defRPr>
             </a:pPr>
           </a:p>
@@ -1440,7 +1442,7 @@
           <p:cNvPr id="129" name="Type a quote here."/>
           <p:cNvSpPr txBox="1"/>
           <p:nvPr>
-            <p:ph type="body" sz="quarter" idx="13"/>
+            <p:ph type="body" sz="quarter" idx="21"/>
           </p:nvPr>
         </p:nvSpPr>
         <p:spPr>
@@ -1468,7 +1470,7 @@
                 <a:latin typeface="+mn-lt"/>
                 <a:ea typeface="+mn-ea"/>
                 <a:cs typeface="+mn-cs"/>
-                <a:sym typeface="DIN Condensed"/>
+                <a:sym typeface="DIN Condensed Bold"/>
               </a:defRPr>
             </a:lvl1pPr>
           </a:lstStyle>
@@ -1485,7 +1487,7 @@
           <p:cNvPr id="130" name="Johnny Appleseed"/>
           <p:cNvSpPr txBox="1"/>
           <p:nvPr>
-            <p:ph type="body" sz="quarter" idx="14"/>
+            <p:ph type="body" sz="quarter" idx="22"/>
           </p:nvPr>
         </p:nvSpPr>
         <p:spPr>
@@ -1513,7 +1515,7 @@
                 <a:latin typeface="+mn-lt"/>
                 <a:ea typeface="+mn-ea"/>
                 <a:cs typeface="+mn-cs"/>
-                <a:sym typeface="DIN Condensed"/>
+                <a:sym typeface="DIN Condensed Bold"/>
               </a:defRPr>
             </a:lvl1pPr>
           </a:lstStyle>
@@ -1530,7 +1532,7 @@
           <p:cNvPr id="131" name="Text"/>
           <p:cNvSpPr txBox="1"/>
           <p:nvPr>
-            <p:ph type="body" sz="quarter" idx="15"/>
+            <p:ph type="body" sz="quarter" idx="23"/>
           </p:nvPr>
         </p:nvSpPr>
         <p:spPr>
@@ -1555,10 +1557,10 @@
                 <a:solidFill>
                   <a:srgbClr val="838787"/>
                 </a:solidFill>
-                <a:latin typeface="DIN Alternate"/>
-                <a:ea typeface="DIN Alternate"/>
-                <a:cs typeface="DIN Alternate"/>
-                <a:sym typeface="DIN Alternate"/>
+                <a:latin typeface="DIN Alternate Bold"/>
+                <a:ea typeface="DIN Alternate Bold"/>
+                <a:cs typeface="DIN Alternate Bold"/>
+                <a:sym typeface="DIN Alternate Bold"/>
               </a:defRPr>
             </a:lvl1pPr>
           </a:lstStyle>
@@ -1598,10 +1600,10 @@
                 <a:solidFill>
                   <a:srgbClr val="838787"/>
                 </a:solidFill>
-                <a:latin typeface="DIN Alternate"/>
-                <a:ea typeface="DIN Alternate"/>
-                <a:cs typeface="DIN Alternate"/>
-                <a:sym typeface="DIN Alternate"/>
+                <a:latin typeface="DIN Alternate Bold"/>
+                <a:ea typeface="DIN Alternate Bold"/>
+                <a:cs typeface="DIN Alternate Bold"/>
+                <a:sym typeface="DIN Alternate Bold"/>
               </a:defRPr>
             </a:lvl1pPr>
           </a:lstStyle>
@@ -1649,7 +1651,7 @@
           <p:cNvPr id="139" name="Type a quote here."/>
           <p:cNvSpPr txBox="1"/>
           <p:nvPr>
-            <p:ph type="body" sz="quarter" idx="13"/>
+            <p:ph type="body" sz="quarter" idx="21"/>
           </p:nvPr>
         </p:nvSpPr>
         <p:spPr>
@@ -1677,7 +1679,7 @@
                 <a:latin typeface="+mn-lt"/>
                 <a:ea typeface="+mn-ea"/>
                 <a:cs typeface="+mn-cs"/>
-                <a:sym typeface="DIN Condensed"/>
+                <a:sym typeface="DIN Condensed Bold"/>
               </a:defRPr>
             </a:lvl1pPr>
           </a:lstStyle>
@@ -1694,7 +1696,7 @@
           <p:cNvPr id="140" name="Image"/>
           <p:cNvSpPr/>
           <p:nvPr>
-            <p:ph type="pic" idx="14"/>
+            <p:ph type="pic" idx="22"/>
           </p:nvPr>
         </p:nvSpPr>
         <p:spPr>
@@ -1719,7 +1721,7 @@
           <p:cNvPr id="141" name="Johnny Appleseed"/>
           <p:cNvSpPr txBox="1"/>
           <p:nvPr>
-            <p:ph type="body" sz="quarter" idx="15"/>
+            <p:ph type="body" sz="quarter" idx="23"/>
           </p:nvPr>
         </p:nvSpPr>
         <p:spPr>
@@ -1744,7 +1746,7 @@
                 <a:latin typeface="+mn-lt"/>
                 <a:ea typeface="+mn-ea"/>
                 <a:cs typeface="+mn-cs"/>
-                <a:sym typeface="DIN Condensed"/>
+                <a:sym typeface="DIN Condensed Bold"/>
               </a:defRPr>
             </a:lvl1pPr>
           </a:lstStyle>
@@ -1784,10 +1786,10 @@
                 <a:solidFill>
                   <a:srgbClr val="838787"/>
                 </a:solidFill>
-                <a:latin typeface="DIN Alternate"/>
-                <a:ea typeface="DIN Alternate"/>
-                <a:cs typeface="DIN Alternate"/>
-                <a:sym typeface="DIN Alternate"/>
+                <a:latin typeface="DIN Alternate Bold"/>
+                <a:ea typeface="DIN Alternate Bold"/>
+                <a:cs typeface="DIN Alternate Bold"/>
+                <a:sym typeface="DIN Alternate Bold"/>
               </a:defRPr>
             </a:lvl1pPr>
           </a:lstStyle>
@@ -1835,7 +1837,7 @@
           <p:cNvPr id="149" name="Image"/>
           <p:cNvSpPr/>
           <p:nvPr>
-            <p:ph type="pic" idx="13"/>
+            <p:ph type="pic" idx="21"/>
           </p:nvPr>
         </p:nvSpPr>
         <p:spPr>
@@ -1883,10 +1885,10 @@
                 <a:solidFill>
                   <a:srgbClr val="838787"/>
                 </a:solidFill>
-                <a:latin typeface="DIN Alternate"/>
-                <a:ea typeface="DIN Alternate"/>
-                <a:cs typeface="DIN Alternate"/>
-                <a:sym typeface="DIN Alternate"/>
+                <a:latin typeface="DIN Alternate Bold"/>
+                <a:ea typeface="DIN Alternate Bold"/>
+                <a:cs typeface="DIN Alternate Bold"/>
+                <a:sym typeface="DIN Alternate Bold"/>
               </a:defRPr>
             </a:lvl1pPr>
           </a:lstStyle>
@@ -1957,10 +1959,10 @@
                 <a:solidFill>
                   <a:srgbClr val="838787"/>
                 </a:solidFill>
-                <a:latin typeface="DIN Alternate"/>
-                <a:ea typeface="DIN Alternate"/>
-                <a:cs typeface="DIN Alternate"/>
-                <a:sym typeface="DIN Alternate"/>
+                <a:latin typeface="DIN Alternate Bold"/>
+                <a:ea typeface="DIN Alternate Bold"/>
+                <a:cs typeface="DIN Alternate Bold"/>
+                <a:sym typeface="DIN Alternate Bold"/>
               </a:defRPr>
             </a:lvl1pPr>
           </a:lstStyle>
@@ -2024,10 +2026,10 @@
                 <a:solidFill>
                   <a:srgbClr val="838787"/>
                 </a:solidFill>
-                <a:latin typeface="DIN Alternate"/>
-                <a:ea typeface="DIN Alternate"/>
-                <a:cs typeface="DIN Alternate"/>
-                <a:sym typeface="DIN Alternate"/>
+                <a:latin typeface="DIN Alternate Bold"/>
+                <a:ea typeface="DIN Alternate Bold"/>
+                <a:cs typeface="DIN Alternate Bold"/>
+                <a:sym typeface="DIN Alternate Bold"/>
               </a:defRPr>
             </a:lvl1pPr>
           </a:lstStyle>
@@ -2147,7 +2149,7 @@
           <p:cNvPr id="25" name="Image"/>
           <p:cNvSpPr/>
           <p:nvPr>
-            <p:ph type="pic" idx="13"/>
+            <p:ph type="pic" idx="21"/>
           </p:nvPr>
         </p:nvSpPr>
         <p:spPr>
@@ -2171,9 +2173,7 @@
         <p:nvSpPr>
           <p:cNvPr id="26" name="Line"/>
           <p:cNvSpPr/>
-          <p:nvPr>
-            <p:ph type="body" sz="quarter" idx="14"/>
-          </p:nvPr>
+          <p:nvPr/>
         </p:nvSpPr>
         <p:spPr>
           <a:xfrm flipV="1">
@@ -2187,6 +2187,7 @@
             <a:solidFill>
               <a:srgbClr val="A6AAA9"/>
             </a:solidFill>
+            <a:miter lim="400000"/>
           </a:ln>
         </p:spPr>
         <p:txBody>
@@ -2201,10 +2202,13 @@
                 <a:spcPts val="2000"/>
               </a:spcBef>
               <a:defRPr sz="5600">
+                <a:solidFill>
+                  <a:srgbClr val="000000"/>
+                </a:solidFill>
                 <a:latin typeface="+mn-lt"/>
                 <a:ea typeface="+mn-ea"/>
                 <a:cs typeface="+mn-cs"/>
-                <a:sym typeface="DIN Condensed"/>
+                <a:sym typeface="DIN Condensed Bold"/>
               </a:defRPr>
             </a:pPr>
           </a:p>
@@ -2241,7 +2245,7 @@
                 <a:latin typeface="+mn-lt"/>
                 <a:ea typeface="+mn-ea"/>
                 <a:cs typeface="+mn-cs"/>
-                <a:sym typeface="DIN Condensed"/>
+                <a:sym typeface="DIN Condensed Bold"/>
               </a:defRPr>
             </a:lvl1pPr>
           </a:lstStyle>
@@ -2286,10 +2290,10 @@
                 <a:solidFill>
                   <a:srgbClr val="A6AAA9"/>
                 </a:solidFill>
-                <a:latin typeface="DIN Alternate"/>
-                <a:ea typeface="DIN Alternate"/>
-                <a:cs typeface="DIN Alternate"/>
-                <a:sym typeface="DIN Alternate"/>
+                <a:latin typeface="DIN Alternate Bold"/>
+                <a:ea typeface="DIN Alternate Bold"/>
+                <a:cs typeface="DIN Alternate Bold"/>
+                <a:sym typeface="DIN Alternate Bold"/>
               </a:defRPr>
             </a:lvl1pPr>
             <a:lvl2pPr defTabSz="821531">
@@ -2303,10 +2307,10 @@
                 <a:solidFill>
                   <a:srgbClr val="A6AAA9"/>
                 </a:solidFill>
-                <a:latin typeface="DIN Alternate"/>
-                <a:ea typeface="DIN Alternate"/>
-                <a:cs typeface="DIN Alternate"/>
-                <a:sym typeface="DIN Alternate"/>
+                <a:latin typeface="DIN Alternate Bold"/>
+                <a:ea typeface="DIN Alternate Bold"/>
+                <a:cs typeface="DIN Alternate Bold"/>
+                <a:sym typeface="DIN Alternate Bold"/>
               </a:defRPr>
             </a:lvl2pPr>
             <a:lvl3pPr defTabSz="821531">
@@ -2320,10 +2324,10 @@
                 <a:solidFill>
                   <a:srgbClr val="A6AAA9"/>
                 </a:solidFill>
-                <a:latin typeface="DIN Alternate"/>
-                <a:ea typeface="DIN Alternate"/>
-                <a:cs typeface="DIN Alternate"/>
-                <a:sym typeface="DIN Alternate"/>
+                <a:latin typeface="DIN Alternate Bold"/>
+                <a:ea typeface="DIN Alternate Bold"/>
+                <a:cs typeface="DIN Alternate Bold"/>
+                <a:sym typeface="DIN Alternate Bold"/>
               </a:defRPr>
             </a:lvl3pPr>
             <a:lvl4pPr defTabSz="821531">
@@ -2337,10 +2341,10 @@
                 <a:solidFill>
                   <a:srgbClr val="A6AAA9"/>
                 </a:solidFill>
-                <a:latin typeface="DIN Alternate"/>
-                <a:ea typeface="DIN Alternate"/>
-                <a:cs typeface="DIN Alternate"/>
-                <a:sym typeface="DIN Alternate"/>
+                <a:latin typeface="DIN Alternate Bold"/>
+                <a:ea typeface="DIN Alternate Bold"/>
+                <a:cs typeface="DIN Alternate Bold"/>
+                <a:sym typeface="DIN Alternate Bold"/>
               </a:defRPr>
             </a:lvl4pPr>
             <a:lvl5pPr defTabSz="821531">
@@ -2354,10 +2358,10 @@
                 <a:solidFill>
                   <a:srgbClr val="A6AAA9"/>
                 </a:solidFill>
-                <a:latin typeface="DIN Alternate"/>
-                <a:ea typeface="DIN Alternate"/>
-                <a:cs typeface="DIN Alternate"/>
-                <a:sym typeface="DIN Alternate"/>
+                <a:latin typeface="DIN Alternate Bold"/>
+                <a:ea typeface="DIN Alternate Bold"/>
+                <a:cs typeface="DIN Alternate Bold"/>
+                <a:sym typeface="DIN Alternate Bold"/>
               </a:defRPr>
             </a:lvl5pPr>
           </a:lstStyle>
@@ -2421,10 +2425,10 @@
                 <a:solidFill>
                   <a:srgbClr val="838787"/>
                 </a:solidFill>
-                <a:latin typeface="DIN Alternate"/>
-                <a:ea typeface="DIN Alternate"/>
-                <a:cs typeface="DIN Alternate"/>
-                <a:sym typeface="DIN Alternate"/>
+                <a:latin typeface="DIN Alternate Bold"/>
+                <a:ea typeface="DIN Alternate Bold"/>
+                <a:cs typeface="DIN Alternate Bold"/>
+                <a:sym typeface="DIN Alternate Bold"/>
               </a:defRPr>
             </a:lvl1pPr>
           </a:lstStyle>
@@ -2491,7 +2495,7 @@
                 <a:latin typeface="+mn-lt"/>
                 <a:ea typeface="+mn-ea"/>
                 <a:cs typeface="+mn-cs"/>
-                <a:sym typeface="DIN Condensed"/>
+                <a:sym typeface="DIN Condensed Bold"/>
               </a:defRPr>
             </a:lvl1pPr>
           </a:lstStyle>
@@ -2531,10 +2535,10 @@
                 <a:solidFill>
                   <a:srgbClr val="838787"/>
                 </a:solidFill>
-                <a:latin typeface="DIN Alternate"/>
-                <a:ea typeface="DIN Alternate"/>
-                <a:cs typeface="DIN Alternate"/>
-                <a:sym typeface="DIN Alternate"/>
+                <a:latin typeface="DIN Alternate Bold"/>
+                <a:ea typeface="DIN Alternate Bold"/>
+                <a:cs typeface="DIN Alternate Bold"/>
+                <a:sym typeface="DIN Alternate Bold"/>
               </a:defRPr>
             </a:lvl1pPr>
           </a:lstStyle>
@@ -2608,7 +2612,7 @@
                 <a:latin typeface="+mn-lt"/>
                 <a:ea typeface="+mn-ea"/>
                 <a:cs typeface="+mn-cs"/>
-                <a:sym typeface="DIN Condensed"/>
+                <a:sym typeface="DIN Condensed Bold"/>
               </a:defRPr>
             </a:lvl1pPr>
           </a:lstStyle>
@@ -2648,10 +2652,10 @@
                 <a:solidFill>
                   <a:srgbClr val="838787"/>
                 </a:solidFill>
-                <a:latin typeface="DIN Alternate"/>
-                <a:ea typeface="DIN Alternate"/>
-                <a:cs typeface="DIN Alternate"/>
-                <a:sym typeface="DIN Alternate"/>
+                <a:latin typeface="DIN Alternate Bold"/>
+                <a:ea typeface="DIN Alternate Bold"/>
+                <a:cs typeface="DIN Alternate Bold"/>
+                <a:sym typeface="DIN Alternate Bold"/>
               </a:defRPr>
             </a:lvl1pPr>
           </a:lstStyle>
@@ -2733,7 +2737,7 @@
                 <a:latin typeface="+mn-lt"/>
                 <a:ea typeface="+mn-ea"/>
                 <a:cs typeface="+mn-cs"/>
-                <a:sym typeface="DIN Condensed"/>
+                <a:sym typeface="DIN Condensed Bold"/>
               </a:defRPr>
             </a:pPr>
           </a:p>
@@ -2744,7 +2748,7 @@
           <p:cNvPr id="53" name="Image"/>
           <p:cNvSpPr/>
           <p:nvPr>
-            <p:ph type="pic" idx="13"/>
+            <p:ph type="pic" idx="21"/>
           </p:nvPr>
         </p:nvSpPr>
         <p:spPr>
@@ -2795,7 +2799,7 @@
                 <a:latin typeface="+mn-lt"/>
                 <a:ea typeface="+mn-ea"/>
                 <a:cs typeface="+mn-cs"/>
-                <a:sym typeface="DIN Condensed"/>
+                <a:sym typeface="DIN Condensed Bold"/>
               </a:defRPr>
             </a:lvl1pPr>
           </a:lstStyle>
@@ -2840,10 +2844,10 @@
                 <a:solidFill>
                   <a:srgbClr val="A6AAA9"/>
                 </a:solidFill>
-                <a:latin typeface="DIN Alternate"/>
-                <a:ea typeface="DIN Alternate"/>
-                <a:cs typeface="DIN Alternate"/>
-                <a:sym typeface="DIN Alternate"/>
+                <a:latin typeface="DIN Alternate Bold"/>
+                <a:ea typeface="DIN Alternate Bold"/>
+                <a:cs typeface="DIN Alternate Bold"/>
+                <a:sym typeface="DIN Alternate Bold"/>
               </a:defRPr>
             </a:lvl1pPr>
             <a:lvl2pPr defTabSz="821531">
@@ -2857,10 +2861,10 @@
                 <a:solidFill>
                   <a:srgbClr val="A6AAA9"/>
                 </a:solidFill>
-                <a:latin typeface="DIN Alternate"/>
-                <a:ea typeface="DIN Alternate"/>
-                <a:cs typeface="DIN Alternate"/>
-                <a:sym typeface="DIN Alternate"/>
+                <a:latin typeface="DIN Alternate Bold"/>
+                <a:ea typeface="DIN Alternate Bold"/>
+                <a:cs typeface="DIN Alternate Bold"/>
+                <a:sym typeface="DIN Alternate Bold"/>
               </a:defRPr>
             </a:lvl2pPr>
             <a:lvl3pPr defTabSz="821531">
@@ -2874,10 +2878,10 @@
                 <a:solidFill>
                   <a:srgbClr val="A6AAA9"/>
                 </a:solidFill>
-                <a:latin typeface="DIN Alternate"/>
-                <a:ea typeface="DIN Alternate"/>
-                <a:cs typeface="DIN Alternate"/>
-                <a:sym typeface="DIN Alternate"/>
+                <a:latin typeface="DIN Alternate Bold"/>
+                <a:ea typeface="DIN Alternate Bold"/>
+                <a:cs typeface="DIN Alternate Bold"/>
+                <a:sym typeface="DIN Alternate Bold"/>
               </a:defRPr>
             </a:lvl3pPr>
             <a:lvl4pPr defTabSz="821531">
@@ -2891,10 +2895,10 @@
                 <a:solidFill>
                   <a:srgbClr val="A6AAA9"/>
                 </a:solidFill>
-                <a:latin typeface="DIN Alternate"/>
-                <a:ea typeface="DIN Alternate"/>
-                <a:cs typeface="DIN Alternate"/>
-                <a:sym typeface="DIN Alternate"/>
+                <a:latin typeface="DIN Alternate Bold"/>
+                <a:ea typeface="DIN Alternate Bold"/>
+                <a:cs typeface="DIN Alternate Bold"/>
+                <a:sym typeface="DIN Alternate Bold"/>
               </a:defRPr>
             </a:lvl4pPr>
             <a:lvl5pPr defTabSz="821531">
@@ -2908,10 +2912,10 @@
                 <a:solidFill>
                   <a:srgbClr val="A6AAA9"/>
                 </a:solidFill>
-                <a:latin typeface="DIN Alternate"/>
-                <a:ea typeface="DIN Alternate"/>
-                <a:cs typeface="DIN Alternate"/>
-                <a:sym typeface="DIN Alternate"/>
+                <a:latin typeface="DIN Alternate Bold"/>
+                <a:ea typeface="DIN Alternate Bold"/>
+                <a:cs typeface="DIN Alternate Bold"/>
+                <a:sym typeface="DIN Alternate Bold"/>
               </a:defRPr>
             </a:lvl5pPr>
           </a:lstStyle>
@@ -2975,10 +2979,10 @@
                 <a:solidFill>
                   <a:srgbClr val="838787"/>
                 </a:solidFill>
-                <a:latin typeface="DIN Alternate"/>
-                <a:ea typeface="DIN Alternate"/>
-                <a:cs typeface="DIN Alternate"/>
-                <a:sym typeface="DIN Alternate"/>
+                <a:latin typeface="DIN Alternate Bold"/>
+                <a:ea typeface="DIN Alternate Bold"/>
+                <a:cs typeface="DIN Alternate Bold"/>
+                <a:sym typeface="DIN Alternate Bold"/>
               </a:defRPr>
             </a:lvl1pPr>
           </a:lstStyle>
@@ -3053,7 +3057,7 @@
                 <a:latin typeface="+mn-lt"/>
                 <a:ea typeface="+mn-ea"/>
                 <a:cs typeface="+mn-cs"/>
-                <a:sym typeface="DIN Condensed"/>
+                <a:sym typeface="DIN Condensed Bold"/>
               </a:defRPr>
             </a:pPr>
           </a:p>
@@ -3064,7 +3068,7 @@
           <p:cNvPr id="64" name="Text"/>
           <p:cNvSpPr txBox="1"/>
           <p:nvPr>
-            <p:ph type="body" sz="quarter" idx="13"/>
+            <p:ph type="body" sz="quarter" idx="21"/>
           </p:nvPr>
         </p:nvSpPr>
         <p:spPr>
@@ -3089,10 +3093,10 @@
                 <a:solidFill>
                   <a:srgbClr val="838787"/>
                 </a:solidFill>
-                <a:latin typeface="DIN Alternate"/>
-                <a:ea typeface="DIN Alternate"/>
-                <a:cs typeface="DIN Alternate"/>
-                <a:sym typeface="DIN Alternate"/>
+                <a:latin typeface="DIN Alternate Bold"/>
+                <a:ea typeface="DIN Alternate Bold"/>
+                <a:cs typeface="DIN Alternate Bold"/>
+                <a:sym typeface="DIN Alternate Bold"/>
               </a:defRPr>
             </a:lvl1pPr>
           </a:lstStyle>
@@ -3138,7 +3142,7 @@
                 <a:latin typeface="+mn-lt"/>
                 <a:ea typeface="+mn-ea"/>
                 <a:cs typeface="+mn-cs"/>
-                <a:sym typeface="DIN Condensed"/>
+                <a:sym typeface="DIN Condensed Bold"/>
               </a:defRPr>
             </a:lvl1pPr>
           </a:lstStyle>
@@ -3178,10 +3182,10 @@
                 <a:solidFill>
                   <a:srgbClr val="838787"/>
                 </a:solidFill>
-                <a:latin typeface="DIN Alternate"/>
-                <a:ea typeface="DIN Alternate"/>
-                <a:cs typeface="DIN Alternate"/>
-                <a:sym typeface="DIN Alternate"/>
+                <a:latin typeface="DIN Alternate Bold"/>
+                <a:ea typeface="DIN Alternate Bold"/>
+                <a:cs typeface="DIN Alternate Bold"/>
+                <a:sym typeface="DIN Alternate Bold"/>
               </a:defRPr>
             </a:lvl1pPr>
           </a:lstStyle>
@@ -3263,7 +3267,7 @@
                 <a:latin typeface="+mn-lt"/>
                 <a:ea typeface="+mn-ea"/>
                 <a:cs typeface="+mn-cs"/>
-                <a:sym typeface="DIN Condensed"/>
+                <a:sym typeface="DIN Condensed Bold"/>
               </a:defRPr>
             </a:pPr>
           </a:p>
@@ -3274,7 +3278,7 @@
           <p:cNvPr id="74" name="Text"/>
           <p:cNvSpPr txBox="1"/>
           <p:nvPr>
-            <p:ph type="body" sz="quarter" idx="13"/>
+            <p:ph type="body" sz="quarter" idx="21"/>
           </p:nvPr>
         </p:nvSpPr>
         <p:spPr>
@@ -3299,10 +3303,10 @@
                 <a:solidFill>
                   <a:srgbClr val="838787"/>
                 </a:solidFill>
-                <a:latin typeface="DIN Alternate"/>
-                <a:ea typeface="DIN Alternate"/>
-                <a:cs typeface="DIN Alternate"/>
-                <a:sym typeface="DIN Alternate"/>
+                <a:latin typeface="DIN Alternate Bold"/>
+                <a:ea typeface="DIN Alternate Bold"/>
+                <a:cs typeface="DIN Alternate Bold"/>
+                <a:sym typeface="DIN Alternate Bold"/>
               </a:defRPr>
             </a:lvl1pPr>
           </a:lstStyle>
@@ -3348,7 +3352,7 @@
                 <a:latin typeface="+mn-lt"/>
                 <a:ea typeface="+mn-ea"/>
                 <a:cs typeface="+mn-cs"/>
-                <a:sym typeface="DIN Condensed"/>
+                <a:sym typeface="DIN Condensed Bold"/>
               </a:defRPr>
             </a:lvl1pPr>
           </a:lstStyle>
@@ -3387,16 +3391,16 @@
                 <a:schemeClr val="accent1"/>
               </a:buClr>
               <a:buSzPct val="104999"/>
-              <a:buFont typeface="Avenir Next"/>
+              <a:buFont typeface="Avenir Next Regular"/>
               <a:buChar char="▸"/>
               <a:defRPr sz="1500">
                 <a:solidFill>
                   <a:srgbClr val="FFFFFF"/>
                 </a:solidFill>
-                <a:latin typeface="Meslo LG M for Powerline"/>
-                <a:ea typeface="Meslo LG M for Powerline"/>
-                <a:cs typeface="Meslo LG M for Powerline"/>
-                <a:sym typeface="Meslo LG M for Powerline"/>
+                <a:latin typeface="Meslo LG M Regular for Powerline"/>
+                <a:ea typeface="Meslo LG M Regular for Powerline"/>
+                <a:cs typeface="Meslo LG M Regular for Powerline"/>
+                <a:sym typeface="Meslo LG M Regular for Powerline"/>
               </a:defRPr>
             </a:lvl1pPr>
             <a:lvl2pPr marL="640602" indent="-196102" algn="ctr" defTabSz="821531">
@@ -3404,16 +3408,16 @@
                 <a:schemeClr val="accent1"/>
               </a:buClr>
               <a:buSzPct val="104999"/>
-              <a:buFont typeface="Avenir Next"/>
+              <a:buFont typeface="Avenir Next Regular"/>
               <a:buChar char="▸"/>
               <a:defRPr sz="1500">
                 <a:solidFill>
                   <a:srgbClr val="FFFFFF"/>
                 </a:solidFill>
-                <a:latin typeface="Meslo LG M for Powerline"/>
-                <a:ea typeface="Meslo LG M for Powerline"/>
-                <a:cs typeface="Meslo LG M for Powerline"/>
-                <a:sym typeface="Meslo LG M for Powerline"/>
+                <a:latin typeface="Meslo LG M Regular for Powerline"/>
+                <a:ea typeface="Meslo LG M Regular for Powerline"/>
+                <a:cs typeface="Meslo LG M Regular for Powerline"/>
+                <a:sym typeface="Meslo LG M Regular for Powerline"/>
               </a:defRPr>
             </a:lvl2pPr>
             <a:lvl3pPr marL="1085102" indent="-196102" algn="ctr" defTabSz="821531">
@@ -3421,16 +3425,16 @@
                 <a:schemeClr val="accent1"/>
               </a:buClr>
               <a:buSzPct val="104999"/>
-              <a:buFont typeface="Avenir Next"/>
+              <a:buFont typeface="Avenir Next Regular"/>
               <a:buChar char="▸"/>
               <a:defRPr sz="1500">
                 <a:solidFill>
                   <a:srgbClr val="FFFFFF"/>
                 </a:solidFill>
-                <a:latin typeface="Meslo LG M for Powerline"/>
-                <a:ea typeface="Meslo LG M for Powerline"/>
-                <a:cs typeface="Meslo LG M for Powerline"/>
-                <a:sym typeface="Meslo LG M for Powerline"/>
+                <a:latin typeface="Meslo LG M Regular for Powerline"/>
+                <a:ea typeface="Meslo LG M Regular for Powerline"/>
+                <a:cs typeface="Meslo LG M Regular for Powerline"/>
+                <a:sym typeface="Meslo LG M Regular for Powerline"/>
               </a:defRPr>
             </a:lvl3pPr>
             <a:lvl4pPr marL="1529602" indent="-196102" algn="ctr" defTabSz="821531">
@@ -3438,16 +3442,16 @@
                 <a:schemeClr val="accent1"/>
               </a:buClr>
               <a:buSzPct val="104999"/>
-              <a:buFont typeface="Avenir Next"/>
+              <a:buFont typeface="Avenir Next Regular"/>
               <a:buChar char="▸"/>
               <a:defRPr sz="1500">
                 <a:solidFill>
                   <a:srgbClr val="FFFFFF"/>
                 </a:solidFill>
-                <a:latin typeface="Meslo LG M for Powerline"/>
-                <a:ea typeface="Meslo LG M for Powerline"/>
-                <a:cs typeface="Meslo LG M for Powerline"/>
-                <a:sym typeface="Meslo LG M for Powerline"/>
+                <a:latin typeface="Meslo LG M Regular for Powerline"/>
+                <a:ea typeface="Meslo LG M Regular for Powerline"/>
+                <a:cs typeface="Meslo LG M Regular for Powerline"/>
+                <a:sym typeface="Meslo LG M Regular for Powerline"/>
               </a:defRPr>
             </a:lvl4pPr>
             <a:lvl5pPr marL="1974102" indent="-196102" algn="ctr" defTabSz="821531">
@@ -3455,16 +3459,16 @@
                 <a:schemeClr val="accent1"/>
               </a:buClr>
               <a:buSzPct val="104999"/>
-              <a:buFont typeface="Avenir Next"/>
+              <a:buFont typeface="Avenir Next Regular"/>
               <a:buChar char="▸"/>
               <a:defRPr sz="1500">
                 <a:solidFill>
                   <a:srgbClr val="FFFFFF"/>
                 </a:solidFill>
-                <a:latin typeface="Meslo LG M for Powerline"/>
-                <a:ea typeface="Meslo LG M for Powerline"/>
-                <a:cs typeface="Meslo LG M for Powerline"/>
-                <a:sym typeface="Meslo LG M for Powerline"/>
+                <a:latin typeface="Meslo LG M Regular for Powerline"/>
+                <a:ea typeface="Meslo LG M Regular for Powerline"/>
+                <a:cs typeface="Meslo LG M Regular for Powerline"/>
+                <a:sym typeface="Meslo LG M Regular for Powerline"/>
               </a:defRPr>
             </a:lvl5pPr>
           </a:lstStyle>
@@ -3528,10 +3532,10 @@
                 <a:solidFill>
                   <a:srgbClr val="838787"/>
                 </a:solidFill>
-                <a:latin typeface="DIN Alternate"/>
-                <a:ea typeface="DIN Alternate"/>
-                <a:cs typeface="DIN Alternate"/>
-                <a:sym typeface="DIN Alternate"/>
+                <a:latin typeface="DIN Alternate Bold"/>
+                <a:ea typeface="DIN Alternate Bold"/>
+                <a:cs typeface="DIN Alternate Bold"/>
+                <a:sym typeface="DIN Alternate Bold"/>
               </a:defRPr>
             </a:lvl1pPr>
           </a:lstStyle>
@@ -3606,7 +3610,7 @@
                 <a:latin typeface="+mn-lt"/>
                 <a:ea typeface="+mn-ea"/>
                 <a:cs typeface="+mn-cs"/>
-                <a:sym typeface="DIN Condensed"/>
+                <a:sym typeface="DIN Condensed Bold"/>
               </a:defRPr>
             </a:pPr>
           </a:p>
@@ -3617,7 +3621,7 @@
           <p:cNvPr id="85" name="Text"/>
           <p:cNvSpPr txBox="1"/>
           <p:nvPr>
-            <p:ph type="body" sz="quarter" idx="13"/>
+            <p:ph type="body" sz="quarter" idx="21"/>
           </p:nvPr>
         </p:nvSpPr>
         <p:spPr>
@@ -3642,10 +3646,10 @@
                 <a:solidFill>
                   <a:srgbClr val="838787"/>
                 </a:solidFill>
-                <a:latin typeface="DIN Alternate"/>
-                <a:ea typeface="DIN Alternate"/>
-                <a:cs typeface="DIN Alternate"/>
-                <a:sym typeface="DIN Alternate"/>
+                <a:latin typeface="DIN Alternate Bold"/>
+                <a:ea typeface="DIN Alternate Bold"/>
+                <a:cs typeface="DIN Alternate Bold"/>
+                <a:sym typeface="DIN Alternate Bold"/>
               </a:defRPr>
             </a:lvl1pPr>
           </a:lstStyle>
@@ -3691,7 +3695,7 @@
                 <a:latin typeface="+mn-lt"/>
                 <a:ea typeface="+mn-ea"/>
                 <a:cs typeface="+mn-cs"/>
-                <a:sym typeface="DIN Condensed"/>
+                <a:sym typeface="DIN Condensed Bold"/>
               </a:defRPr>
             </a:lvl1pPr>
           </a:lstStyle>
@@ -3730,16 +3734,16 @@
                 <a:schemeClr val="accent1"/>
               </a:buClr>
               <a:buSzPct val="104999"/>
-              <a:buFont typeface="Avenir Next"/>
+              <a:buFont typeface="Avenir Next Regular"/>
               <a:buChar char="▸"/>
               <a:defRPr sz="1500">
                 <a:solidFill>
                   <a:srgbClr val="FFFFFF"/>
                 </a:solidFill>
-                <a:latin typeface="Meslo LG M for Powerline"/>
-                <a:ea typeface="Meslo LG M for Powerline"/>
-                <a:cs typeface="Meslo LG M for Powerline"/>
-                <a:sym typeface="Meslo LG M for Powerline"/>
+                <a:latin typeface="Meslo LG M Regular for Powerline"/>
+                <a:ea typeface="Meslo LG M Regular for Powerline"/>
+                <a:cs typeface="Meslo LG M Regular for Powerline"/>
+                <a:sym typeface="Meslo LG M Regular for Powerline"/>
               </a:defRPr>
             </a:lvl1pPr>
             <a:lvl2pPr marL="640602" indent="-196102" algn="ctr" defTabSz="821531">
@@ -3747,16 +3751,16 @@
                 <a:schemeClr val="accent1"/>
               </a:buClr>
               <a:buSzPct val="104999"/>
-              <a:buFont typeface="Avenir Next"/>
+              <a:buFont typeface="Avenir Next Regular"/>
               <a:buChar char="▸"/>
               <a:defRPr sz="1500">
                 <a:solidFill>
                   <a:srgbClr val="FFFFFF"/>
                 </a:solidFill>
-                <a:latin typeface="Meslo LG M for Powerline"/>
-                <a:ea typeface="Meslo LG M for Powerline"/>
-                <a:cs typeface="Meslo LG M for Powerline"/>
-                <a:sym typeface="Meslo LG M for Powerline"/>
+                <a:latin typeface="Meslo LG M Regular for Powerline"/>
+                <a:ea typeface="Meslo LG M Regular for Powerline"/>
+                <a:cs typeface="Meslo LG M Regular for Powerline"/>
+                <a:sym typeface="Meslo LG M Regular for Powerline"/>
               </a:defRPr>
             </a:lvl2pPr>
             <a:lvl3pPr marL="1085102" indent="-196102" algn="ctr" defTabSz="821531">
@@ -3764,16 +3768,16 @@
                 <a:schemeClr val="accent1"/>
               </a:buClr>
               <a:buSzPct val="104999"/>
-              <a:buFont typeface="Avenir Next"/>
+              <a:buFont typeface="Avenir Next Regular"/>
               <a:buChar char="▸"/>
               <a:defRPr sz="1500">
                 <a:solidFill>
                   <a:srgbClr val="FFFFFF"/>
                 </a:solidFill>
-                <a:latin typeface="Meslo LG M for Powerline"/>
-                <a:ea typeface="Meslo LG M for Powerline"/>
-                <a:cs typeface="Meslo LG M for Powerline"/>
-                <a:sym typeface="Meslo LG M for Powerline"/>
+                <a:latin typeface="Meslo LG M Regular for Powerline"/>
+                <a:ea typeface="Meslo LG M Regular for Powerline"/>
+                <a:cs typeface="Meslo LG M Regular for Powerline"/>
+                <a:sym typeface="Meslo LG M Regular for Powerline"/>
               </a:defRPr>
             </a:lvl3pPr>
             <a:lvl4pPr marL="1529602" indent="-196102" algn="ctr" defTabSz="821531">
@@ -3781,16 +3785,16 @@
                 <a:schemeClr val="accent1"/>
               </a:buClr>
               <a:buSzPct val="104999"/>
-              <a:buFont typeface="Avenir Next"/>
+              <a:buFont typeface="Avenir Next Regular"/>
               <a:buChar char="▸"/>
               <a:defRPr sz="1500">
                 <a:solidFill>
                   <a:srgbClr val="FFFFFF"/>
                 </a:solidFill>
-                <a:latin typeface="Meslo LG M for Powerline"/>
-                <a:ea typeface="Meslo LG M for Powerline"/>
-                <a:cs typeface="Meslo LG M for Powerline"/>
-                <a:sym typeface="Meslo LG M for Powerline"/>
+                <a:latin typeface="Meslo LG M Regular for Powerline"/>
+                <a:ea typeface="Meslo LG M Regular for Powerline"/>
+                <a:cs typeface="Meslo LG M Regular for Powerline"/>
+                <a:sym typeface="Meslo LG M Regular for Powerline"/>
               </a:defRPr>
             </a:lvl4pPr>
             <a:lvl5pPr marL="1974102" indent="-196102" algn="ctr" defTabSz="821531">
@@ -3798,16 +3802,16 @@
                 <a:schemeClr val="accent1"/>
               </a:buClr>
               <a:buSzPct val="104999"/>
-              <a:buFont typeface="Avenir Next"/>
+              <a:buFont typeface="Avenir Next Regular"/>
               <a:buChar char="▸"/>
               <a:defRPr sz="1500">
                 <a:solidFill>
                   <a:srgbClr val="FFFFFF"/>
                 </a:solidFill>
-                <a:latin typeface="Meslo LG M for Powerline"/>
-                <a:ea typeface="Meslo LG M for Powerline"/>
-                <a:cs typeface="Meslo LG M for Powerline"/>
-                <a:sym typeface="Meslo LG M for Powerline"/>
+                <a:latin typeface="Meslo LG M Regular for Powerline"/>
+                <a:ea typeface="Meslo LG M Regular for Powerline"/>
+                <a:cs typeface="Meslo LG M Regular for Powerline"/>
+                <a:sym typeface="Meslo LG M Regular for Powerline"/>
               </a:defRPr>
             </a:lvl5pPr>
           </a:lstStyle>
@@ -3871,10 +3875,10 @@
                 <a:solidFill>
                   <a:srgbClr val="838787"/>
                 </a:solidFill>
-                <a:latin typeface="DIN Alternate"/>
-                <a:ea typeface="DIN Alternate"/>
-                <a:cs typeface="DIN Alternate"/>
-                <a:sym typeface="DIN Alternate"/>
+                <a:latin typeface="DIN Alternate Bold"/>
+                <a:ea typeface="DIN Alternate Bold"/>
+                <a:cs typeface="DIN Alternate Bold"/>
+                <a:sym typeface="DIN Alternate Bold"/>
               </a:defRPr>
             </a:lvl1pPr>
           </a:lstStyle>
@@ -3956,7 +3960,7 @@
                 <a:latin typeface="+mn-lt"/>
                 <a:ea typeface="+mn-ea"/>
                 <a:cs typeface="+mn-cs"/>
-                <a:sym typeface="DIN Condensed"/>
+                <a:sym typeface="DIN Condensed Bold"/>
               </a:defRPr>
             </a:pPr>
           </a:p>
@@ -3967,7 +3971,7 @@
           <p:cNvPr id="96" name="Text"/>
           <p:cNvSpPr txBox="1"/>
           <p:nvPr>
-            <p:ph type="body" sz="quarter" idx="13"/>
+            <p:ph type="body" sz="quarter" idx="21"/>
           </p:nvPr>
         </p:nvSpPr>
         <p:spPr>
@@ -3992,10 +3996,10 @@
                 <a:solidFill>
                   <a:srgbClr val="838787"/>
                 </a:solidFill>
-                <a:latin typeface="DIN Alternate"/>
-                <a:ea typeface="DIN Alternate"/>
-                <a:cs typeface="DIN Alternate"/>
-                <a:sym typeface="DIN Alternate"/>
+                <a:latin typeface="DIN Alternate Bold"/>
+                <a:ea typeface="DIN Alternate Bold"/>
+                <a:cs typeface="DIN Alternate Bold"/>
+                <a:sym typeface="DIN Alternate Bold"/>
               </a:defRPr>
             </a:lvl1pPr>
           </a:lstStyle>
@@ -4012,7 +4016,7 @@
           <p:cNvPr id="97" name="Image"/>
           <p:cNvSpPr/>
           <p:nvPr>
-            <p:ph type="pic" sz="half" idx="14"/>
+            <p:ph type="pic" sz="half" idx="22"/>
           </p:nvPr>
         </p:nvSpPr>
         <p:spPr>
@@ -4066,7 +4070,7 @@
                 <a:latin typeface="+mn-lt"/>
                 <a:ea typeface="+mn-ea"/>
                 <a:cs typeface="+mn-cs"/>
-                <a:sym typeface="DIN Condensed"/>
+                <a:sym typeface="DIN Condensed Bold"/>
               </a:defRPr>
             </a:lvl1pPr>
           </a:lstStyle>
@@ -4108,7 +4112,7 @@
                 <a:schemeClr val="accent1"/>
               </a:buClr>
               <a:buSzPct val="104999"/>
-              <a:buFont typeface="Avenir Next"/>
+              <a:buFont typeface="Avenir Next Regular"/>
               <a:buChar char="▸"/>
               <a:defRPr sz="3800">
                 <a:solidFill>
@@ -4128,7 +4132,7 @@
                 <a:schemeClr val="accent1"/>
               </a:buClr>
               <a:buSzPct val="104999"/>
-              <a:buFont typeface="Avenir Next"/>
+              <a:buFont typeface="Avenir Next Regular"/>
               <a:buChar char="▸"/>
               <a:defRPr sz="3800">
                 <a:solidFill>
@@ -4148,7 +4152,7 @@
                 <a:schemeClr val="accent1"/>
               </a:buClr>
               <a:buSzPct val="104999"/>
-              <a:buFont typeface="Avenir Next"/>
+              <a:buFont typeface="Avenir Next Regular"/>
               <a:buChar char="▸"/>
               <a:defRPr sz="3800">
                 <a:solidFill>
@@ -4168,7 +4172,7 @@
                 <a:schemeClr val="accent1"/>
               </a:buClr>
               <a:buSzPct val="104999"/>
-              <a:buFont typeface="Avenir Next"/>
+              <a:buFont typeface="Avenir Next Regular"/>
               <a:buChar char="▸"/>
               <a:defRPr sz="3800">
                 <a:solidFill>
@@ -4188,7 +4192,7 @@
                 <a:schemeClr val="accent1"/>
               </a:buClr>
               <a:buSzPct val="104999"/>
-              <a:buFont typeface="Avenir Next"/>
+              <a:buFont typeface="Avenir Next Regular"/>
               <a:buChar char="▸"/>
               <a:defRPr sz="3800">
                 <a:solidFill>
@@ -4261,10 +4265,10 @@
                 <a:solidFill>
                   <a:srgbClr val="838787"/>
                 </a:solidFill>
-                <a:latin typeface="DIN Alternate"/>
-                <a:ea typeface="DIN Alternate"/>
-                <a:cs typeface="DIN Alternate"/>
-                <a:sym typeface="DIN Alternate"/>
+                <a:latin typeface="DIN Alternate Bold"/>
+                <a:ea typeface="DIN Alternate Bold"/>
+                <a:cs typeface="DIN Alternate Bold"/>
+                <a:sym typeface="DIN Alternate Bold"/>
               </a:defRPr>
             </a:lvl1pPr>
           </a:lstStyle>
@@ -5403,14 +5407,14 @@
               <a:lnSpc>
                 <a:spcPct val="100000"/>
               </a:lnSpc>
-              <a:defRPr cap="none" sz="10200">
+              <a:defRPr b="1" cap="none" sz="10200">
                 <a:solidFill>
                   <a:srgbClr val="FFFFFF"/>
                 </a:solidFill>
-                <a:latin typeface="Meslo LG M for Powerline"/>
-                <a:ea typeface="Meslo LG M for Powerline"/>
-                <a:cs typeface="Meslo LG M for Powerline"/>
-                <a:sym typeface="Meslo LG M for Powerline"/>
+                <a:latin typeface="Meslo LG M Regular for Powerline"/>
+                <a:ea typeface="Meslo LG M Regular for Powerline"/>
+                <a:cs typeface="Meslo LG M Regular for Powerline"/>
+                <a:sym typeface="Meslo LG M Regular for Powerline"/>
               </a:defRPr>
             </a:lvl1pPr>
           </a:lstStyle>
@@ -5486,7 +5490,1550 @@
       </p:grpSpPr>
       <p:sp>
         <p:nvSpPr>
-          <p:cNvPr id="289" name="Title 6"/>
+          <p:cNvPr id="292" name="Title 6"/>
+          <p:cNvSpPr txBox="1"/>
+          <p:nvPr>
+            <p:ph type="title"/>
+          </p:nvPr>
+        </p:nvSpPr>
+        <p:spPr>
+          <a:xfrm>
+            <a:off x="5015634" y="1119893"/>
+            <a:ext cx="14352732" cy="1288881"/>
+          </a:xfrm>
+          <a:prstGeom prst="rect">
+            <a:avLst/>
+          </a:prstGeom>
+        </p:spPr>
+        <p:txBody>
+          <a:bodyPr/>
+          <a:lstStyle>
+            <a:lvl1pPr algn="ctr">
+              <a:defRPr sz="8000">
+                <a:solidFill>
+                  <a:srgbClr val="66C2FF"/>
+                </a:solidFill>
+              </a:defRPr>
+            </a:lvl1pPr>
+          </a:lstStyle>
+          <a:p>
+            <a:pPr/>
+            <a:r>
+              <a:t>Open closed principle</a:t>
+            </a:r>
+          </a:p>
+        </p:txBody>
+      </p:sp>
+      <p:pic>
+        <p:nvPicPr>
+          <p:cNvPr id="293" name="stopwatch (2).png" descr="stopwatch (2).png"/>
+          <p:cNvPicPr>
+            <a:picLocks noChangeAspect="1"/>
+          </p:cNvPicPr>
+          <p:nvPr/>
+        </p:nvPicPr>
+        <p:blipFill>
+          <a:blip r:embed="rId2">
+            <a:extLst/>
+          </a:blip>
+          <a:stretch>
+            <a:fillRect/>
+          </a:stretch>
+        </p:blipFill>
+        <p:spPr>
+          <a:xfrm>
+            <a:off x="22225000" y="2032000"/>
+            <a:ext cx="1270000" cy="1485243"/>
+          </a:xfrm>
+          <a:prstGeom prst="rect">
+            <a:avLst/>
+          </a:prstGeom>
+          <a:ln w="12700">
+            <a:miter lim="400000"/>
+          </a:ln>
+        </p:spPr>
+      </p:pic>
+      <p:grpSp>
+        <p:nvGrpSpPr>
+          <p:cNvPr id="296" name="Group"/>
+          <p:cNvGrpSpPr/>
+          <p:nvPr/>
+        </p:nvGrpSpPr>
+        <p:grpSpPr>
+          <a:xfrm>
+            <a:off x="1270000" y="5801403"/>
+            <a:ext cx="1814539" cy="1429593"/>
+            <a:chOff x="0" y="413495"/>
+            <a:chExt cx="1814538" cy="1429591"/>
+          </a:xfrm>
+        </p:grpSpPr>
+        <p:sp>
+          <p:nvSpPr>
+            <p:cNvPr id="294" name="parse 100+ commands"/>
+            <p:cNvSpPr/>
+            <p:nvPr/>
+          </p:nvSpPr>
+          <p:spPr>
+            <a:xfrm>
+              <a:off x="544538" y="573087"/>
+              <a:ext cx="1270001" cy="1270001"/>
+            </a:xfrm>
+            <a:prstGeom prst="line">
+              <a:avLst/>
+            </a:prstGeom>
+            <a:noFill/>
+            <a:ln w="12700" cap="flat">
+              <a:noFill/>
+              <a:miter lim="400000"/>
+            </a:ln>
+            <a:effectLst/>
+            <a:extLst>
+              <a:ext uri="{C572A759-6A51-4108-AA02-DFA0A04FC94B}">
+                <ma14:wrappingTextBoxFlag xmlns:ma14="http://schemas.microsoft.com/office/mac/drawingml/2011/main" val="1"/>
+              </a:ext>
+            </a:extLst>
+          </p:spPr>
+          <p:txBody>
+            <a:bodyPr wrap="none" lIns="71437" tIns="71437" rIns="71437" bIns="71437" numCol="1" anchor="ctr">
+              <a:spAutoFit/>
+            </a:bodyPr>
+            <a:lstStyle/>
+            <a:p>
+              <a:pPr>
+                <a:defRPr sz="5800">
+                  <a:solidFill>
+                    <a:srgbClr val="FFFFFF"/>
+                  </a:solidFill>
+                  <a:latin typeface="Avenir Next Regular"/>
+                  <a:ea typeface="Avenir Next Regular"/>
+                  <a:cs typeface="Avenir Next Regular"/>
+                  <a:sym typeface="Avenir Next Regular"/>
+                </a:defRPr>
+              </a:pPr>
+              <a:r>
+                <a:t>parse </a:t>
+              </a:r>
+              <a:r>
+                <a:rPr b="1"/>
+                <a:t>100+ commands</a:t>
+              </a:r>
+            </a:p>
+          </p:txBody>
+        </p:sp>
+        <p:sp>
+          <p:nvSpPr>
+            <p:cNvPr id="295" name="Square"/>
+            <p:cNvSpPr/>
+            <p:nvPr/>
+          </p:nvSpPr>
+          <p:spPr>
+            <a:xfrm>
+              <a:off x="0" y="413495"/>
+              <a:ext cx="319184" cy="319185"/>
+            </a:xfrm>
+            <a:prstGeom prst="rect">
+              <a:avLst/>
+            </a:prstGeom>
+            <a:solidFill>
+              <a:srgbClr val="9C27B0"/>
+            </a:solidFill>
+            <a:ln w="12700" cap="flat">
+              <a:noFill/>
+              <a:miter lim="400000"/>
+            </a:ln>
+            <a:effectLst/>
+          </p:spPr>
+          <p:txBody>
+            <a:bodyPr wrap="square" lIns="71437" tIns="71437" rIns="71437" bIns="71437" numCol="1" anchor="ctr">
+              <a:noAutofit/>
+            </a:bodyPr>
+            <a:lstStyle/>
+            <a:p>
+              <a:pPr algn="ctr">
+                <a:lnSpc>
+                  <a:spcPct val="80000"/>
+                </a:lnSpc>
+                <a:spcBef>
+                  <a:spcPts val="0"/>
+                </a:spcBef>
+                <a:defRPr cap="all" sz="3800">
+                  <a:solidFill>
+                    <a:srgbClr val="FFFFFF"/>
+                  </a:solidFill>
+                  <a:latin typeface="+mn-lt"/>
+                  <a:ea typeface="+mn-ea"/>
+                  <a:cs typeface="+mn-cs"/>
+                  <a:sym typeface="DIN Condensed Bold"/>
+                </a:defRPr>
+              </a:pPr>
+            </a:p>
+          </p:txBody>
+        </p:sp>
+      </p:grpSp>
+      <p:grpSp>
+        <p:nvGrpSpPr>
+          <p:cNvPr id="299" name="Group"/>
+          <p:cNvGrpSpPr/>
+          <p:nvPr/>
+        </p:nvGrpSpPr>
+        <p:grpSpPr>
+          <a:xfrm>
+            <a:off x="1269999" y="7079408"/>
+            <a:ext cx="1800130" cy="1429593"/>
+            <a:chOff x="0" y="413495"/>
+            <a:chExt cx="1800128" cy="1429591"/>
+          </a:xfrm>
+        </p:grpSpPr>
+        <p:sp>
+          <p:nvSpPr>
+            <p:cNvPr id="297" name="3-10 commands, constantly change"/>
+            <p:cNvSpPr/>
+            <p:nvPr/>
+          </p:nvSpPr>
+          <p:spPr>
+            <a:xfrm>
+              <a:off x="530128" y="573087"/>
+              <a:ext cx="1270001" cy="1270001"/>
+            </a:xfrm>
+            <a:prstGeom prst="line">
+              <a:avLst/>
+            </a:prstGeom>
+            <a:noFill/>
+            <a:ln w="12700" cap="flat">
+              <a:noFill/>
+              <a:miter lim="400000"/>
+            </a:ln>
+            <a:effectLst/>
+            <a:extLst>
+              <a:ext uri="{C572A759-6A51-4108-AA02-DFA0A04FC94B}">
+                <ma14:wrappingTextBoxFlag xmlns:ma14="http://schemas.microsoft.com/office/mac/drawingml/2011/main" val="1"/>
+              </a:ext>
+            </a:extLst>
+          </p:spPr>
+          <p:txBody>
+            <a:bodyPr wrap="none" lIns="71437" tIns="71437" rIns="71437" bIns="71437" numCol="1" anchor="ctr">
+              <a:spAutoFit/>
+            </a:bodyPr>
+            <a:lstStyle/>
+            <a:p>
+              <a:pPr>
+                <a:defRPr sz="5800">
+                  <a:solidFill>
+                    <a:srgbClr val="FFFFFF"/>
+                  </a:solidFill>
+                  <a:latin typeface="Avenir Next Regular"/>
+                  <a:ea typeface="Avenir Next Regular"/>
+                  <a:cs typeface="Avenir Next Regular"/>
+                  <a:sym typeface="Avenir Next Regular"/>
+                </a:defRPr>
+              </a:pPr>
+              <a:r>
+                <a:rPr b="1"/>
+                <a:t>3-10</a:t>
+              </a:r>
+              <a:r>
+                <a:t> commands, constantly </a:t>
+              </a:r>
+              <a:r>
+                <a:rPr b="1"/>
+                <a:t>change</a:t>
+              </a:r>
+            </a:p>
+          </p:txBody>
+        </p:sp>
+        <p:sp>
+          <p:nvSpPr>
+            <p:cNvPr id="298" name="Square"/>
+            <p:cNvSpPr/>
+            <p:nvPr/>
+          </p:nvSpPr>
+          <p:spPr>
+            <a:xfrm>
+              <a:off x="0" y="413495"/>
+              <a:ext cx="319184" cy="319185"/>
+            </a:xfrm>
+            <a:prstGeom prst="rect">
+              <a:avLst/>
+            </a:prstGeom>
+            <a:solidFill>
+              <a:srgbClr val="9C27B0"/>
+            </a:solidFill>
+            <a:ln w="12700" cap="flat">
+              <a:noFill/>
+              <a:miter lim="400000"/>
+            </a:ln>
+            <a:effectLst/>
+          </p:spPr>
+          <p:txBody>
+            <a:bodyPr wrap="square" lIns="71437" tIns="71437" rIns="71437" bIns="71437" numCol="1" anchor="ctr">
+              <a:noAutofit/>
+            </a:bodyPr>
+            <a:lstStyle/>
+            <a:p>
+              <a:pPr algn="ctr">
+                <a:lnSpc>
+                  <a:spcPct val="80000"/>
+                </a:lnSpc>
+                <a:spcBef>
+                  <a:spcPts val="0"/>
+                </a:spcBef>
+                <a:defRPr cap="all" sz="3800">
+                  <a:solidFill>
+                    <a:srgbClr val="FFFFFF"/>
+                  </a:solidFill>
+                  <a:latin typeface="+mn-lt"/>
+                  <a:ea typeface="+mn-ea"/>
+                  <a:cs typeface="+mn-cs"/>
+                  <a:sym typeface="DIN Condensed Bold"/>
+                </a:defRPr>
+              </a:pPr>
+            </a:p>
+          </p:txBody>
+        </p:sp>
+      </p:grpSp>
+      <p:grpSp>
+        <p:nvGrpSpPr>
+          <p:cNvPr id="302" name="Group"/>
+          <p:cNvGrpSpPr/>
+          <p:nvPr/>
+        </p:nvGrpSpPr>
+        <p:grpSpPr>
+          <a:xfrm>
+            <a:off x="1269999" y="8357413"/>
+            <a:ext cx="1800130" cy="1429592"/>
+            <a:chOff x="0" y="413495"/>
+            <a:chExt cx="1800128" cy="1429591"/>
+          </a:xfrm>
+        </p:grpSpPr>
+        <p:sp>
+          <p:nvSpPr>
+            <p:cNvPr id="300" name="commands that use other commands"/>
+            <p:cNvSpPr/>
+            <p:nvPr/>
+          </p:nvSpPr>
+          <p:spPr>
+            <a:xfrm>
+              <a:off x="530128" y="573087"/>
+              <a:ext cx="1270001" cy="1270001"/>
+            </a:xfrm>
+            <a:prstGeom prst="line">
+              <a:avLst/>
+            </a:prstGeom>
+            <a:noFill/>
+            <a:ln w="12700" cap="flat">
+              <a:noFill/>
+              <a:miter lim="400000"/>
+            </a:ln>
+            <a:effectLst/>
+            <a:extLst>
+              <a:ext uri="{C572A759-6A51-4108-AA02-DFA0A04FC94B}">
+                <ma14:wrappingTextBoxFlag xmlns:ma14="http://schemas.microsoft.com/office/mac/drawingml/2011/main" val="1"/>
+              </a:ext>
+            </a:extLst>
+          </p:spPr>
+          <p:txBody>
+            <a:bodyPr wrap="none" lIns="71437" tIns="71437" rIns="71437" bIns="71437" numCol="1" anchor="ctr">
+              <a:spAutoFit/>
+            </a:bodyPr>
+            <a:lstStyle/>
+            <a:p>
+              <a:pPr>
+                <a:defRPr sz="5800">
+                  <a:solidFill>
+                    <a:srgbClr val="FFFFFF"/>
+                  </a:solidFill>
+                  <a:latin typeface="Avenir Next Regular"/>
+                  <a:ea typeface="Avenir Next Regular"/>
+                  <a:cs typeface="Avenir Next Regular"/>
+                  <a:sym typeface="Avenir Next Regular"/>
+                </a:defRPr>
+              </a:pPr>
+              <a:r>
+                <a:rPr b="1"/>
+                <a:t>commands</a:t>
+              </a:r>
+              <a:r>
+                <a:t> that use </a:t>
+              </a:r>
+              <a:r>
+                <a:rPr b="1"/>
+                <a:t>other commands</a:t>
+              </a:r>
+            </a:p>
+          </p:txBody>
+        </p:sp>
+        <p:sp>
+          <p:nvSpPr>
+            <p:cNvPr id="301" name="Square"/>
+            <p:cNvSpPr/>
+            <p:nvPr/>
+          </p:nvSpPr>
+          <p:spPr>
+            <a:xfrm>
+              <a:off x="0" y="413495"/>
+              <a:ext cx="319184" cy="319185"/>
+            </a:xfrm>
+            <a:prstGeom prst="rect">
+              <a:avLst/>
+            </a:prstGeom>
+            <a:solidFill>
+              <a:srgbClr val="9C27B0"/>
+            </a:solidFill>
+            <a:ln w="12700" cap="flat">
+              <a:noFill/>
+              <a:miter lim="400000"/>
+            </a:ln>
+            <a:effectLst/>
+          </p:spPr>
+          <p:txBody>
+            <a:bodyPr wrap="square" lIns="71437" tIns="71437" rIns="71437" bIns="71437" numCol="1" anchor="ctr">
+              <a:noAutofit/>
+            </a:bodyPr>
+            <a:lstStyle/>
+            <a:p>
+              <a:pPr algn="ctr">
+                <a:lnSpc>
+                  <a:spcPct val="80000"/>
+                </a:lnSpc>
+                <a:spcBef>
+                  <a:spcPts val="0"/>
+                </a:spcBef>
+                <a:defRPr cap="all" sz="3800">
+                  <a:solidFill>
+                    <a:srgbClr val="FFFFFF"/>
+                  </a:solidFill>
+                  <a:latin typeface="+mn-lt"/>
+                  <a:ea typeface="+mn-ea"/>
+                  <a:cs typeface="+mn-cs"/>
+                  <a:sym typeface="DIN Condensed Bold"/>
+                </a:defRPr>
+              </a:pPr>
+            </a:p>
+          </p:txBody>
+        </p:sp>
+      </p:grpSp>
+    </p:spTree>
+  </p:cSld>
+  <p:clrMapOvr>
+    <a:masterClrMapping/>
+  </p:clrMapOvr>
+  <mc:AlternateContent xmlns:mc="http://schemas.openxmlformats.org/markup-compatibility/2006">
+    <mc:Choice xmlns:p14="http://schemas.microsoft.com/office/powerpoint/2010/main" Requires="p14">
+      <p:transition spd="fast" advClick="1" p14:dur="699">
+        <p:push dir="l"/>
+      </p:transition>
+    </mc:Choice>
+    <mc:Fallback>
+      <p:transition spd="fast">
+        <p:fade/>
+      </p:transition>
+    </mc:Fallback>
+  </mc:AlternateContent>
+  <p:timing>
+    <p:tnLst>
+      <p:par>
+        <p:cTn id="1" nodeType="tmRoot" restart="never" dur="indefinite" fill="hold">
+          <p:childTnLst>
+            <p:seq concurrent="1" prevAc="none" nextAc="seek">
+              <p:cTn id="2" nodeType="mainSeq" dur="indefinite" fill="hold">
+                <p:childTnLst>
+                  <p:par>
+                    <p:cTn id="3" fill="hold">
+                      <p:stCondLst>
+                        <p:cond delay="indefinite"/>
+                        <p:cond evt="onBegin">
+                          <p:tn val="2"/>
+                        </p:cond>
+                      </p:stCondLst>
+                      <p:childTnLst>
+                        <p:par>
+                          <p:cTn id="4" fill="hold">
+                            <p:stCondLst>
+                              <p:cond delay="0"/>
+                            </p:stCondLst>
+                            <p:childTnLst>
+                              <p:par>
+                                <p:cTn id="5" presetClass="entr" nodeType="afterEffect" presetSubtype="8" presetID="2" grpId="1" fill="hold">
+                                  <p:stCondLst>
+                                    <p:cond delay="0"/>
+                                  </p:stCondLst>
+                                  <p:iterate type="el" backwards="0">
+                                    <p:tmAbs val="0"/>
+                                  </p:iterate>
+                                  <p:childTnLst>
+                                    <p:set>
+                                      <p:cBhvr>
+                                        <p:cTn id="6" fill="hold"/>
+                                        <p:tgtEl>
+                                          <p:spTgt spid="296"/>
+                                        </p:tgtEl>
+                                        <p:attrNameLst>
+                                          <p:attrName>style.visibility</p:attrName>
+                                        </p:attrNameLst>
+                                      </p:cBhvr>
+                                      <p:to>
+                                        <p:strVal val="visible"/>
+                                      </p:to>
+                                    </p:set>
+                                    <p:anim calcmode="lin" valueType="num">
+                                      <p:cBhvr>
+                                        <p:cTn id="7" dur="600" fill="hold"/>
+                                        <p:tgtEl>
+                                          <p:spTgt spid="296"/>
+                                        </p:tgtEl>
+                                        <p:attrNameLst>
+                                          <p:attrName>ppt_x</p:attrName>
+                                        </p:attrNameLst>
+                                      </p:cBhvr>
+                                      <p:tavLst>
+                                        <p:tav tm="0">
+                                          <p:val>
+                                            <p:strVal val="0-#ppt_w/2"/>
+                                          </p:val>
+                                        </p:tav>
+                                        <p:tav tm="100000">
+                                          <p:val>
+                                            <p:strVal val="#ppt_x"/>
+                                          </p:val>
+                                        </p:tav>
+                                      </p:tavLst>
+                                    </p:anim>
+                                    <p:anim calcmode="lin" valueType="num">
+                                      <p:cBhvr>
+                                        <p:cTn id="8" dur="600" fill="hold"/>
+                                        <p:tgtEl>
+                                          <p:spTgt spid="296"/>
+                                        </p:tgtEl>
+                                        <p:attrNameLst>
+                                          <p:attrName>ppt_y</p:attrName>
+                                        </p:attrNameLst>
+                                      </p:cBhvr>
+                                      <p:tavLst>
+                                        <p:tav tm="0">
+                                          <p:val>
+                                            <p:strVal val="#ppt_y"/>
+                                          </p:val>
+                                        </p:tav>
+                                        <p:tav tm="100000">
+                                          <p:val>
+                                            <p:strVal val="#ppt_y"/>
+                                          </p:val>
+                                        </p:tav>
+                                      </p:tavLst>
+                                    </p:anim>
+                                  </p:childTnLst>
+                                </p:cTn>
+                              </p:par>
+                            </p:childTnLst>
+                          </p:cTn>
+                        </p:par>
+                        <p:par>
+                          <p:cTn id="9" fill="hold">
+                            <p:stCondLst>
+                              <p:cond delay="600"/>
+                            </p:stCondLst>
+                            <p:childTnLst>
+                              <p:par>
+                                <p:cTn id="10" presetClass="entr" nodeType="afterEffect" presetSubtype="8" presetID="2" grpId="2" fill="hold">
+                                  <p:stCondLst>
+                                    <p:cond delay="0"/>
+                                  </p:stCondLst>
+                                  <p:iterate type="el" backwards="0">
+                                    <p:tmAbs val="0"/>
+                                  </p:iterate>
+                                  <p:childTnLst>
+                                    <p:set>
+                                      <p:cBhvr>
+                                        <p:cTn id="11" fill="hold"/>
+                                        <p:tgtEl>
+                                          <p:spTgt spid="299"/>
+                                        </p:tgtEl>
+                                        <p:attrNameLst>
+                                          <p:attrName>style.visibility</p:attrName>
+                                        </p:attrNameLst>
+                                      </p:cBhvr>
+                                      <p:to>
+                                        <p:strVal val="visible"/>
+                                      </p:to>
+                                    </p:set>
+                                    <p:anim calcmode="lin" valueType="num">
+                                      <p:cBhvr>
+                                        <p:cTn id="12" dur="600" fill="hold"/>
+                                        <p:tgtEl>
+                                          <p:spTgt spid="299"/>
+                                        </p:tgtEl>
+                                        <p:attrNameLst>
+                                          <p:attrName>ppt_x</p:attrName>
+                                        </p:attrNameLst>
+                                      </p:cBhvr>
+                                      <p:tavLst>
+                                        <p:tav tm="0">
+                                          <p:val>
+                                            <p:strVal val="0-#ppt_w/2"/>
+                                          </p:val>
+                                        </p:tav>
+                                        <p:tav tm="100000">
+                                          <p:val>
+                                            <p:strVal val="#ppt_x"/>
+                                          </p:val>
+                                        </p:tav>
+                                      </p:tavLst>
+                                    </p:anim>
+                                    <p:anim calcmode="lin" valueType="num">
+                                      <p:cBhvr>
+                                        <p:cTn id="13" dur="600" fill="hold"/>
+                                        <p:tgtEl>
+                                          <p:spTgt spid="299"/>
+                                        </p:tgtEl>
+                                        <p:attrNameLst>
+                                          <p:attrName>ppt_y</p:attrName>
+                                        </p:attrNameLst>
+                                      </p:cBhvr>
+                                      <p:tavLst>
+                                        <p:tav tm="0">
+                                          <p:val>
+                                            <p:strVal val="#ppt_y"/>
+                                          </p:val>
+                                        </p:tav>
+                                        <p:tav tm="100000">
+                                          <p:val>
+                                            <p:strVal val="#ppt_y"/>
+                                          </p:val>
+                                        </p:tav>
+                                      </p:tavLst>
+                                    </p:anim>
+                                  </p:childTnLst>
+                                </p:cTn>
+                              </p:par>
+                            </p:childTnLst>
+                          </p:cTn>
+                        </p:par>
+                        <p:par>
+                          <p:cTn id="14" fill="hold">
+                            <p:stCondLst>
+                              <p:cond delay="1200"/>
+                            </p:stCondLst>
+                            <p:childTnLst>
+                              <p:par>
+                                <p:cTn id="15" presetClass="entr" nodeType="afterEffect" presetSubtype="8" presetID="2" grpId="3" fill="hold">
+                                  <p:stCondLst>
+                                    <p:cond delay="0"/>
+                                  </p:stCondLst>
+                                  <p:iterate type="el" backwards="0">
+                                    <p:tmAbs val="0"/>
+                                  </p:iterate>
+                                  <p:childTnLst>
+                                    <p:set>
+                                      <p:cBhvr>
+                                        <p:cTn id="16" fill="hold"/>
+                                        <p:tgtEl>
+                                          <p:spTgt spid="302"/>
+                                        </p:tgtEl>
+                                        <p:attrNameLst>
+                                          <p:attrName>style.visibility</p:attrName>
+                                        </p:attrNameLst>
+                                      </p:cBhvr>
+                                      <p:to>
+                                        <p:strVal val="visible"/>
+                                      </p:to>
+                                    </p:set>
+                                    <p:anim calcmode="lin" valueType="num">
+                                      <p:cBhvr>
+                                        <p:cTn id="17" dur="600" fill="hold"/>
+                                        <p:tgtEl>
+                                          <p:spTgt spid="302"/>
+                                        </p:tgtEl>
+                                        <p:attrNameLst>
+                                          <p:attrName>ppt_x</p:attrName>
+                                        </p:attrNameLst>
+                                      </p:cBhvr>
+                                      <p:tavLst>
+                                        <p:tav tm="0">
+                                          <p:val>
+                                            <p:strVal val="0-#ppt_w/2"/>
+                                          </p:val>
+                                        </p:tav>
+                                        <p:tav tm="100000">
+                                          <p:val>
+                                            <p:strVal val="#ppt_x"/>
+                                          </p:val>
+                                        </p:tav>
+                                      </p:tavLst>
+                                    </p:anim>
+                                    <p:anim calcmode="lin" valueType="num">
+                                      <p:cBhvr>
+                                        <p:cTn id="18" dur="600" fill="hold"/>
+                                        <p:tgtEl>
+                                          <p:spTgt spid="302"/>
+                                        </p:tgtEl>
+                                        <p:attrNameLst>
+                                          <p:attrName>ppt_y</p:attrName>
+                                        </p:attrNameLst>
+                                      </p:cBhvr>
+                                      <p:tavLst>
+                                        <p:tav tm="0">
+                                          <p:val>
+                                            <p:strVal val="#ppt_y"/>
+                                          </p:val>
+                                        </p:tav>
+                                        <p:tav tm="100000">
+                                          <p:val>
+                                            <p:strVal val="#ppt_y"/>
+                                          </p:val>
+                                        </p:tav>
+                                      </p:tavLst>
+                                    </p:anim>
+                                  </p:childTnLst>
+                                </p:cTn>
+                              </p:par>
+                            </p:childTnLst>
+                          </p:cTn>
+                        </p:par>
+                      </p:childTnLst>
+                    </p:cTn>
+                  </p:par>
+                </p:childTnLst>
+              </p:cTn>
+              <p:prevCondLst>
+                <p:cond evt="onPrev">
+                  <p:tgtEl>
+                    <p:sldTgt/>
+                  </p:tgtEl>
+                </p:cond>
+              </p:prevCondLst>
+              <p:nextCondLst>
+                <p:cond evt="onNext">
+                  <p:tgtEl>
+                    <p:sldTgt/>
+                  </p:tgtEl>
+                </p:cond>
+              </p:nextCondLst>
+            </p:seq>
+          </p:childTnLst>
+        </p:cTn>
+      </p:par>
+    </p:tnLst>
+    <p:bldLst>
+      <p:bldP build="whole" bldLvl="1" animBg="1" rev="0" advAuto="0" spid="299" grpId="2"/>
+      <p:bldP build="whole" bldLvl="1" animBg="1" rev="0" advAuto="0" spid="302" grpId="3"/>
+      <p:bldP build="whole" bldLvl="1" animBg="1" rev="0" advAuto="0" spid="296" grpId="1"/>
+    </p:bldLst>
+  </p:timing>
+</p:sld>
+</file>
+
+<file path=ppt/slides/slide11.xml><?xml version="1.0" encoding="utf-8"?>
+<p:sld xmlns:a="http://schemas.openxmlformats.org/drawingml/2006/main" xmlns:r="http://schemas.openxmlformats.org/officeDocument/2006/relationships" xmlns:p="http://schemas.openxmlformats.org/presentationml/2006/main" xmlns:m="http://schemas.openxmlformats.org/officeDocument/2006/math" xmlns:a14="http://schemas.microsoft.com/office/drawing/2010/main" showMasterSp="1" showMasterPhAnim="1">
+  <p:cSld>
+    <p:bg>
+      <p:bgPr>
+        <a:solidFill>
+          <a:srgbClr val="002833"/>
+        </a:solidFill>
+      </p:bgPr>
+    </p:bg>
+    <p:spTree>
+      <p:nvGrpSpPr>
+        <p:cNvPr id="1" name=""/>
+        <p:cNvGrpSpPr/>
+        <p:nvPr/>
+      </p:nvGrpSpPr>
+      <p:grpSpPr>
+        <a:xfrm>
+          <a:off x="0" y="0"/>
+          <a:ext cx="0" cy="0"/>
+          <a:chOff x="0" y="0"/>
+          <a:chExt cx="0" cy="0"/>
+        </a:xfrm>
+      </p:grpSpPr>
+      <p:sp>
+        <p:nvSpPr>
+          <p:cNvPr id="304" name="Title 6"/>
+          <p:cNvSpPr txBox="1"/>
+          <p:nvPr>
+            <p:ph type="title"/>
+          </p:nvPr>
+        </p:nvSpPr>
+        <p:spPr>
+          <a:xfrm>
+            <a:off x="5015634" y="1119893"/>
+            <a:ext cx="14352732" cy="1288881"/>
+          </a:xfrm>
+          <a:prstGeom prst="rect">
+            <a:avLst/>
+          </a:prstGeom>
+        </p:spPr>
+        <p:txBody>
+          <a:bodyPr/>
+          <a:lstStyle>
+            <a:lvl1pPr algn="ctr">
+              <a:defRPr sz="8000">
+                <a:solidFill>
+                  <a:srgbClr val="66C2FF"/>
+                </a:solidFill>
+              </a:defRPr>
+            </a:lvl1pPr>
+          </a:lstStyle>
+          <a:p>
+            <a:pPr/>
+            <a:r>
+              <a:t>Elegant approach</a:t>
+            </a:r>
+          </a:p>
+        </p:txBody>
+      </p:sp>
+      <p:pic>
+        <p:nvPicPr>
+          <p:cNvPr id="305" name="stopwatch (2).png" descr="stopwatch (2).png"/>
+          <p:cNvPicPr>
+            <a:picLocks noChangeAspect="1"/>
+          </p:cNvPicPr>
+          <p:nvPr/>
+        </p:nvPicPr>
+        <p:blipFill>
+          <a:blip r:embed="rId2">
+            <a:extLst/>
+          </a:blip>
+          <a:stretch>
+            <a:fillRect/>
+          </a:stretch>
+        </p:blipFill>
+        <p:spPr>
+          <a:xfrm>
+            <a:off x="22225000" y="2032000"/>
+            <a:ext cx="1270000" cy="1485243"/>
+          </a:xfrm>
+          <a:prstGeom prst="rect">
+            <a:avLst/>
+          </a:prstGeom>
+          <a:ln w="12700">
+            <a:miter lim="400000"/>
+          </a:ln>
+        </p:spPr>
+      </p:pic>
+      <p:grpSp>
+        <p:nvGrpSpPr>
+          <p:cNvPr id="308" name="Group"/>
+          <p:cNvGrpSpPr/>
+          <p:nvPr/>
+        </p:nvGrpSpPr>
+        <p:grpSpPr>
+          <a:xfrm>
+            <a:off x="1269999" y="5387907"/>
+            <a:ext cx="14221882" cy="1146176"/>
+            <a:chOff x="0" y="0"/>
+            <a:chExt cx="14221880" cy="1146175"/>
+          </a:xfrm>
+        </p:grpSpPr>
+        <p:sp>
+          <p:nvSpPr>
+            <p:cNvPr id="306" name="map commands to functions in 1 place"/>
+            <p:cNvSpPr txBox="1"/>
+            <p:nvPr/>
+          </p:nvSpPr>
+          <p:spPr>
+            <a:xfrm>
+              <a:off x="544538" y="0"/>
+              <a:ext cx="13677343" cy="1146176"/>
+            </a:xfrm>
+            <a:prstGeom prst="rect">
+              <a:avLst/>
+            </a:prstGeom>
+            <a:noFill/>
+            <a:ln w="12700" cap="flat">
+              <a:noFill/>
+              <a:miter lim="400000"/>
+            </a:ln>
+            <a:effectLst/>
+            <a:extLst>
+              <a:ext uri="{C572A759-6A51-4108-AA02-DFA0A04FC94B}">
+                <ma14:wrappingTextBoxFlag xmlns:ma14="http://schemas.microsoft.com/office/mac/drawingml/2011/main" val="1"/>
+              </a:ext>
+            </a:extLst>
+          </p:spPr>
+          <p:txBody>
+            <a:bodyPr wrap="none" lIns="71437" tIns="71437" rIns="71437" bIns="71437" numCol="1" anchor="ctr">
+              <a:spAutoFit/>
+            </a:bodyPr>
+            <a:lstStyle/>
+            <a:p>
+              <a:pPr>
+                <a:defRPr sz="5800">
+                  <a:solidFill>
+                    <a:srgbClr val="FFFFFF"/>
+                  </a:solidFill>
+                  <a:latin typeface="Avenir Next Regular"/>
+                  <a:ea typeface="Avenir Next Regular"/>
+                  <a:cs typeface="Avenir Next Regular"/>
+                  <a:sym typeface="Avenir Next Regular"/>
+                </a:defRPr>
+              </a:pPr>
+              <a:r>
+                <a:t>map </a:t>
+              </a:r>
+              <a:r>
+                <a:rPr b="1"/>
+                <a:t>commands</a:t>
+              </a:r>
+              <a:r>
+                <a:t> to </a:t>
+              </a:r>
+              <a:r>
+                <a:rPr b="1"/>
+                <a:t>functions</a:t>
+              </a:r>
+              <a:r>
+                <a:t> in </a:t>
+              </a:r>
+              <a:r>
+                <a:rPr b="1"/>
+                <a:t>1 place</a:t>
+              </a:r>
+            </a:p>
+          </p:txBody>
+        </p:sp>
+        <p:sp>
+          <p:nvSpPr>
+            <p:cNvPr id="307" name="Square"/>
+            <p:cNvSpPr/>
+            <p:nvPr/>
+          </p:nvSpPr>
+          <p:spPr>
+            <a:xfrm>
+              <a:off x="0" y="413495"/>
+              <a:ext cx="319184" cy="319185"/>
+            </a:xfrm>
+            <a:prstGeom prst="rect">
+              <a:avLst/>
+            </a:prstGeom>
+            <a:solidFill>
+              <a:srgbClr val="00C853"/>
+            </a:solidFill>
+            <a:ln w="12700" cap="flat">
+              <a:noFill/>
+              <a:miter lim="400000"/>
+            </a:ln>
+            <a:effectLst/>
+          </p:spPr>
+          <p:txBody>
+            <a:bodyPr wrap="square" lIns="71437" tIns="71437" rIns="71437" bIns="71437" numCol="1" anchor="ctr">
+              <a:noAutofit/>
+            </a:bodyPr>
+            <a:lstStyle/>
+            <a:p>
+              <a:pPr algn="ctr">
+                <a:lnSpc>
+                  <a:spcPct val="80000"/>
+                </a:lnSpc>
+                <a:spcBef>
+                  <a:spcPts val="0"/>
+                </a:spcBef>
+                <a:defRPr cap="all" sz="3800">
+                  <a:solidFill>
+                    <a:srgbClr val="FFFFFF"/>
+                  </a:solidFill>
+                  <a:latin typeface="+mn-lt"/>
+                  <a:ea typeface="+mn-ea"/>
+                  <a:cs typeface="+mn-cs"/>
+                  <a:sym typeface="DIN Condensed Bold"/>
+                </a:defRPr>
+              </a:pPr>
+            </a:p>
+          </p:txBody>
+        </p:sp>
+      </p:grpSp>
+      <p:grpSp>
+        <p:nvGrpSpPr>
+          <p:cNvPr id="311" name="Group"/>
+          <p:cNvGrpSpPr/>
+          <p:nvPr/>
+        </p:nvGrpSpPr>
+        <p:grpSpPr>
+          <a:xfrm>
+            <a:off x="1269999" y="6665912"/>
+            <a:ext cx="20568749" cy="1146176"/>
+            <a:chOff x="0" y="0"/>
+            <a:chExt cx="20568747" cy="1146175"/>
+          </a:xfrm>
+        </p:grpSpPr>
+        <p:sp>
+          <p:nvSpPr>
+            <p:cNvPr id="309" name="command switch that loops over the declared commands"/>
+            <p:cNvSpPr txBox="1"/>
+            <p:nvPr/>
+          </p:nvSpPr>
+          <p:spPr>
+            <a:xfrm>
+              <a:off x="530128" y="0"/>
+              <a:ext cx="20038620" cy="1146176"/>
+            </a:xfrm>
+            <a:prstGeom prst="rect">
+              <a:avLst/>
+            </a:prstGeom>
+            <a:noFill/>
+            <a:ln w="12700" cap="flat">
+              <a:noFill/>
+              <a:miter lim="400000"/>
+            </a:ln>
+            <a:effectLst/>
+            <a:extLst>
+              <a:ext uri="{C572A759-6A51-4108-AA02-DFA0A04FC94B}">
+                <ma14:wrappingTextBoxFlag xmlns:ma14="http://schemas.microsoft.com/office/mac/drawingml/2011/main" val="1"/>
+              </a:ext>
+            </a:extLst>
+          </p:spPr>
+          <p:txBody>
+            <a:bodyPr wrap="none" lIns="71437" tIns="71437" rIns="71437" bIns="71437" numCol="1" anchor="ctr">
+              <a:spAutoFit/>
+            </a:bodyPr>
+            <a:lstStyle/>
+            <a:p>
+              <a:pPr>
+                <a:defRPr sz="5800">
+                  <a:solidFill>
+                    <a:srgbClr val="FFFFFF"/>
+                  </a:solidFill>
+                  <a:latin typeface="Avenir Next Regular"/>
+                  <a:ea typeface="Avenir Next Regular"/>
+                  <a:cs typeface="Avenir Next Regular"/>
+                  <a:sym typeface="Avenir Next Regular"/>
+                </a:defRPr>
+              </a:pPr>
+              <a:r>
+                <a:t>command </a:t>
+              </a:r>
+              <a:r>
+                <a:rPr b="1"/>
+                <a:t>switch</a:t>
+              </a:r>
+              <a:r>
+                <a:t> that </a:t>
+              </a:r>
+              <a:r>
+                <a:rPr b="1"/>
+                <a:t>loops</a:t>
+              </a:r>
+              <a:r>
+                <a:t> over the </a:t>
+              </a:r>
+              <a:r>
+                <a:rPr b="1"/>
+                <a:t>declared commands</a:t>
+              </a:r>
+            </a:p>
+          </p:txBody>
+        </p:sp>
+        <p:sp>
+          <p:nvSpPr>
+            <p:cNvPr id="310" name="Square"/>
+            <p:cNvSpPr/>
+            <p:nvPr/>
+          </p:nvSpPr>
+          <p:spPr>
+            <a:xfrm>
+              <a:off x="0" y="413495"/>
+              <a:ext cx="319184" cy="319185"/>
+            </a:xfrm>
+            <a:prstGeom prst="rect">
+              <a:avLst/>
+            </a:prstGeom>
+            <a:solidFill>
+              <a:srgbClr val="00C853"/>
+            </a:solidFill>
+            <a:ln w="12700" cap="flat">
+              <a:noFill/>
+              <a:miter lim="400000"/>
+            </a:ln>
+            <a:effectLst/>
+          </p:spPr>
+          <p:txBody>
+            <a:bodyPr wrap="square" lIns="71437" tIns="71437" rIns="71437" bIns="71437" numCol="1" anchor="ctr">
+              <a:noAutofit/>
+            </a:bodyPr>
+            <a:lstStyle/>
+            <a:p>
+              <a:pPr algn="ctr">
+                <a:lnSpc>
+                  <a:spcPct val="80000"/>
+                </a:lnSpc>
+                <a:spcBef>
+                  <a:spcPts val="0"/>
+                </a:spcBef>
+                <a:defRPr cap="all" sz="3800">
+                  <a:solidFill>
+                    <a:srgbClr val="FFFFFF"/>
+                  </a:solidFill>
+                  <a:latin typeface="+mn-lt"/>
+                  <a:ea typeface="+mn-ea"/>
+                  <a:cs typeface="+mn-cs"/>
+                  <a:sym typeface="DIN Condensed Bold"/>
+                </a:defRPr>
+              </a:pPr>
+            </a:p>
+          </p:txBody>
+        </p:sp>
+      </p:grpSp>
+      <p:grpSp>
+        <p:nvGrpSpPr>
+          <p:cNvPr id="314" name="Group"/>
+          <p:cNvGrpSpPr/>
+          <p:nvPr/>
+        </p:nvGrpSpPr>
+        <p:grpSpPr>
+          <a:xfrm>
+            <a:off x="1269999" y="7943917"/>
+            <a:ext cx="17110413" cy="1146176"/>
+            <a:chOff x="0" y="0"/>
+            <a:chExt cx="17110410" cy="1146175"/>
+          </a:xfrm>
+        </p:grpSpPr>
+        <p:sp>
+          <p:nvSpPr>
+            <p:cNvPr id="312" name="create each command as an individual function"/>
+            <p:cNvSpPr txBox="1"/>
+            <p:nvPr/>
+          </p:nvSpPr>
+          <p:spPr>
+            <a:xfrm>
+              <a:off x="530128" y="0"/>
+              <a:ext cx="16580283" cy="1146176"/>
+            </a:xfrm>
+            <a:prstGeom prst="rect">
+              <a:avLst/>
+            </a:prstGeom>
+            <a:noFill/>
+            <a:ln w="12700" cap="flat">
+              <a:noFill/>
+              <a:miter lim="400000"/>
+            </a:ln>
+            <a:effectLst/>
+            <a:extLst>
+              <a:ext uri="{C572A759-6A51-4108-AA02-DFA0A04FC94B}">
+                <ma14:wrappingTextBoxFlag xmlns:ma14="http://schemas.microsoft.com/office/mac/drawingml/2011/main" val="1"/>
+              </a:ext>
+            </a:extLst>
+          </p:spPr>
+          <p:txBody>
+            <a:bodyPr wrap="none" lIns="71437" tIns="71437" rIns="71437" bIns="71437" numCol="1" anchor="ctr">
+              <a:spAutoFit/>
+            </a:bodyPr>
+            <a:lstStyle/>
+            <a:p>
+              <a:pPr>
+                <a:defRPr sz="5800">
+                  <a:solidFill>
+                    <a:srgbClr val="FFFFFF"/>
+                  </a:solidFill>
+                  <a:latin typeface="Avenir Next Regular"/>
+                  <a:ea typeface="Avenir Next Regular"/>
+                  <a:cs typeface="Avenir Next Regular"/>
+                  <a:sym typeface="Avenir Next Regular"/>
+                </a:defRPr>
+              </a:pPr>
+              <a:r>
+                <a:t>create each </a:t>
+              </a:r>
+              <a:r>
+                <a:rPr b="1"/>
+                <a:t>command</a:t>
+              </a:r>
+              <a:r>
+                <a:t> as an </a:t>
+              </a:r>
+              <a:r>
+                <a:rPr b="1"/>
+                <a:t>individual function</a:t>
+              </a:r>
+            </a:p>
+          </p:txBody>
+        </p:sp>
+        <p:sp>
+          <p:nvSpPr>
+            <p:cNvPr id="313" name="Square"/>
+            <p:cNvSpPr/>
+            <p:nvPr/>
+          </p:nvSpPr>
+          <p:spPr>
+            <a:xfrm>
+              <a:off x="0" y="413495"/>
+              <a:ext cx="319184" cy="319185"/>
+            </a:xfrm>
+            <a:prstGeom prst="rect">
+              <a:avLst/>
+            </a:prstGeom>
+            <a:solidFill>
+              <a:srgbClr val="00C853"/>
+            </a:solidFill>
+            <a:ln w="12700" cap="flat">
+              <a:noFill/>
+              <a:miter lim="400000"/>
+            </a:ln>
+            <a:effectLst/>
+          </p:spPr>
+          <p:txBody>
+            <a:bodyPr wrap="square" lIns="71437" tIns="71437" rIns="71437" bIns="71437" numCol="1" anchor="ctr">
+              <a:noAutofit/>
+            </a:bodyPr>
+            <a:lstStyle/>
+            <a:p>
+              <a:pPr algn="ctr">
+                <a:lnSpc>
+                  <a:spcPct val="80000"/>
+                </a:lnSpc>
+                <a:spcBef>
+                  <a:spcPts val="0"/>
+                </a:spcBef>
+                <a:defRPr cap="all" sz="3800">
+                  <a:solidFill>
+                    <a:srgbClr val="FFFFFF"/>
+                  </a:solidFill>
+                  <a:latin typeface="+mn-lt"/>
+                  <a:ea typeface="+mn-ea"/>
+                  <a:cs typeface="+mn-cs"/>
+                  <a:sym typeface="DIN Condensed Bold"/>
+                </a:defRPr>
+              </a:pPr>
+            </a:p>
+          </p:txBody>
+        </p:sp>
+      </p:grpSp>
+    </p:spTree>
+  </p:cSld>
+  <p:clrMapOvr>
+    <a:masterClrMapping/>
+  </p:clrMapOvr>
+  <mc:AlternateContent xmlns:mc="http://schemas.openxmlformats.org/markup-compatibility/2006">
+    <mc:Choice xmlns:p14="http://schemas.microsoft.com/office/powerpoint/2010/main" Requires="p14">
+      <p:transition spd="fast" advClick="1" p14:dur="699">
+        <p:push dir="l"/>
+      </p:transition>
+    </mc:Choice>
+    <mc:Fallback>
+      <p:transition spd="fast">
+        <p:fade/>
+      </p:transition>
+    </mc:Fallback>
+  </mc:AlternateContent>
+  <p:timing>
+    <p:tnLst>
+      <p:par>
+        <p:cTn id="1" nodeType="tmRoot" restart="never" dur="indefinite" fill="hold">
+          <p:childTnLst>
+            <p:seq concurrent="1" prevAc="none" nextAc="seek">
+              <p:cTn id="2" nodeType="mainSeq" dur="indefinite" fill="hold">
+                <p:childTnLst>
+                  <p:par>
+                    <p:cTn id="3" fill="hold">
+                      <p:stCondLst>
+                        <p:cond delay="indefinite"/>
+                        <p:cond evt="onBegin">
+                          <p:tn val="2"/>
+                        </p:cond>
+                      </p:stCondLst>
+                      <p:childTnLst>
+                        <p:par>
+                          <p:cTn id="4" fill="hold">
+                            <p:stCondLst>
+                              <p:cond delay="0"/>
+                            </p:stCondLst>
+                            <p:childTnLst>
+                              <p:par>
+                                <p:cTn id="5" presetClass="entr" nodeType="afterEffect" presetSubtype="8" presetID="2" grpId="1" fill="hold">
+                                  <p:stCondLst>
+                                    <p:cond delay="0"/>
+                                  </p:stCondLst>
+                                  <p:iterate type="el" backwards="0">
+                                    <p:tmAbs val="0"/>
+                                  </p:iterate>
+                                  <p:childTnLst>
+                                    <p:set>
+                                      <p:cBhvr>
+                                        <p:cTn id="6" fill="hold"/>
+                                        <p:tgtEl>
+                                          <p:spTgt spid="308"/>
+                                        </p:tgtEl>
+                                        <p:attrNameLst>
+                                          <p:attrName>style.visibility</p:attrName>
+                                        </p:attrNameLst>
+                                      </p:cBhvr>
+                                      <p:to>
+                                        <p:strVal val="visible"/>
+                                      </p:to>
+                                    </p:set>
+                                    <p:anim calcmode="lin" valueType="num">
+                                      <p:cBhvr>
+                                        <p:cTn id="7" dur="600" fill="hold"/>
+                                        <p:tgtEl>
+                                          <p:spTgt spid="308"/>
+                                        </p:tgtEl>
+                                        <p:attrNameLst>
+                                          <p:attrName>ppt_x</p:attrName>
+                                        </p:attrNameLst>
+                                      </p:cBhvr>
+                                      <p:tavLst>
+                                        <p:tav tm="0">
+                                          <p:val>
+                                            <p:strVal val="0-#ppt_w/2"/>
+                                          </p:val>
+                                        </p:tav>
+                                        <p:tav tm="100000">
+                                          <p:val>
+                                            <p:strVal val="#ppt_x"/>
+                                          </p:val>
+                                        </p:tav>
+                                      </p:tavLst>
+                                    </p:anim>
+                                    <p:anim calcmode="lin" valueType="num">
+                                      <p:cBhvr>
+                                        <p:cTn id="8" dur="600" fill="hold"/>
+                                        <p:tgtEl>
+                                          <p:spTgt spid="308"/>
+                                        </p:tgtEl>
+                                        <p:attrNameLst>
+                                          <p:attrName>ppt_y</p:attrName>
+                                        </p:attrNameLst>
+                                      </p:cBhvr>
+                                      <p:tavLst>
+                                        <p:tav tm="0">
+                                          <p:val>
+                                            <p:strVal val="#ppt_y"/>
+                                          </p:val>
+                                        </p:tav>
+                                        <p:tav tm="100000">
+                                          <p:val>
+                                            <p:strVal val="#ppt_y"/>
+                                          </p:val>
+                                        </p:tav>
+                                      </p:tavLst>
+                                    </p:anim>
+                                  </p:childTnLst>
+                                </p:cTn>
+                              </p:par>
+                            </p:childTnLst>
+                          </p:cTn>
+                        </p:par>
+                        <p:par>
+                          <p:cTn id="9" fill="hold">
+                            <p:stCondLst>
+                              <p:cond delay="600"/>
+                            </p:stCondLst>
+                            <p:childTnLst>
+                              <p:par>
+                                <p:cTn id="10" presetClass="entr" nodeType="afterEffect" presetSubtype="8" presetID="2" grpId="2" fill="hold">
+                                  <p:stCondLst>
+                                    <p:cond delay="0"/>
+                                  </p:stCondLst>
+                                  <p:iterate type="el" backwards="0">
+                                    <p:tmAbs val="0"/>
+                                  </p:iterate>
+                                  <p:childTnLst>
+                                    <p:set>
+                                      <p:cBhvr>
+                                        <p:cTn id="11" fill="hold"/>
+                                        <p:tgtEl>
+                                          <p:spTgt spid="311"/>
+                                        </p:tgtEl>
+                                        <p:attrNameLst>
+                                          <p:attrName>style.visibility</p:attrName>
+                                        </p:attrNameLst>
+                                      </p:cBhvr>
+                                      <p:to>
+                                        <p:strVal val="visible"/>
+                                      </p:to>
+                                    </p:set>
+                                    <p:anim calcmode="lin" valueType="num">
+                                      <p:cBhvr>
+                                        <p:cTn id="12" dur="600" fill="hold"/>
+                                        <p:tgtEl>
+                                          <p:spTgt spid="311"/>
+                                        </p:tgtEl>
+                                        <p:attrNameLst>
+                                          <p:attrName>ppt_x</p:attrName>
+                                        </p:attrNameLst>
+                                      </p:cBhvr>
+                                      <p:tavLst>
+                                        <p:tav tm="0">
+                                          <p:val>
+                                            <p:strVal val="0-#ppt_w/2"/>
+                                          </p:val>
+                                        </p:tav>
+                                        <p:tav tm="100000">
+                                          <p:val>
+                                            <p:strVal val="#ppt_x"/>
+                                          </p:val>
+                                        </p:tav>
+                                      </p:tavLst>
+                                    </p:anim>
+                                    <p:anim calcmode="lin" valueType="num">
+                                      <p:cBhvr>
+                                        <p:cTn id="13" dur="600" fill="hold"/>
+                                        <p:tgtEl>
+                                          <p:spTgt spid="311"/>
+                                        </p:tgtEl>
+                                        <p:attrNameLst>
+                                          <p:attrName>ppt_y</p:attrName>
+                                        </p:attrNameLst>
+                                      </p:cBhvr>
+                                      <p:tavLst>
+                                        <p:tav tm="0">
+                                          <p:val>
+                                            <p:strVal val="#ppt_y"/>
+                                          </p:val>
+                                        </p:tav>
+                                        <p:tav tm="100000">
+                                          <p:val>
+                                            <p:strVal val="#ppt_y"/>
+                                          </p:val>
+                                        </p:tav>
+                                      </p:tavLst>
+                                    </p:anim>
+                                  </p:childTnLst>
+                                </p:cTn>
+                              </p:par>
+                            </p:childTnLst>
+                          </p:cTn>
+                        </p:par>
+                        <p:par>
+                          <p:cTn id="14" fill="hold">
+                            <p:stCondLst>
+                              <p:cond delay="1200"/>
+                            </p:stCondLst>
+                            <p:childTnLst>
+                              <p:par>
+                                <p:cTn id="15" presetClass="entr" nodeType="afterEffect" presetSubtype="8" presetID="2" grpId="3" fill="hold">
+                                  <p:stCondLst>
+                                    <p:cond delay="0"/>
+                                  </p:stCondLst>
+                                  <p:iterate type="el" backwards="0">
+                                    <p:tmAbs val="0"/>
+                                  </p:iterate>
+                                  <p:childTnLst>
+                                    <p:set>
+                                      <p:cBhvr>
+                                        <p:cTn id="16" fill="hold"/>
+                                        <p:tgtEl>
+                                          <p:spTgt spid="314"/>
+                                        </p:tgtEl>
+                                        <p:attrNameLst>
+                                          <p:attrName>style.visibility</p:attrName>
+                                        </p:attrNameLst>
+                                      </p:cBhvr>
+                                      <p:to>
+                                        <p:strVal val="visible"/>
+                                      </p:to>
+                                    </p:set>
+                                    <p:anim calcmode="lin" valueType="num">
+                                      <p:cBhvr>
+                                        <p:cTn id="17" dur="600" fill="hold"/>
+                                        <p:tgtEl>
+                                          <p:spTgt spid="314"/>
+                                        </p:tgtEl>
+                                        <p:attrNameLst>
+                                          <p:attrName>ppt_x</p:attrName>
+                                        </p:attrNameLst>
+                                      </p:cBhvr>
+                                      <p:tavLst>
+                                        <p:tav tm="0">
+                                          <p:val>
+                                            <p:strVal val="0-#ppt_w/2"/>
+                                          </p:val>
+                                        </p:tav>
+                                        <p:tav tm="100000">
+                                          <p:val>
+                                            <p:strVal val="#ppt_x"/>
+                                          </p:val>
+                                        </p:tav>
+                                      </p:tavLst>
+                                    </p:anim>
+                                    <p:anim calcmode="lin" valueType="num">
+                                      <p:cBhvr>
+                                        <p:cTn id="18" dur="600" fill="hold"/>
+                                        <p:tgtEl>
+                                          <p:spTgt spid="314"/>
+                                        </p:tgtEl>
+                                        <p:attrNameLst>
+                                          <p:attrName>ppt_y</p:attrName>
+                                        </p:attrNameLst>
+                                      </p:cBhvr>
+                                      <p:tavLst>
+                                        <p:tav tm="0">
+                                          <p:val>
+                                            <p:strVal val="#ppt_y"/>
+                                          </p:val>
+                                        </p:tav>
+                                        <p:tav tm="100000">
+                                          <p:val>
+                                            <p:strVal val="#ppt_y"/>
+                                          </p:val>
+                                        </p:tav>
+                                      </p:tavLst>
+                                    </p:anim>
+                                  </p:childTnLst>
+                                </p:cTn>
+                              </p:par>
+                            </p:childTnLst>
+                          </p:cTn>
+                        </p:par>
+                      </p:childTnLst>
+                    </p:cTn>
+                  </p:par>
+                </p:childTnLst>
+              </p:cTn>
+              <p:prevCondLst>
+                <p:cond evt="onPrev">
+                  <p:tgtEl>
+                    <p:sldTgt/>
+                  </p:tgtEl>
+                </p:cond>
+              </p:prevCondLst>
+              <p:nextCondLst>
+                <p:cond evt="onNext">
+                  <p:tgtEl>
+                    <p:sldTgt/>
+                  </p:tgtEl>
+                </p:cond>
+              </p:nextCondLst>
+            </p:seq>
+          </p:childTnLst>
+        </p:cTn>
+      </p:par>
+    </p:tnLst>
+    <p:bldLst>
+      <p:bldP build="whole" bldLvl="1" animBg="1" rev="0" advAuto="0" spid="314" grpId="3"/>
+      <p:bldP build="whole" bldLvl="1" animBg="1" rev="0" advAuto="0" spid="308" grpId="1"/>
+      <p:bldP build="whole" bldLvl="1" animBg="1" rev="0" advAuto="0" spid="311" grpId="2"/>
+    </p:bldLst>
+  </p:timing>
+</p:sld>
+</file>
+
+<file path=ppt/slides/slide12.xml><?xml version="1.0" encoding="utf-8"?>
+<p:sld xmlns:a="http://schemas.openxmlformats.org/drawingml/2006/main" xmlns:r="http://schemas.openxmlformats.org/officeDocument/2006/relationships" xmlns:p="http://schemas.openxmlformats.org/presentationml/2006/main" xmlns:m="http://schemas.openxmlformats.org/officeDocument/2006/math" xmlns:a14="http://schemas.microsoft.com/office/drawing/2010/main" showMasterSp="1" showMasterPhAnim="1">
+  <p:cSld>
+    <p:bg>
+      <p:bgPr>
+        <a:solidFill>
+          <a:srgbClr val="002833"/>
+        </a:solidFill>
+      </p:bgPr>
+    </p:bg>
+    <p:spTree>
+      <p:nvGrpSpPr>
+        <p:cNvPr id="1" name=""/>
+        <p:cNvGrpSpPr/>
+        <p:nvPr/>
+      </p:nvGrpSpPr>
+      <p:grpSpPr>
+        <a:xfrm>
+          <a:off x="0" y="0"/>
+          <a:ext cx="0" cy="0"/>
+          <a:chOff x="0" y="0"/>
+          <a:chExt cx="0" cy="0"/>
+        </a:xfrm>
+      </p:grpSpPr>
+      <p:sp>
+        <p:nvSpPr>
+          <p:cNvPr id="316" name="Title 6"/>
           <p:cNvSpPr txBox="1"/>
           <p:nvPr>
             <p:ph type="title"/>
@@ -5522,7 +7069,7 @@
       </p:sp>
       <p:pic>
         <p:nvPicPr>
-          <p:cNvPr id="290" name="stopwatch (2).png" descr="stopwatch (2).png"/>
+          <p:cNvPr id="317" name="stopwatch (2).png" descr="stopwatch (2).png"/>
           <p:cNvPicPr>
             <a:picLocks noChangeAspect="1"/>
           </p:cNvPicPr>
@@ -5551,7 +7098,7 @@
       </p:pic>
       <p:grpSp>
         <p:nvGrpSpPr>
-          <p:cNvPr id="293" name="Group"/>
+          <p:cNvPr id="320" name="Group"/>
           <p:cNvGrpSpPr/>
           <p:nvPr/>
         </p:nvGrpSpPr>
@@ -5565,7 +7112,7 @@
         </p:grpSpPr>
         <p:sp>
           <p:nvSpPr>
-            <p:cNvPr id="291" name="Rounded Rectangle"/>
+            <p:cNvPr id="318" name="Rounded Rectangle"/>
             <p:cNvSpPr/>
             <p:nvPr/>
           </p:nvSpPr>
@@ -5614,7 +7161,7 @@
                   <a:latin typeface="+mn-lt"/>
                   <a:ea typeface="+mn-ea"/>
                   <a:cs typeface="+mn-cs"/>
-                  <a:sym typeface="DIN Condensed"/>
+                  <a:sym typeface="DIN Condensed Bold"/>
                 </a:defRPr>
               </a:pPr>
             </a:p>
@@ -5622,7 +7169,7 @@
         </p:sp>
         <p:sp>
           <p:nvSpPr>
-            <p:cNvPr id="292" name="{…"/>
+            <p:cNvPr id="319" name="{…"/>
             <p:cNvSpPr txBox="1"/>
             <p:nvPr/>
           </p:nvSpPr>
@@ -6272,7 +7819,7 @@
                                       <p:cBhvr>
                                         <p:cTn id="6" fill="hold"/>
                                         <p:tgtEl>
-                                          <p:spTgt spid="293"/>
+                                          <p:spTgt spid="320"/>
                                         </p:tgtEl>
                                         <p:attrNameLst>
                                           <p:attrName>style.visibility</p:attrName>
@@ -6286,7 +7833,7 @@
                                       <p:cBhvr>
                                         <p:cTn id="7" dur="700" fill="hold"/>
                                         <p:tgtEl>
-                                          <p:spTgt spid="293"/>
+                                          <p:spTgt spid="320"/>
                                         </p:tgtEl>
                                         <p:attrNameLst>
                                           <p:attrName>ppt_x</p:attrName>
@@ -6309,7 +7856,7 @@
                                       <p:cBhvr>
                                         <p:cTn id="8" dur="700" fill="hold"/>
                                         <p:tgtEl>
-                                          <p:spTgt spid="293"/>
+                                          <p:spTgt spid="320"/>
                                         </p:tgtEl>
                                         <p:attrNameLst>
                                           <p:attrName>ppt_y</p:attrName>
@@ -6359,7 +7906,7 @@
       </p:par>
     </p:tnLst>
     <p:bldLst>
-      <p:bldP build="whole" bldLvl="1" animBg="1" rev="0" advAuto="0" spid="293" grpId="1"/>
+      <p:bldP build="whole" bldLvl="1" animBg="1" rev="0" advAuto="0" spid="320" grpId="1"/>
     </p:bldLst>
   </p:timing>
 </p:sld>
@@ -6533,7 +8080,7 @@
                     <a:latin typeface="+mn-lt"/>
                     <a:ea typeface="+mn-ea"/>
                     <a:cs typeface="+mn-cs"/>
-                    <a:sym typeface="DIN Condensed"/>
+                    <a:sym typeface="DIN Condensed Bold"/>
                   </a:defRPr>
                 </a:pPr>
               </a:p>
@@ -6582,7 +8129,7 @@
                     <a:latin typeface="+mn-lt"/>
                     <a:ea typeface="+mn-ea"/>
                     <a:cs typeface="+mn-cs"/>
-                    <a:sym typeface="DIN Condensed"/>
+                    <a:sym typeface="DIN Condensed Bold"/>
                   </a:defRPr>
                 </a:pPr>
               </a:p>
@@ -6631,7 +8178,7 @@
                     <a:latin typeface="+mn-lt"/>
                     <a:ea typeface="+mn-ea"/>
                     <a:cs typeface="+mn-cs"/>
-                    <a:sym typeface="DIN Condensed"/>
+                    <a:sym typeface="DIN Condensed Bold"/>
                   </a:defRPr>
                 </a:pPr>
               </a:p>
@@ -6680,7 +8227,7 @@
                     <a:latin typeface="+mn-lt"/>
                     <a:ea typeface="+mn-ea"/>
                     <a:cs typeface="+mn-cs"/>
-                    <a:sym typeface="DIN Condensed"/>
+                    <a:sym typeface="DIN Condensed Bold"/>
                   </a:defRPr>
                 </a:pPr>
               </a:p>
@@ -6729,7 +8276,7 @@
                     <a:latin typeface="+mn-lt"/>
                     <a:ea typeface="+mn-ea"/>
                     <a:cs typeface="+mn-cs"/>
-                    <a:sym typeface="DIN Condensed"/>
+                    <a:sym typeface="DIN Condensed Bold"/>
                   </a:defRPr>
                 </a:pPr>
               </a:p>
@@ -6772,10 +8319,10 @@
                   <a:solidFill>
                     <a:srgbClr val="FFFFFF"/>
                   </a:solidFill>
-                  <a:latin typeface="Avenir Next"/>
-                  <a:ea typeface="Avenir Next"/>
-                  <a:cs typeface="Avenir Next"/>
-                  <a:sym typeface="Avenir Next"/>
+                  <a:latin typeface="Avenir Next Regular"/>
+                  <a:ea typeface="Avenir Next Regular"/>
+                  <a:cs typeface="Avenir Next Regular"/>
+                  <a:sym typeface="Avenir Next Regular"/>
                 </a:defRPr>
               </a:lvl1pPr>
             </a:lstStyle>
@@ -6796,7 +8343,7 @@
         </p:nvGrpSpPr>
         <p:grpSpPr>
           <a:xfrm>
-            <a:off x="10194884" y="5520969"/>
+            <a:off x="10194883" y="5520969"/>
             <a:ext cx="2612518" cy="2599997"/>
             <a:chOff x="0" y="0"/>
             <a:chExt cx="2612517" cy="2599995"/>
@@ -6875,10 +8422,10 @@
                   <a:solidFill>
                     <a:srgbClr val="FFFFFF"/>
                   </a:solidFill>
-                  <a:latin typeface="Avenir Next"/>
-                  <a:ea typeface="Avenir Next"/>
-                  <a:cs typeface="Avenir Next"/>
-                  <a:sym typeface="Avenir Next"/>
+                  <a:latin typeface="Avenir Next Regular"/>
+                  <a:ea typeface="Avenir Next Regular"/>
+                  <a:cs typeface="Avenir Next Regular"/>
+                  <a:sym typeface="Avenir Next Regular"/>
                 </a:defRPr>
               </a:lvl1pPr>
             </a:lstStyle>
@@ -6899,8 +8446,8 @@
         </p:nvGrpSpPr>
         <p:grpSpPr>
           <a:xfrm>
-            <a:off x="5251156" y="5847038"/>
-            <a:ext cx="2650517" cy="2306962"/>
+            <a:off x="5251157" y="5847038"/>
+            <a:ext cx="2650516" cy="2306962"/>
             <a:chOff x="0" y="0"/>
             <a:chExt cx="2650515" cy="2306961"/>
           </a:xfrm>
@@ -6978,10 +8525,10 @@
                   <a:solidFill>
                     <a:srgbClr val="FFFFFF"/>
                   </a:solidFill>
-                  <a:latin typeface="Avenir Next"/>
-                  <a:ea typeface="Avenir Next"/>
-                  <a:cs typeface="Avenir Next"/>
-                  <a:sym typeface="Avenir Next"/>
+                  <a:latin typeface="Avenir Next Regular"/>
+                  <a:ea typeface="Avenir Next Regular"/>
+                  <a:cs typeface="Avenir Next Regular"/>
+                  <a:sym typeface="Avenir Next Regular"/>
                 </a:defRPr>
               </a:lvl1pPr>
             </a:lstStyle>
@@ -7057,7 +8604,7 @@
                   <a:latin typeface="+mn-lt"/>
                   <a:ea typeface="+mn-ea"/>
                   <a:cs typeface="+mn-cs"/>
-                  <a:sym typeface="DIN Condensed"/>
+                  <a:sym typeface="DIN Condensed Bold"/>
                 </a:defRPr>
               </a:pPr>
             </a:p>
@@ -7133,8 +8680,8 @@
         </p:blipFill>
         <p:spPr>
           <a:xfrm>
-            <a:off x="8114995" y="6102899"/>
-            <a:ext cx="1711870" cy="405592"/>
+            <a:off x="8114996" y="6102899"/>
+            <a:ext cx="1711869" cy="405592"/>
           </a:xfrm>
           <a:prstGeom prst="rect">
             <a:avLst/>
@@ -7230,7 +8777,7 @@
                   <a:latin typeface="+mn-lt"/>
                   <a:ea typeface="+mn-ea"/>
                   <a:cs typeface="+mn-cs"/>
-                  <a:sym typeface="DIN Condensed"/>
+                  <a:sym typeface="DIN Condensed Bold"/>
                 </a:defRPr>
               </a:pPr>
             </a:p>
@@ -7403,7 +8950,7 @@
                   <a:latin typeface="+mn-lt"/>
                   <a:ea typeface="+mn-ea"/>
                   <a:cs typeface="+mn-cs"/>
-                  <a:sym typeface="DIN Condensed"/>
+                  <a:sym typeface="DIN Condensed Bold"/>
                 </a:defRPr>
               </a:pPr>
             </a:p>
@@ -7480,7 +9027,7 @@
         <p:spPr>
           <a:xfrm>
             <a:off x="12958934" y="6102899"/>
-            <a:ext cx="1711869" cy="405592"/>
+            <a:ext cx="1711870" cy="405592"/>
           </a:xfrm>
           <a:prstGeom prst="rect">
             <a:avLst/>
@@ -7506,7 +9053,7 @@
         <p:spPr>
           <a:xfrm>
             <a:off x="12958933" y="6576120"/>
-            <a:ext cx="1711870" cy="405591"/>
+            <a:ext cx="1711869" cy="405591"/>
           </a:xfrm>
           <a:prstGeom prst="rect">
             <a:avLst/>
@@ -7521,8 +9068,8 @@
         </p:nvGrpSpPr>
         <p:grpSpPr>
           <a:xfrm>
-            <a:off x="15005934" y="5639245"/>
-            <a:ext cx="2207228" cy="3419613"/>
+            <a:off x="15005934" y="5639244"/>
+            <a:ext cx="2207228" cy="3419614"/>
             <a:chOff x="0" y="0"/>
             <a:chExt cx="2207226" cy="3419612"/>
           </a:xfrm>
@@ -7600,10 +9147,10 @@
                   <a:solidFill>
                     <a:srgbClr val="FFFFFF"/>
                   </a:solidFill>
-                  <a:latin typeface="Avenir Next"/>
-                  <a:ea typeface="Avenir Next"/>
-                  <a:cs typeface="Avenir Next"/>
-                  <a:sym typeface="Avenir Next"/>
+                  <a:latin typeface="Avenir Next Regular"/>
+                  <a:ea typeface="Avenir Next Regular"/>
+                  <a:cs typeface="Avenir Next Regular"/>
+                  <a:sym typeface="Avenir Next Regular"/>
                 </a:defRPr>
               </a:lvl1pPr>
             </a:lstStyle>
@@ -8386,17 +9933,17 @@
       </p:par>
     </p:tnLst>
     <p:bldLst>
+      <p:bldP build="whole" bldLvl="1" animBg="1" rev="0" advAuto="0" spid="216" grpId="9"/>
+      <p:bldP build="whole" bldLvl="1" animBg="1" rev="0" advAuto="0" spid="202" grpId="11"/>
+      <p:bldP build="whole" bldLvl="1" animBg="1" rev="0" advAuto="0" spid="203" grpId="4"/>
+      <p:bldP build="whole" bldLvl="1" animBg="1" rev="0" advAuto="0" spid="196" grpId="5"/>
+      <p:bldP build="whole" bldLvl="1" animBg="1" rev="0" advAuto="0" spid="210" grpId="2"/>
+      <p:bldP build="whole" bldLvl="1" animBg="1" rev="0" advAuto="0" spid="193" grpId="1"/>
       <p:bldP build="whole" bldLvl="1" animBg="1" rev="0" advAuto="0" spid="217" grpId="6"/>
+      <p:bldP build="whole" bldLvl="1" animBg="1" rev="0" advAuto="0" spid="205" grpId="10"/>
       <p:bldP build="whole" bldLvl="1" animBg="1" rev="0" advAuto="0" spid="223" grpId="7"/>
-      <p:bldP build="whole" bldLvl="1" animBg="1" rev="0" advAuto="0" spid="193" grpId="1"/>
-      <p:bldP build="whole" bldLvl="1" animBg="1" rev="0" advAuto="0" spid="196" grpId="5"/>
-      <p:bldP build="whole" bldLvl="1" animBg="1" rev="0" advAuto="0" spid="216" grpId="9"/>
       <p:bldP build="whole" bldLvl="1" animBg="1" rev="0" advAuto="0" spid="209" grpId="13"/>
-      <p:bldP build="whole" bldLvl="1" animBg="1" rev="0" advAuto="0" spid="205" grpId="10"/>
-      <p:bldP build="whole" bldLvl="1" animBg="1" rev="0" advAuto="0" spid="210" grpId="2"/>
       <p:bldP build="whole" bldLvl="1" animBg="1" rev="0" advAuto="0" spid="212" grpId="12"/>
-      <p:bldP build="whole" bldLvl="1" animBg="1" rev="0" advAuto="0" spid="203" grpId="4"/>
-      <p:bldP build="whole" bldLvl="1" animBg="1" rev="0" advAuto="0" spid="202" grpId="11"/>
       <p:bldP build="whole" bldLvl="1" animBg="1" rev="0" advAuto="0" spid="199" grpId="3"/>
       <p:bldP build="whole" bldLvl="1" animBg="1" rev="0" advAuto="0" spid="219" grpId="8"/>
     </p:bldLst>
@@ -8530,10 +10077,10 @@
                 <a:solidFill>
                   <a:srgbClr val="FFFFFF"/>
                 </a:solidFill>
-                <a:latin typeface="Meslo LG M for Powerline"/>
-                <a:ea typeface="Meslo LG M for Powerline"/>
-                <a:cs typeface="Meslo LG M for Powerline"/>
-                <a:sym typeface="Meslo LG M for Powerline"/>
+                <a:latin typeface="Meslo LG M Regular for Powerline"/>
+                <a:ea typeface="Meslo LG M Regular for Powerline"/>
+                <a:cs typeface="Meslo LG M Regular for Powerline"/>
+                <a:sym typeface="Meslo LG M Regular for Powerline"/>
               </a:defRPr>
             </a:pPr>
             <a:r>
@@ -8587,10 +10134,10 @@
                 <a:solidFill>
                   <a:srgbClr val="FFFFFF"/>
                 </a:solidFill>
-                <a:latin typeface="Meslo LG M for Powerline"/>
-                <a:ea typeface="Meslo LG M for Powerline"/>
-                <a:cs typeface="Meslo LG M for Powerline"/>
-                <a:sym typeface="Meslo LG M for Powerline"/>
+                <a:latin typeface="Meslo LG M Regular for Powerline"/>
+                <a:ea typeface="Meslo LG M Regular for Powerline"/>
+                <a:cs typeface="Meslo LG M Regular for Powerline"/>
+                <a:sym typeface="Meslo LG M Regular for Powerline"/>
               </a:defRPr>
             </a:pPr>
             <a:r>
@@ -8644,10 +10191,10 @@
                 <a:solidFill>
                   <a:srgbClr val="FFFFFF"/>
                 </a:solidFill>
-                <a:latin typeface="Meslo LG M for Powerline"/>
-                <a:ea typeface="Meslo LG M for Powerline"/>
-                <a:cs typeface="Meslo LG M for Powerline"/>
-                <a:sym typeface="Meslo LG M for Powerline"/>
+                <a:latin typeface="Meslo LG M Regular for Powerline"/>
+                <a:ea typeface="Meslo LG M Regular for Powerline"/>
+                <a:cs typeface="Meslo LG M Regular for Powerline"/>
+                <a:sym typeface="Meslo LG M Regular for Powerline"/>
               </a:defRPr>
             </a:pPr>
             <a:r>
@@ -8701,10 +10248,10 @@
                 <a:solidFill>
                   <a:srgbClr val="FFFFFF"/>
                 </a:solidFill>
-                <a:latin typeface="Meslo LG M for Powerline"/>
-                <a:ea typeface="Meslo LG M for Powerline"/>
-                <a:cs typeface="Meslo LG M for Powerline"/>
-                <a:sym typeface="Meslo LG M for Powerline"/>
+                <a:latin typeface="Meslo LG M Regular for Powerline"/>
+                <a:ea typeface="Meslo LG M Regular for Powerline"/>
+                <a:cs typeface="Meslo LG M Regular for Powerline"/>
+                <a:sym typeface="Meslo LG M Regular for Powerline"/>
               </a:defRPr>
             </a:pPr>
             <a:r>
@@ -8760,7 +10307,7 @@
                 <a:latin typeface="+mn-lt"/>
                 <a:ea typeface="+mn-ea"/>
                 <a:cs typeface="+mn-cs"/>
-                <a:sym typeface="DIN Condensed"/>
+                <a:sym typeface="DIN Condensed Bold"/>
               </a:defRPr>
             </a:pPr>
           </a:p>
@@ -8805,7 +10352,7 @@
                 <a:latin typeface="+mn-lt"/>
                 <a:ea typeface="+mn-ea"/>
                 <a:cs typeface="+mn-cs"/>
-                <a:sym typeface="DIN Condensed"/>
+                <a:sym typeface="DIN Condensed Bold"/>
               </a:defRPr>
             </a:pPr>
           </a:p>
@@ -8850,7 +10397,7 @@
                 <a:latin typeface="+mn-lt"/>
                 <a:ea typeface="+mn-ea"/>
                 <a:cs typeface="+mn-cs"/>
-                <a:sym typeface="DIN Condensed"/>
+                <a:sym typeface="DIN Condensed Bold"/>
               </a:defRPr>
             </a:pPr>
           </a:p>
@@ -8895,7 +10442,7 @@
                 <a:latin typeface="+mn-lt"/>
                 <a:ea typeface="+mn-ea"/>
                 <a:cs typeface="+mn-cs"/>
-                <a:sym typeface="DIN Condensed"/>
+                <a:sym typeface="DIN Condensed Bold"/>
               </a:defRPr>
             </a:pPr>
           </a:p>
@@ -8938,10 +10485,10 @@
                 <a:solidFill>
                   <a:srgbClr val="FFFFFF"/>
                 </a:solidFill>
-                <a:latin typeface="Meslo LG M for Powerline"/>
-                <a:ea typeface="Meslo LG M for Powerline"/>
-                <a:cs typeface="Meslo LG M for Powerline"/>
-                <a:sym typeface="Meslo LG M for Powerline"/>
+                <a:latin typeface="Meslo LG M Regular for Powerline"/>
+                <a:ea typeface="Meslo LG M Regular for Powerline"/>
+                <a:cs typeface="Meslo LG M Regular for Powerline"/>
+                <a:sym typeface="Meslo LG M Regular for Powerline"/>
               </a:defRPr>
             </a:pPr>
             <a:r>
@@ -8997,7 +10544,7 @@
                 <a:latin typeface="+mn-lt"/>
                 <a:ea typeface="+mn-ea"/>
                 <a:cs typeface="+mn-cs"/>
-                <a:sym typeface="DIN Condensed"/>
+                <a:sym typeface="DIN Condensed Bold"/>
               </a:defRPr>
             </a:pPr>
           </a:p>
@@ -9682,16 +11229,16 @@
       </p:par>
     </p:tnLst>
     <p:bldLst>
+      <p:bldP build="whole" bldLvl="1" animBg="1" rev="0" advAuto="0" spid="233" grpId="6"/>
+      <p:bldP build="whole" bldLvl="1" animBg="1" rev="0" advAuto="0" spid="229" grpId="5"/>
+      <p:bldP build="whole" bldLvl="1" animBg="1" rev="0" advAuto="0" spid="236" grpId="10"/>
+      <p:bldP build="whole" bldLvl="1" animBg="1" rev="0" advAuto="0" spid="231" grpId="2"/>
+      <p:bldP build="whole" bldLvl="1" animBg="1" rev="0" advAuto="0" spid="234" grpId="8"/>
       <p:bldP build="whole" bldLvl="1" animBg="1" rev="0" advAuto="0" spid="230" grpId="7"/>
       <p:bldP build="whole" bldLvl="1" animBg="1" rev="0" advAuto="0" spid="227" grpId="1"/>
-      <p:bldP build="whole" bldLvl="1" animBg="1" rev="0" advAuto="0" spid="231" grpId="2"/>
+      <p:bldP build="whole" bldLvl="1" animBg="1" rev="0" advAuto="0" spid="235" grpId="9"/>
       <p:bldP build="whole" bldLvl="1" animBg="1" rev="0" advAuto="0" spid="232" grpId="4"/>
-      <p:bldP build="whole" bldLvl="1" animBg="1" rev="0" advAuto="0" spid="235" grpId="9"/>
-      <p:bldP build="whole" bldLvl="1" animBg="1" rev="0" advAuto="0" spid="234" grpId="8"/>
-      <p:bldP build="whole" bldLvl="1" animBg="1" rev="0" advAuto="0" spid="236" grpId="10"/>
       <p:bldP build="whole" bldLvl="1" animBg="1" rev="0" advAuto="0" spid="228" grpId="3"/>
-      <p:bldP build="whole" bldLvl="1" animBg="1" rev="0" advAuto="0" spid="229" grpId="5"/>
-      <p:bldP build="whole" bldLvl="1" animBg="1" rev="0" advAuto="0" spid="233" grpId="6"/>
     </p:bldLst>
   </p:timing>
 </p:sld>
@@ -9823,10 +11370,10 @@
                 <a:solidFill>
                   <a:srgbClr val="FFFFFF"/>
                 </a:solidFill>
-                <a:latin typeface="Meslo LG M for Powerline"/>
-                <a:ea typeface="Meslo LG M for Powerline"/>
-                <a:cs typeface="Meslo LG M for Powerline"/>
-                <a:sym typeface="Meslo LG M for Powerline"/>
+                <a:latin typeface="Meslo LG M Regular for Powerline"/>
+                <a:ea typeface="Meslo LG M Regular for Powerline"/>
+                <a:cs typeface="Meslo LG M Regular for Powerline"/>
+                <a:sym typeface="Meslo LG M Regular for Powerline"/>
               </a:defRPr>
             </a:pPr>
             <a:r>
@@ -9882,7 +11429,7 @@
                 <a:latin typeface="+mn-lt"/>
                 <a:ea typeface="+mn-ea"/>
                 <a:cs typeface="+mn-cs"/>
-                <a:sym typeface="DIN Condensed"/>
+                <a:sym typeface="DIN Condensed Bold"/>
               </a:defRPr>
             </a:pPr>
           </a:p>
@@ -9925,10 +11472,10 @@
                 <a:solidFill>
                   <a:srgbClr val="A6AAA9"/>
                 </a:solidFill>
-                <a:latin typeface="Meslo LG M for Powerline"/>
-                <a:ea typeface="Meslo LG M for Powerline"/>
-                <a:cs typeface="Meslo LG M for Powerline"/>
-                <a:sym typeface="Meslo LG M for Powerline"/>
+                <a:latin typeface="Meslo LG M Regular for Powerline"/>
+                <a:ea typeface="Meslo LG M Regular for Powerline"/>
+                <a:cs typeface="Meslo LG M Regular for Powerline"/>
+                <a:sym typeface="Meslo LG M Regular for Powerline"/>
               </a:defRPr>
             </a:pPr>
             <a:r>
@@ -9973,10 +11520,10 @@
                 <a:solidFill>
                   <a:srgbClr val="A6AAA9"/>
                 </a:solidFill>
-                <a:latin typeface="Meslo LG M for Powerline"/>
-                <a:ea typeface="Meslo LG M for Powerline"/>
-                <a:cs typeface="Meslo LG M for Powerline"/>
-                <a:sym typeface="Meslo LG M for Powerline"/>
+                <a:latin typeface="Meslo LG M Regular for Powerline"/>
+                <a:ea typeface="Meslo LG M Regular for Powerline"/>
+                <a:cs typeface="Meslo LG M Regular for Powerline"/>
+                <a:sym typeface="Meslo LG M Regular for Powerline"/>
               </a:defRPr>
             </a:lvl1pPr>
           </a:lstStyle>
@@ -10024,10 +11571,10 @@
                 <a:solidFill>
                   <a:srgbClr val="A6AAA9"/>
                 </a:solidFill>
-                <a:latin typeface="Meslo LG M for Powerline"/>
-                <a:ea typeface="Meslo LG M for Powerline"/>
-                <a:cs typeface="Meslo LG M for Powerline"/>
-                <a:sym typeface="Meslo LG M for Powerline"/>
+                <a:latin typeface="Meslo LG M Regular for Powerline"/>
+                <a:ea typeface="Meslo LG M Regular for Powerline"/>
+                <a:cs typeface="Meslo LG M Regular for Powerline"/>
+                <a:sym typeface="Meslo LG M Regular for Powerline"/>
               </a:defRPr>
             </a:lvl1pPr>
           </a:lstStyle>
@@ -10080,10 +11627,10 @@
                     <a:lumOff val="-7679"/>
                   </a:schemeClr>
                 </a:solidFill>
-                <a:latin typeface="Meslo LG M for Powerline"/>
-                <a:ea typeface="Meslo LG M for Powerline"/>
-                <a:cs typeface="Meslo LG M for Powerline"/>
-                <a:sym typeface="Meslo LG M for Powerline"/>
+                <a:latin typeface="Meslo LG M Regular for Powerline"/>
+                <a:ea typeface="Meslo LG M Regular for Powerline"/>
+                <a:cs typeface="Meslo LG M Regular for Powerline"/>
+                <a:sym typeface="Meslo LG M Regular for Powerline"/>
               </a:defRPr>
             </a:pPr>
             <a:r>
@@ -10133,10 +11680,10 @@
                     <a:lumOff val="-7679"/>
                   </a:schemeClr>
                 </a:solidFill>
-                <a:latin typeface="Meslo LG M for Powerline"/>
-                <a:ea typeface="Meslo LG M for Powerline"/>
-                <a:cs typeface="Meslo LG M for Powerline"/>
-                <a:sym typeface="Meslo LG M for Powerline"/>
+                <a:latin typeface="Meslo LG M Regular for Powerline"/>
+                <a:ea typeface="Meslo LG M Regular for Powerline"/>
+                <a:cs typeface="Meslo LG M Regular for Powerline"/>
+                <a:sym typeface="Meslo LG M Regular for Powerline"/>
               </a:defRPr>
             </a:pPr>
             <a:r>
@@ -10182,10 +11729,10 @@
                 <a:solidFill>
                   <a:srgbClr val="FFFFFF"/>
                 </a:solidFill>
-                <a:latin typeface="Meslo LG M for Powerline"/>
-                <a:ea typeface="Meslo LG M for Powerline"/>
-                <a:cs typeface="Meslo LG M for Powerline"/>
-                <a:sym typeface="Meslo LG M for Powerline"/>
+                <a:latin typeface="Meslo LG M Regular for Powerline"/>
+                <a:ea typeface="Meslo LG M Regular for Powerline"/>
+                <a:cs typeface="Meslo LG M Regular for Powerline"/>
+                <a:sym typeface="Meslo LG M Regular for Powerline"/>
               </a:defRPr>
             </a:pPr>
             <a:r>
@@ -10757,13 +12304,13 @@
       </p:par>
     </p:tnLst>
     <p:bldLst>
+      <p:bldP build="whole" bldLvl="1" animBg="1" rev="0" advAuto="0" spid="245" grpId="4"/>
+      <p:bldP build="whole" bldLvl="1" animBg="1" rev="0" advAuto="0" spid="243" grpId="5"/>
+      <p:bldP build="whole" bldLvl="1" animBg="1" rev="0" advAuto="0" spid="246" grpId="6"/>
+      <p:bldP build="whole" bldLvl="1" animBg="1" rev="0" advAuto="0" spid="244" grpId="7"/>
+      <p:bldP build="whole" bldLvl="1" animBg="1" rev="0" advAuto="0" spid="241" grpId="2"/>
+      <p:bldP build="whole" bldLvl="1" animBg="1" rev="0" advAuto="0" spid="247" grpId="8"/>
       <p:bldP build="whole" bldLvl="1" animBg="1" rev="0" advAuto="0" spid="240" grpId="1"/>
-      <p:bldP build="whole" bldLvl="1" animBg="1" rev="0" advAuto="0" spid="246" grpId="6"/>
-      <p:bldP build="whole" bldLvl="1" animBg="1" rev="0" advAuto="0" spid="243" grpId="5"/>
-      <p:bldP build="whole" bldLvl="1" animBg="1" rev="0" advAuto="0" spid="244" grpId="7"/>
-      <p:bldP build="whole" bldLvl="1" animBg="1" rev="0" advAuto="0" spid="247" grpId="8"/>
-      <p:bldP build="whole" bldLvl="1" animBg="1" rev="0" advAuto="0" spid="245" grpId="4"/>
-      <p:bldP build="whole" bldLvl="1" animBg="1" rev="0" advAuto="0" spid="241" grpId="2"/>
       <p:bldP build="whole" bldLvl="1" animBg="1" rev="0" advAuto="0" spid="242" grpId="3"/>
     </p:bldLst>
   </p:timing>
@@ -10896,10 +12443,10 @@
                 <a:solidFill>
                   <a:srgbClr val="FFFFFF"/>
                 </a:solidFill>
-                <a:latin typeface="Meslo LG M for Powerline"/>
-                <a:ea typeface="Meslo LG M for Powerline"/>
-                <a:cs typeface="Meslo LG M for Powerline"/>
-                <a:sym typeface="Meslo LG M for Powerline"/>
+                <a:latin typeface="Meslo LG M Regular for Powerline"/>
+                <a:ea typeface="Meslo LG M Regular for Powerline"/>
+                <a:cs typeface="Meslo LG M Regular for Powerline"/>
+                <a:sym typeface="Meslo LG M Regular for Powerline"/>
               </a:defRPr>
             </a:pPr>
             <a:r>
@@ -10955,7 +12502,7 @@
                 <a:latin typeface="+mn-lt"/>
                 <a:ea typeface="+mn-ea"/>
                 <a:cs typeface="+mn-cs"/>
-                <a:sym typeface="DIN Condensed"/>
+                <a:sym typeface="DIN Condensed Bold"/>
               </a:defRPr>
             </a:pPr>
           </a:p>
@@ -10969,8 +12516,8 @@
         </p:nvSpPr>
         <p:spPr>
           <a:xfrm>
-            <a:off x="7978539" y="5953012"/>
-            <a:ext cx="5049045" cy="1247776"/>
+            <a:off x="7978540" y="5953012"/>
+            <a:ext cx="5049044" cy="1247776"/>
           </a:xfrm>
           <a:prstGeom prst="rect">
             <a:avLst/>
@@ -10998,10 +12545,10 @@
                 <a:solidFill>
                   <a:srgbClr val="FFFFFF"/>
                 </a:solidFill>
-                <a:latin typeface="Meslo LG M for Powerline"/>
-                <a:ea typeface="Meslo LG M for Powerline"/>
-                <a:cs typeface="Meslo LG M for Powerline"/>
-                <a:sym typeface="Meslo LG M for Powerline"/>
+                <a:latin typeface="Meslo LG M Regular for Powerline"/>
+                <a:ea typeface="Meslo LG M Regular for Powerline"/>
+                <a:cs typeface="Meslo LG M Regular for Powerline"/>
+                <a:sym typeface="Meslo LG M Regular for Powerline"/>
               </a:defRPr>
             </a:pPr>
             <a:r>
@@ -11055,10 +12602,10 @@
                 <a:solidFill>
                   <a:srgbClr val="A6AAA9"/>
                 </a:solidFill>
-                <a:latin typeface="Meslo LG M for Powerline"/>
-                <a:ea typeface="Meslo LG M for Powerline"/>
-                <a:cs typeface="Meslo LG M for Powerline"/>
-                <a:sym typeface="Meslo LG M for Powerline"/>
+                <a:latin typeface="Meslo LG M Regular for Powerline"/>
+                <a:ea typeface="Meslo LG M Regular for Powerline"/>
+                <a:cs typeface="Meslo LG M Regular for Powerline"/>
+                <a:sym typeface="Meslo LG M Regular for Powerline"/>
               </a:defRPr>
             </a:pPr>
             <a:r>
@@ -11103,10 +12650,10 @@
                 <a:solidFill>
                   <a:srgbClr val="A6AAA9"/>
                 </a:solidFill>
-                <a:latin typeface="Meslo LG M for Powerline"/>
-                <a:ea typeface="Meslo LG M for Powerline"/>
-                <a:cs typeface="Meslo LG M for Powerline"/>
-                <a:sym typeface="Meslo LG M for Powerline"/>
+                <a:latin typeface="Meslo LG M Regular for Powerline"/>
+                <a:ea typeface="Meslo LG M Regular for Powerline"/>
+                <a:cs typeface="Meslo LG M Regular for Powerline"/>
+                <a:sym typeface="Meslo LG M Regular for Powerline"/>
               </a:defRPr>
             </a:lvl1pPr>
           </a:lstStyle>
@@ -11154,10 +12701,10 @@
                 <a:solidFill>
                   <a:srgbClr val="A6AAA9"/>
                 </a:solidFill>
-                <a:latin typeface="Meslo LG M for Powerline"/>
-                <a:ea typeface="Meslo LG M for Powerline"/>
-                <a:cs typeface="Meslo LG M for Powerline"/>
-                <a:sym typeface="Meslo LG M for Powerline"/>
+                <a:latin typeface="Meslo LG M Regular for Powerline"/>
+                <a:ea typeface="Meslo LG M Regular for Powerline"/>
+                <a:cs typeface="Meslo LG M Regular for Powerline"/>
+                <a:sym typeface="Meslo LG M Regular for Powerline"/>
               </a:defRPr>
             </a:lvl1pPr>
           </a:lstStyle>
@@ -11210,10 +12757,10 @@
                     <a:lumOff val="-7679"/>
                   </a:schemeClr>
                 </a:solidFill>
-                <a:latin typeface="Meslo LG M for Powerline"/>
-                <a:ea typeface="Meslo LG M for Powerline"/>
-                <a:cs typeface="Meslo LG M for Powerline"/>
-                <a:sym typeface="Meslo LG M for Powerline"/>
+                <a:latin typeface="Meslo LG M Regular for Powerline"/>
+                <a:ea typeface="Meslo LG M Regular for Powerline"/>
+                <a:cs typeface="Meslo LG M Regular for Powerline"/>
+                <a:sym typeface="Meslo LG M Regular for Powerline"/>
               </a:defRPr>
             </a:pPr>
             <a:r>
@@ -11263,10 +12810,10 @@
                     <a:lumOff val="-7679"/>
                   </a:schemeClr>
                 </a:solidFill>
-                <a:latin typeface="Meslo LG M for Powerline"/>
-                <a:ea typeface="Meslo LG M for Powerline"/>
-                <a:cs typeface="Meslo LG M for Powerline"/>
-                <a:sym typeface="Meslo LG M for Powerline"/>
+                <a:latin typeface="Meslo LG M Regular for Powerline"/>
+                <a:ea typeface="Meslo LG M Regular for Powerline"/>
+                <a:cs typeface="Meslo LG M Regular for Powerline"/>
+                <a:sym typeface="Meslo LG M Regular for Powerline"/>
               </a:defRPr>
             </a:pPr>
             <a:r>
@@ -11312,10 +12859,10 @@
                 <a:solidFill>
                   <a:srgbClr val="FFFFFF"/>
                 </a:solidFill>
-                <a:latin typeface="Meslo LG M for Powerline"/>
-                <a:ea typeface="Meslo LG M for Powerline"/>
-                <a:cs typeface="Meslo LG M for Powerline"/>
-                <a:sym typeface="Meslo LG M for Powerline"/>
+                <a:latin typeface="Meslo LG M Regular for Powerline"/>
+                <a:ea typeface="Meslo LG M Regular for Powerline"/>
+                <a:cs typeface="Meslo LG M Regular for Powerline"/>
+                <a:sym typeface="Meslo LG M Regular for Powerline"/>
               </a:defRPr>
             </a:pPr>
             <a:r>
@@ -11369,10 +12916,10 @@
                 <a:solidFill>
                   <a:srgbClr val="A6AAA9"/>
                 </a:solidFill>
-                <a:latin typeface="Meslo LG M for Powerline"/>
-                <a:ea typeface="Meslo LG M for Powerline"/>
-                <a:cs typeface="Meslo LG M for Powerline"/>
-                <a:sym typeface="Meslo LG M for Powerline"/>
+                <a:latin typeface="Meslo LG M Regular for Powerline"/>
+                <a:ea typeface="Meslo LG M Regular for Powerline"/>
+                <a:cs typeface="Meslo LG M Regular for Powerline"/>
+                <a:sym typeface="Meslo LG M Regular for Powerline"/>
               </a:defRPr>
             </a:pPr>
             <a:r>
@@ -12060,16 +13607,16 @@
       </p:par>
     </p:tnLst>
     <p:bldLst>
+      <p:bldP build="whole" bldLvl="1" animBg="1" rev="0" advAuto="0" spid="259" grpId="10"/>
+      <p:bldP build="whole" bldLvl="1" animBg="1" rev="0" advAuto="0" spid="252" grpId="2"/>
+      <p:bldP build="whole" bldLvl="1" animBg="1" rev="0" advAuto="0" spid="258" grpId="8"/>
+      <p:bldP build="whole" bldLvl="1" animBg="1" rev="0" advAuto="0" spid="260" grpId="3"/>
       <p:bldP build="whole" bldLvl="1" animBg="1" rev="0" advAuto="0" spid="251" grpId="1"/>
-      <p:bldP build="whole" bldLvl="1" animBg="1" rev="0" advAuto="0" spid="260" grpId="3"/>
-      <p:bldP build="whole" bldLvl="1" animBg="1" rev="0" advAuto="0" spid="252" grpId="2"/>
+      <p:bldP build="whole" bldLvl="1" animBg="1" rev="0" advAuto="0" spid="254" grpId="5"/>
+      <p:bldP build="whole" bldLvl="1" animBg="1" rev="0" advAuto="0" spid="257" grpId="6"/>
+      <p:bldP build="whole" bldLvl="1" animBg="1" rev="0" advAuto="0" spid="255" grpId="7"/>
       <p:bldP build="whole" bldLvl="1" animBg="1" rev="0" advAuto="0" spid="253" grpId="4"/>
-      <p:bldP build="whole" bldLvl="1" animBg="1" rev="0" advAuto="0" spid="255" grpId="7"/>
-      <p:bldP build="whole" bldLvl="1" animBg="1" rev="0" advAuto="0" spid="258" grpId="8"/>
-      <p:bldP build="whole" bldLvl="1" animBg="1" rev="0" advAuto="0" spid="257" grpId="6"/>
-      <p:bldP build="whole" bldLvl="1" animBg="1" rev="0" advAuto="0" spid="254" grpId="5"/>
       <p:bldP build="whole" bldLvl="1" animBg="1" rev="0" advAuto="0" spid="256" grpId="9"/>
-      <p:bldP build="whole" bldLvl="1" animBg="1" rev="0" advAuto="0" spid="259" grpId="10"/>
     </p:bldLst>
   </p:timing>
 </p:sld>
@@ -12201,10 +13748,10 @@
                 <a:solidFill>
                   <a:srgbClr val="FFFFFF"/>
                 </a:solidFill>
-                <a:latin typeface="Meslo LG M for Powerline"/>
-                <a:ea typeface="Meslo LG M for Powerline"/>
-                <a:cs typeface="Meslo LG M for Powerline"/>
-                <a:sym typeface="Meslo LG M for Powerline"/>
+                <a:latin typeface="Meslo LG M Regular for Powerline"/>
+                <a:ea typeface="Meslo LG M Regular for Powerline"/>
+                <a:cs typeface="Meslo LG M Regular for Powerline"/>
+                <a:sym typeface="Meslo LG M Regular for Powerline"/>
               </a:defRPr>
             </a:pPr>
             <a:r>
@@ -12260,7 +13807,7 @@
                 <a:latin typeface="+mn-lt"/>
                 <a:ea typeface="+mn-ea"/>
                 <a:cs typeface="+mn-cs"/>
-                <a:sym typeface="DIN Condensed"/>
+                <a:sym typeface="DIN Condensed Bold"/>
               </a:defRPr>
             </a:pPr>
           </a:p>
@@ -12303,10 +13850,10 @@
                 <a:solidFill>
                   <a:srgbClr val="FFFFFF"/>
                 </a:solidFill>
-                <a:latin typeface="Meslo LG M for Powerline"/>
-                <a:ea typeface="Meslo LG M for Powerline"/>
-                <a:cs typeface="Meslo LG M for Powerline"/>
-                <a:sym typeface="Meslo LG M for Powerline"/>
+                <a:latin typeface="Meslo LG M Regular for Powerline"/>
+                <a:ea typeface="Meslo LG M Regular for Powerline"/>
+                <a:cs typeface="Meslo LG M Regular for Powerline"/>
+                <a:sym typeface="Meslo LG M Regular for Powerline"/>
               </a:defRPr>
             </a:pPr>
             <a:r>
@@ -12360,10 +13907,10 @@
                 <a:solidFill>
                   <a:srgbClr val="A6AAA9"/>
                 </a:solidFill>
-                <a:latin typeface="Meslo LG M for Powerline"/>
-                <a:ea typeface="Meslo LG M for Powerline"/>
-                <a:cs typeface="Meslo LG M for Powerline"/>
-                <a:sym typeface="Meslo LG M for Powerline"/>
+                <a:latin typeface="Meslo LG M Regular for Powerline"/>
+                <a:ea typeface="Meslo LG M Regular for Powerline"/>
+                <a:cs typeface="Meslo LG M Regular for Powerline"/>
+                <a:sym typeface="Meslo LG M Regular for Powerline"/>
               </a:defRPr>
             </a:pPr>
             <a:r>
@@ -12679,8 +14226,8 @@
       </p:par>
     </p:tnLst>
     <p:bldLst>
+      <p:bldP build="whole" bldLvl="1" animBg="1" rev="0" advAuto="0" spid="267" grpId="3"/>
       <p:bldP build="whole" bldLvl="1" animBg="1" rev="0" advAuto="0" spid="265" grpId="2"/>
-      <p:bldP build="whole" bldLvl="1" animBg="1" rev="0" advAuto="0" spid="267" grpId="3"/>
       <p:bldP build="whole" bldLvl="1" animBg="1" rev="0" advAuto="0" spid="266" grpId="4"/>
       <p:bldP build="whole" bldLvl="1" animBg="1" rev="0" advAuto="0" spid="264" grpId="1"/>
     </p:bldLst>
@@ -12814,10 +14361,10 @@
                 <a:solidFill>
                   <a:srgbClr val="FFFFFF"/>
                 </a:solidFill>
-                <a:latin typeface="Meslo LG M for Powerline"/>
-                <a:ea typeface="Meslo LG M for Powerline"/>
-                <a:cs typeface="Meslo LG M for Powerline"/>
-                <a:sym typeface="Meslo LG M for Powerline"/>
+                <a:latin typeface="Meslo LG M Regular for Powerline"/>
+                <a:ea typeface="Meslo LG M Regular for Powerline"/>
+                <a:cs typeface="Meslo LG M Regular for Powerline"/>
+                <a:sym typeface="Meslo LG M Regular for Powerline"/>
               </a:defRPr>
             </a:pPr>
             <a:r>
@@ -12873,7 +14420,7 @@
                 <a:latin typeface="+mn-lt"/>
                 <a:ea typeface="+mn-ea"/>
                 <a:cs typeface="+mn-cs"/>
-                <a:sym typeface="DIN Condensed"/>
+                <a:sym typeface="DIN Condensed Bold"/>
               </a:defRPr>
             </a:pPr>
           </a:p>
@@ -12916,10 +14463,10 @@
                 <a:solidFill>
                   <a:srgbClr val="FFFFFF"/>
                 </a:solidFill>
-                <a:latin typeface="Meslo LG M for Powerline"/>
-                <a:ea typeface="Meslo LG M for Powerline"/>
-                <a:cs typeface="Meslo LG M for Powerline"/>
-                <a:sym typeface="Meslo LG M for Powerline"/>
+                <a:latin typeface="Meslo LG M Regular for Powerline"/>
+                <a:ea typeface="Meslo LG M Regular for Powerline"/>
+                <a:cs typeface="Meslo LG M Regular for Powerline"/>
+                <a:sym typeface="Meslo LG M Regular for Powerline"/>
               </a:defRPr>
             </a:pPr>
             <a:r>
@@ -12973,10 +14520,10 @@
                 <a:solidFill>
                   <a:srgbClr val="A6AAA9"/>
                 </a:solidFill>
-                <a:latin typeface="Meslo LG M for Powerline"/>
-                <a:ea typeface="Meslo LG M for Powerline"/>
-                <a:cs typeface="Meslo LG M for Powerline"/>
-                <a:sym typeface="Meslo LG M for Powerline"/>
+                <a:latin typeface="Meslo LG M Regular for Powerline"/>
+                <a:ea typeface="Meslo LG M Regular for Powerline"/>
+                <a:cs typeface="Meslo LG M Regular for Powerline"/>
+                <a:sym typeface="Meslo LG M Regular for Powerline"/>
               </a:defRPr>
             </a:pPr>
             <a:r>
@@ -13292,10 +14839,10 @@
       </p:par>
     </p:tnLst>
     <p:bldLst>
+      <p:bldP build="whole" bldLvl="1" animBg="1" rev="0" advAuto="0" spid="274" grpId="3"/>
       <p:bldP build="whole" bldLvl="1" animBg="1" rev="0" advAuto="0" spid="272" grpId="2"/>
       <p:bldP build="whole" bldLvl="1" animBg="1" rev="0" advAuto="0" spid="271" grpId="1"/>
       <p:bldP build="whole" bldLvl="1" animBg="1" rev="0" advAuto="0" spid="273" grpId="4"/>
-      <p:bldP build="whole" bldLvl="1" animBg="1" rev="0" advAuto="0" spid="274" grpId="3"/>
     </p:bldLst>
   </p:timing>
 </p:sld>
@@ -13427,10 +14974,10 @@
                 <a:solidFill>
                   <a:srgbClr val="FFFFFF"/>
                 </a:solidFill>
-                <a:latin typeface="Meslo LG M for Powerline"/>
-                <a:ea typeface="Meslo LG M for Powerline"/>
-                <a:cs typeface="Meslo LG M for Powerline"/>
-                <a:sym typeface="Meslo LG M for Powerline"/>
+                <a:latin typeface="Meslo LG M Regular for Powerline"/>
+                <a:ea typeface="Meslo LG M Regular for Powerline"/>
+                <a:cs typeface="Meslo LG M Regular for Powerline"/>
+                <a:sym typeface="Meslo LG M Regular for Powerline"/>
               </a:defRPr>
             </a:pPr>
             <a:r>
@@ -13486,7 +15033,7 @@
                 <a:latin typeface="+mn-lt"/>
                 <a:ea typeface="+mn-ea"/>
                 <a:cs typeface="+mn-cs"/>
-                <a:sym typeface="DIN Condensed"/>
+                <a:sym typeface="DIN Condensed Bold"/>
               </a:defRPr>
             </a:pPr>
           </a:p>
@@ -13529,10 +15076,10 @@
                 <a:solidFill>
                   <a:srgbClr val="A6AAA9"/>
                 </a:solidFill>
-                <a:latin typeface="Meslo LG M for Powerline"/>
-                <a:ea typeface="Meslo LG M for Powerline"/>
-                <a:cs typeface="Meslo LG M for Powerline"/>
-                <a:sym typeface="Meslo LG M for Powerline"/>
+                <a:latin typeface="Meslo LG M Regular for Powerline"/>
+                <a:ea typeface="Meslo LG M Regular for Powerline"/>
+                <a:cs typeface="Meslo LG M Regular for Powerline"/>
+                <a:sym typeface="Meslo LG M Regular for Powerline"/>
               </a:defRPr>
             </a:pPr>
             <a:r>
@@ -13582,10 +15129,10 @@
                     <a:lumOff val="-7679"/>
                   </a:schemeClr>
                 </a:solidFill>
-                <a:latin typeface="Meslo LG M for Powerline"/>
-                <a:ea typeface="Meslo LG M for Powerline"/>
-                <a:cs typeface="Meslo LG M for Powerline"/>
-                <a:sym typeface="Meslo LG M for Powerline"/>
+                <a:latin typeface="Meslo LG M Regular for Powerline"/>
+                <a:ea typeface="Meslo LG M Regular for Powerline"/>
+                <a:cs typeface="Meslo LG M Regular for Powerline"/>
+                <a:sym typeface="Meslo LG M Regular for Powerline"/>
               </a:defRPr>
             </a:pPr>
             <a:r>
@@ -13902,9 +15449,9 @@
     </p:tnLst>
     <p:bldLst>
       <p:bldP build="whole" bldLvl="1" animBg="1" rev="0" advAuto="0" spid="279" grpId="2"/>
+      <p:bldP build="whole" bldLvl="1" animBg="1" rev="0" advAuto="0" spid="281" grpId="4"/>
       <p:bldP build="whole" bldLvl="1" animBg="1" rev="0" advAuto="0" spid="278" grpId="1"/>
       <p:bldP build="whole" bldLvl="1" animBg="1" rev="0" advAuto="0" spid="280" grpId="3"/>
-      <p:bldP build="whole" bldLvl="1" animBg="1" rev="0" advAuto="0" spid="281" grpId="4"/>
     </p:bldLst>
   </p:timing>
 </p:sld>
@@ -14064,7 +15611,7 @@
                   <a:latin typeface="+mn-lt"/>
                   <a:ea typeface="+mn-ea"/>
                   <a:cs typeface="+mn-cs"/>
-                  <a:sym typeface="DIN Condensed"/>
+                  <a:sym typeface="DIN Condensed Bold"/>
                 </a:defRPr>
               </a:pPr>
             </a:p>
@@ -14079,7 +15626,7 @@
           <p:spPr>
             <a:xfrm>
               <a:off x="563671" y="512762"/>
-              <a:ext cx="10531259" cy="4257676"/>
+              <a:ext cx="10080142" cy="4257676"/>
             </a:xfrm>
             <a:prstGeom prst="rect">
               <a:avLst/>
@@ -14110,10 +15657,10 @@
                   <a:solidFill>
                     <a:srgbClr val="FFFFFF"/>
                   </a:solidFill>
-                  <a:latin typeface="Meslo LG M for Powerline"/>
-                  <a:ea typeface="Meslo LG M for Powerline"/>
-                  <a:cs typeface="Meslo LG M for Powerline"/>
-                  <a:sym typeface="Meslo LG M for Powerline"/>
+                  <a:latin typeface="Meslo LG M Regular for Powerline"/>
+                  <a:ea typeface="Meslo LG M Regular for Powerline"/>
+                  <a:cs typeface="Meslo LG M Regular for Powerline"/>
+                  <a:sym typeface="Meslo LG M Regular for Powerline"/>
                 </a:defRPr>
               </a:pPr>
               <a:r>
@@ -14176,10 +15723,10 @@
                   <a:solidFill>
                     <a:srgbClr val="FFFFFF"/>
                   </a:solidFill>
-                  <a:latin typeface="Meslo LG M for Powerline"/>
-                  <a:ea typeface="Meslo LG M for Powerline"/>
-                  <a:cs typeface="Meslo LG M for Powerline"/>
-                  <a:sym typeface="Meslo LG M for Powerline"/>
+                  <a:latin typeface="Meslo LG M Regular for Powerline"/>
+                  <a:ea typeface="Meslo LG M Regular for Powerline"/>
+                  <a:cs typeface="Meslo LG M Regular for Powerline"/>
+                  <a:sym typeface="Meslo LG M Regular for Powerline"/>
                 </a:defRPr>
               </a:pPr>
               <a:r>
@@ -14230,10 +15777,10 @@
                   <a:solidFill>
                     <a:srgbClr val="FFFFFF"/>
                   </a:solidFill>
-                  <a:latin typeface="Meslo LG M for Powerline"/>
-                  <a:ea typeface="Meslo LG M for Powerline"/>
-                  <a:cs typeface="Meslo LG M for Powerline"/>
-                  <a:sym typeface="Meslo LG M for Powerline"/>
+                  <a:latin typeface="Meslo LG M Regular for Powerline"/>
+                  <a:ea typeface="Meslo LG M Regular for Powerline"/>
+                  <a:cs typeface="Meslo LG M Regular for Powerline"/>
+                  <a:sym typeface="Meslo LG M Regular for Powerline"/>
                 </a:defRPr>
               </a:pPr>
               <a:r>
@@ -14312,15 +15859,130 @@
                       <a:lumOff val="24313"/>
                     </a:schemeClr>
                   </a:solidFill>
-                  <a:latin typeface="Meslo LG M for Powerline"/>
-                  <a:ea typeface="Meslo LG M for Powerline"/>
-                  <a:cs typeface="Meslo LG M for Powerline"/>
-                  <a:sym typeface="Meslo LG M for Powerline"/>
+                  <a:latin typeface="Meslo LG M Regular for Powerline"/>
+                  <a:ea typeface="Meslo LG M Regular for Powerline"/>
+                  <a:cs typeface="Meslo LG M Regular for Powerline"/>
+                  <a:sym typeface="Meslo LG M Regular for Powerline"/>
                 </a:defRPr>
               </a:pPr>
               <a:r>
                 <a:t>}</a:t>
               </a:r>
+            </a:p>
+          </p:txBody>
+        </p:sp>
+      </p:grpSp>
+      <p:grpSp>
+        <p:nvGrpSpPr>
+          <p:cNvPr id="290" name="Group"/>
+          <p:cNvGrpSpPr/>
+          <p:nvPr/>
+        </p:nvGrpSpPr>
+        <p:grpSpPr>
+          <a:xfrm>
+            <a:off x="1270000" y="4023403"/>
+            <a:ext cx="1814539" cy="1429593"/>
+            <a:chOff x="0" y="413495"/>
+            <a:chExt cx="1814538" cy="1429591"/>
+          </a:xfrm>
+        </p:grpSpPr>
+        <p:sp>
+          <p:nvSpPr>
+            <p:cNvPr id="288" name="idsFlag"/>
+            <p:cNvSpPr/>
+            <p:nvPr/>
+          </p:nvSpPr>
+          <p:spPr>
+            <a:xfrm>
+              <a:off x="544538" y="573087"/>
+              <a:ext cx="1270001" cy="1270001"/>
+            </a:xfrm>
+            <a:prstGeom prst="line">
+              <a:avLst/>
+            </a:prstGeom>
+            <a:noFill/>
+            <a:ln w="12700" cap="flat">
+              <a:noFill/>
+              <a:miter lim="400000"/>
+            </a:ln>
+            <a:effectLst/>
+            <a:extLst>
+              <a:ext uri="{C572A759-6A51-4108-AA02-DFA0A04FC94B}">
+                <ma14:wrappingTextBoxFlag xmlns:ma14="http://schemas.microsoft.com/office/mac/drawingml/2011/main" val="1"/>
+              </a:ext>
+            </a:extLst>
+          </p:spPr>
+          <p:txBody>
+            <a:bodyPr wrap="none" lIns="71437" tIns="71437" rIns="71437" bIns="71437" numCol="1" anchor="ctr">
+              <a:spAutoFit/>
+            </a:bodyPr>
+            <a:lstStyle>
+              <a:lvl1pPr>
+                <a:defRPr b="1" sz="5800">
+                  <a:solidFill>
+                    <a:srgbClr val="FFFFFF"/>
+                  </a:solidFill>
+                  <a:latin typeface="Avenir Next Regular"/>
+                  <a:ea typeface="Avenir Next Regular"/>
+                  <a:cs typeface="Avenir Next Regular"/>
+                  <a:sym typeface="Avenir Next Regular"/>
+                </a:defRPr>
+              </a:lvl1pPr>
+            </a:lstStyle>
+            <a:p>
+              <a:pPr/>
+              <a:r>
+                <a:t>idsFlag</a:t>
+              </a:r>
+            </a:p>
+          </p:txBody>
+        </p:sp>
+        <p:sp>
+          <p:nvSpPr>
+            <p:cNvPr id="289" name="Square"/>
+            <p:cNvSpPr/>
+            <p:nvPr/>
+          </p:nvSpPr>
+          <p:spPr>
+            <a:xfrm>
+              <a:off x="0" y="413495"/>
+              <a:ext cx="319184" cy="319185"/>
+            </a:xfrm>
+            <a:prstGeom prst="rect">
+              <a:avLst/>
+            </a:prstGeom>
+            <a:solidFill>
+              <a:srgbClr val="9C27B0"/>
+            </a:solidFill>
+            <a:ln w="12700" cap="flat">
+              <a:noFill/>
+              <a:miter lim="400000"/>
+            </a:ln>
+            <a:effectLst/>
+          </p:spPr>
+          <p:txBody>
+            <a:bodyPr wrap="square" lIns="71437" tIns="71437" rIns="71437" bIns="71437" numCol="1" anchor="ctr">
+              <a:noAutofit/>
+            </a:bodyPr>
+            <a:lstStyle/>
+            <a:p>
+              <a:pPr algn="ctr">
+                <a:lnSpc>
+                  <a:spcPct val="80000"/>
+                </a:lnSpc>
+                <a:spcBef>
+                  <a:spcPts val="0"/>
+                </a:spcBef>
+                <a:defRPr cap="all" sz="3800">
+                  <a:solidFill>
+                    <a:srgbClr val="FFFFFF"/>
+                  </a:solidFill>
+                  <a:latin typeface="+mn-lt"/>
+                  <a:ea typeface="+mn-ea"/>
+                  <a:cs typeface="+mn-cs"/>
+                  <a:sym typeface="DIN Condensed Bold"/>
+                </a:defRPr>
+              </a:pPr>
             </a:p>
           </p:txBody>
         </p:sp>
@@ -14514,14 +16176,14 @@
     </a:clrScheme>
     <a:fontScheme name="New_Template7">
       <a:majorFont>
-        <a:latin typeface="DIN Condensed"/>
-        <a:ea typeface="DIN Condensed"/>
-        <a:cs typeface="DIN Condensed"/>
+        <a:latin typeface="DIN Condensed Bold"/>
+        <a:ea typeface="DIN Condensed Bold"/>
+        <a:cs typeface="DIN Condensed Bold"/>
       </a:majorFont>
       <a:minorFont>
-        <a:latin typeface="DIN Condensed"/>
-        <a:ea typeface="DIN Condensed"/>
-        <a:cs typeface="DIN Condensed"/>
+        <a:latin typeface="DIN Condensed Bold"/>
+        <a:ea typeface="DIN Condensed Bold"/>
+        <a:cs typeface="DIN Condensed Bold"/>
       </a:minorFont>
     </a:fontScheme>
     <a:fmtScheme name="New_Template7">
@@ -14702,7 +16364,7 @@
             <a:latin typeface="+mn-lt"/>
             <a:ea typeface="+mn-ea"/>
             <a:cs typeface="+mn-cs"/>
-            <a:sym typeface="DIN Condensed"/>
+            <a:sym typeface="DIN Condensed Bold"/>
           </a:defRPr>
         </a:defPPr>
         <a:lvl1pPr marL="0" marR="0" indent="0" algn="l" defTabSz="914400" rtl="0" fontAlgn="auto" latinLnBrk="1" hangingPunct="0">
@@ -15565,14 +17227,14 @@
     </a:clrScheme>
     <a:fontScheme name="New_Template7">
       <a:majorFont>
-        <a:latin typeface="DIN Condensed"/>
-        <a:ea typeface="DIN Condensed"/>
-        <a:cs typeface="DIN Condensed"/>
+        <a:latin typeface="DIN Condensed Bold"/>
+        <a:ea typeface="DIN Condensed Bold"/>
+        <a:cs typeface="DIN Condensed Bold"/>
       </a:majorFont>
       <a:minorFont>
-        <a:latin typeface="DIN Condensed"/>
-        <a:ea typeface="DIN Condensed"/>
-        <a:cs typeface="DIN Condensed"/>
+        <a:latin typeface="DIN Condensed Bold"/>
+        <a:ea typeface="DIN Condensed Bold"/>
+        <a:cs typeface="DIN Condensed Bold"/>
       </a:minorFont>
     </a:fontScheme>
     <a:fmtScheme name="New_Template7">
@@ -15753,7 +17415,7 @@
             <a:latin typeface="+mn-lt"/>
             <a:ea typeface="+mn-ea"/>
             <a:cs typeface="+mn-cs"/>
-            <a:sym typeface="DIN Condensed"/>
+            <a:sym typeface="DIN Condensed Bold"/>
           </a:defRPr>
         </a:defPPr>
         <a:lvl1pPr marL="0" marR="0" indent="0" algn="l" defTabSz="914400" rtl="0" fontAlgn="auto" latinLnBrk="1" hangingPunct="0">

</xml_diff>

<commit_message>
add one more open closed point to slides
</commit_message>
<xml_diff>
--- a/slides/client/Switch.pptx
+++ b/slides/client/Switch.pptx
@@ -5912,6 +5912,130 @@
           </p:txBody>
         </p:sp>
       </p:grpSp>
+      <p:grpSp>
+        <p:nvGrpSpPr>
+          <p:cNvPr id="305" name="Group"/>
+          <p:cNvGrpSpPr/>
+          <p:nvPr/>
+        </p:nvGrpSpPr>
+        <p:grpSpPr>
+          <a:xfrm>
+            <a:off x="1269999" y="9635418"/>
+            <a:ext cx="1800130" cy="1429592"/>
+            <a:chOff x="0" y="413495"/>
+            <a:chExt cx="1800128" cy="1429591"/>
+          </a:xfrm>
+        </p:grpSpPr>
+        <p:sp>
+          <p:nvSpPr>
+            <p:cNvPr id="303" name="1 file per command"/>
+            <p:cNvSpPr/>
+            <p:nvPr/>
+          </p:nvSpPr>
+          <p:spPr>
+            <a:xfrm>
+              <a:off x="530128" y="573087"/>
+              <a:ext cx="1270001" cy="1270001"/>
+            </a:xfrm>
+            <a:prstGeom prst="line">
+              <a:avLst/>
+            </a:prstGeom>
+            <a:noFill/>
+            <a:ln w="12700" cap="flat">
+              <a:noFill/>
+              <a:miter lim="400000"/>
+            </a:ln>
+            <a:effectLst/>
+            <a:extLst>
+              <a:ext uri="{C572A759-6A51-4108-AA02-DFA0A04FC94B}">
+                <ma14:wrappingTextBoxFlag xmlns:ma14="http://schemas.microsoft.com/office/mac/drawingml/2011/main" val="1"/>
+              </a:ext>
+            </a:extLst>
+          </p:spPr>
+          <p:txBody>
+            <a:bodyPr wrap="none" lIns="71437" tIns="71437" rIns="71437" bIns="71437" numCol="1" anchor="ctr">
+              <a:spAutoFit/>
+            </a:bodyPr>
+            <a:lstStyle/>
+            <a:p>
+              <a:pPr>
+                <a:defRPr sz="5800">
+                  <a:solidFill>
+                    <a:srgbClr val="FFFFFF"/>
+                  </a:solidFill>
+                  <a:latin typeface="Avenir Next Regular"/>
+                  <a:ea typeface="Avenir Next Regular"/>
+                  <a:cs typeface="Avenir Next Regular"/>
+                  <a:sym typeface="Avenir Next Regular"/>
+                </a:defRPr>
+              </a:pPr>
+              <a:r>
+                <a:t>1 </a:t>
+              </a:r>
+              <a:r>
+                <a:rPr b="1"/>
+                <a:t>file</a:t>
+              </a:r>
+              <a:r>
+                <a:t> per </a:t>
+              </a:r>
+              <a:r>
+                <a:rPr b="1"/>
+                <a:t>command</a:t>
+              </a:r>
+            </a:p>
+          </p:txBody>
+        </p:sp>
+        <p:sp>
+          <p:nvSpPr>
+            <p:cNvPr id="304" name="Square"/>
+            <p:cNvSpPr/>
+            <p:nvPr/>
+          </p:nvSpPr>
+          <p:spPr>
+            <a:xfrm>
+              <a:off x="0" y="413495"/>
+              <a:ext cx="319184" cy="319185"/>
+            </a:xfrm>
+            <a:prstGeom prst="rect">
+              <a:avLst/>
+            </a:prstGeom>
+            <a:solidFill>
+              <a:srgbClr val="9C27B0"/>
+            </a:solidFill>
+            <a:ln w="12700" cap="flat">
+              <a:noFill/>
+              <a:miter lim="400000"/>
+            </a:ln>
+            <a:effectLst/>
+          </p:spPr>
+          <p:txBody>
+            <a:bodyPr wrap="square" lIns="71437" tIns="71437" rIns="71437" bIns="71437" numCol="1" anchor="ctr">
+              <a:noAutofit/>
+            </a:bodyPr>
+            <a:lstStyle/>
+            <a:p>
+              <a:pPr algn="ctr">
+                <a:lnSpc>
+                  <a:spcPct val="80000"/>
+                </a:lnSpc>
+                <a:spcBef>
+                  <a:spcPts val="0"/>
+                </a:spcBef>
+                <a:defRPr cap="all" sz="3800">
+                  <a:solidFill>
+                    <a:srgbClr val="FFFFFF"/>
+                  </a:solidFill>
+                  <a:latin typeface="+mn-lt"/>
+                  <a:ea typeface="+mn-ea"/>
+                  <a:cs typeface="+mn-cs"/>
+                  <a:sym typeface="DIN Condensed Bold"/>
+                </a:defRPr>
+              </a:pPr>
+            </a:p>
+          </p:txBody>
+        </p:sp>
+      </p:grpSp>
     </p:spTree>
   </p:cSld>
   <p:clrMapOvr>
@@ -6189,6 +6313,87 @@
                             </p:childTnLst>
                           </p:cTn>
                         </p:par>
+                        <p:par>
+                          <p:cTn id="19" fill="hold">
+                            <p:stCondLst>
+                              <p:cond delay="1800"/>
+                            </p:stCondLst>
+                            <p:childTnLst>
+                              <p:par>
+                                <p:cTn id="20" presetClass="entr" nodeType="afterEffect" presetSubtype="8" presetID="2" grpId="4" fill="hold">
+                                  <p:stCondLst>
+                                    <p:cond delay="0"/>
+                                  </p:stCondLst>
+                                  <p:iterate type="el" backwards="0">
+                                    <p:tmAbs val="0"/>
+                                  </p:iterate>
+                                  <p:childTnLst>
+                                    <p:set>
+                                      <p:cBhvr>
+                                        <p:cTn id="21" fill="hold"/>
+                                        <p:tgtEl>
+                                          <p:spTgt spid="305"/>
+                                        </p:tgtEl>
+                                        <p:attrNameLst>
+                                          <p:attrName>style.visibility</p:attrName>
+                                        </p:attrNameLst>
+                                      </p:cBhvr>
+                                      <p:to>
+                                        <p:strVal val="visible"/>
+                                      </p:to>
+                                    </p:set>
+                                    <p:anim calcmode="lin" valueType="num">
+                                      <p:cBhvr>
+                                        <p:cTn id="22" dur="600" fill="hold"/>
+                                        <p:tgtEl>
+                                          <p:spTgt spid="305"/>
+                                        </p:tgtEl>
+                                        <p:attrNameLst>
+                                          <p:attrName>ppt_x</p:attrName>
+                                        </p:attrNameLst>
+                                      </p:cBhvr>
+                                      <p:tavLst>
+                                        <p:tav tm="0">
+                                          <p:val>
+                                            <p:strVal val="0-#ppt_w/2"/>
+                                          </p:val>
+                                        </p:tav>
+                                        <p:tav tm="100000">
+                                          <p:val>
+                                            <p:strVal val="#ppt_x"/>
+                                          </p:val>
+                                        </p:tav>
+                                      </p:tavLst>
+                                    </p:anim>
+                                    <p:anim calcmode="lin" valueType="num">
+                                      <p:cBhvr>
+                                        <p:cTn id="23" dur="600" fill="hold"/>
+                                        <p:tgtEl>
+                                          <p:spTgt spid="305"/>
+                                        </p:tgtEl>
+                                        <p:attrNameLst>
+                                          <p:attrName>ppt_y</p:attrName>
+                                        </p:attrNameLst>
+                                      </p:cBhvr>
+                                      <p:tavLst>
+                                        <p:tav tm="0">
+                                          <p:val>
+                                            <p:strVal val="#ppt_y"/>
+                                          </p:val>
+                                        </p:tav>
+                                        <p:tav tm="100000">
+                                          <p:val>
+                                            <p:strVal val="#ppt_y"/>
+                                          </p:val>
+                                        </p:tav>
+                                      </p:tavLst>
+                                    </p:anim>
+                                  </p:childTnLst>
+                                </p:cTn>
+                              </p:par>
+                            </p:childTnLst>
+                          </p:cTn>
+                        </p:par>
                       </p:childTnLst>
                     </p:cTn>
                   </p:par>
@@ -6214,9 +6419,10 @@
       </p:par>
     </p:tnLst>
     <p:bldLst>
+      <p:bldP build="whole" bldLvl="1" animBg="1" rev="0" advAuto="0" spid="296" grpId="1"/>
       <p:bldP build="whole" bldLvl="1" animBg="1" rev="0" advAuto="0" spid="299" grpId="2"/>
       <p:bldP build="whole" bldLvl="1" animBg="1" rev="0" advAuto="0" spid="302" grpId="3"/>
-      <p:bldP build="whole" bldLvl="1" animBg="1" rev="0" advAuto="0" spid="296" grpId="1"/>
+      <p:bldP build="whole" bldLvl="1" animBg="1" rev="0" advAuto="0" spid="305" grpId="4"/>
     </p:bldLst>
   </p:timing>
 </p:sld>
@@ -6248,7 +6454,7 @@
       </p:grpSpPr>
       <p:sp>
         <p:nvSpPr>
-          <p:cNvPr id="304" name="Title 6"/>
+          <p:cNvPr id="307" name="Title 6"/>
           <p:cNvSpPr txBox="1"/>
           <p:nvPr>
             <p:ph type="title"/>
@@ -6284,7 +6490,7 @@
       </p:sp>
       <p:pic>
         <p:nvPicPr>
-          <p:cNvPr id="305" name="stopwatch (2).png" descr="stopwatch (2).png"/>
+          <p:cNvPr id="308" name="stopwatch (2).png" descr="stopwatch (2).png"/>
           <p:cNvPicPr>
             <a:picLocks noChangeAspect="1"/>
           </p:cNvPicPr>
@@ -6313,7 +6519,7 @@
       </p:pic>
       <p:grpSp>
         <p:nvGrpSpPr>
-          <p:cNvPr id="308" name="Group"/>
+          <p:cNvPr id="311" name="Group"/>
           <p:cNvGrpSpPr/>
           <p:nvPr/>
         </p:nvGrpSpPr>
@@ -6327,7 +6533,7 @@
         </p:grpSpPr>
         <p:sp>
           <p:nvSpPr>
-            <p:cNvPr id="306" name="map commands to functions in 1 place"/>
+            <p:cNvPr id="309" name="map commands to functions in 1 place"/>
             <p:cNvSpPr txBox="1"/>
             <p:nvPr/>
           </p:nvSpPr>
@@ -6394,7 +6600,7 @@
         </p:sp>
         <p:sp>
           <p:nvSpPr>
-            <p:cNvPr id="307" name="Square"/>
+            <p:cNvPr id="310" name="Square"/>
             <p:cNvSpPr/>
             <p:nvPr/>
           </p:nvSpPr>
@@ -6444,7 +6650,7 @@
       </p:grpSp>
       <p:grpSp>
         <p:nvGrpSpPr>
-          <p:cNvPr id="311" name="Group"/>
+          <p:cNvPr id="314" name="Group"/>
           <p:cNvGrpSpPr/>
           <p:nvPr/>
         </p:nvGrpSpPr>
@@ -6458,7 +6664,7 @@
         </p:grpSpPr>
         <p:sp>
           <p:nvSpPr>
-            <p:cNvPr id="309" name="command switch that loops over the declared commands"/>
+            <p:cNvPr id="312" name="command switch that loops over the declared commands"/>
             <p:cNvSpPr txBox="1"/>
             <p:nvPr/>
           </p:nvSpPr>
@@ -6525,7 +6731,7 @@
         </p:sp>
         <p:sp>
           <p:nvSpPr>
-            <p:cNvPr id="310" name="Square"/>
+            <p:cNvPr id="313" name="Square"/>
             <p:cNvSpPr/>
             <p:nvPr/>
           </p:nvSpPr>
@@ -6575,7 +6781,7 @@
       </p:grpSp>
       <p:grpSp>
         <p:nvGrpSpPr>
-          <p:cNvPr id="314" name="Group"/>
+          <p:cNvPr id="317" name="Group"/>
           <p:cNvGrpSpPr/>
           <p:nvPr/>
         </p:nvGrpSpPr>
@@ -6589,7 +6795,7 @@
         </p:grpSpPr>
         <p:sp>
           <p:nvSpPr>
-            <p:cNvPr id="312" name="create each command as an individual function"/>
+            <p:cNvPr id="315" name="create each command as an individual function"/>
             <p:cNvSpPr txBox="1"/>
             <p:nvPr/>
           </p:nvSpPr>
@@ -6649,7 +6855,7 @@
         </p:sp>
         <p:sp>
           <p:nvSpPr>
-            <p:cNvPr id="313" name="Square"/>
+            <p:cNvPr id="316" name="Square"/>
             <p:cNvSpPr/>
             <p:nvPr/>
           </p:nvSpPr>
@@ -6750,7 +6956,7 @@
                                       <p:cBhvr>
                                         <p:cTn id="6" fill="hold"/>
                                         <p:tgtEl>
-                                          <p:spTgt spid="308"/>
+                                          <p:spTgt spid="311"/>
                                         </p:tgtEl>
                                         <p:attrNameLst>
                                           <p:attrName>style.visibility</p:attrName>
@@ -6764,7 +6970,7 @@
                                       <p:cBhvr>
                                         <p:cTn id="7" dur="600" fill="hold"/>
                                         <p:tgtEl>
-                                          <p:spTgt spid="308"/>
+                                          <p:spTgt spid="311"/>
                                         </p:tgtEl>
                                         <p:attrNameLst>
                                           <p:attrName>ppt_x</p:attrName>
@@ -6787,7 +6993,7 @@
                                       <p:cBhvr>
                                         <p:cTn id="8" dur="600" fill="hold"/>
                                         <p:tgtEl>
-                                          <p:spTgt spid="308"/>
+                                          <p:spTgt spid="311"/>
                                         </p:tgtEl>
                                         <p:attrNameLst>
                                           <p:attrName>ppt_y</p:attrName>
@@ -6831,7 +7037,7 @@
                                       <p:cBhvr>
                                         <p:cTn id="11" fill="hold"/>
                                         <p:tgtEl>
-                                          <p:spTgt spid="311"/>
+                                          <p:spTgt spid="314"/>
                                         </p:tgtEl>
                                         <p:attrNameLst>
                                           <p:attrName>style.visibility</p:attrName>
@@ -6845,7 +7051,7 @@
                                       <p:cBhvr>
                                         <p:cTn id="12" dur="600" fill="hold"/>
                                         <p:tgtEl>
-                                          <p:spTgt spid="311"/>
+                                          <p:spTgt spid="314"/>
                                         </p:tgtEl>
                                         <p:attrNameLst>
                                           <p:attrName>ppt_x</p:attrName>
@@ -6868,7 +7074,7 @@
                                       <p:cBhvr>
                                         <p:cTn id="13" dur="600" fill="hold"/>
                                         <p:tgtEl>
-                                          <p:spTgt spid="311"/>
+                                          <p:spTgt spid="314"/>
                                         </p:tgtEl>
                                         <p:attrNameLst>
                                           <p:attrName>ppt_y</p:attrName>
@@ -6912,7 +7118,7 @@
                                       <p:cBhvr>
                                         <p:cTn id="16" fill="hold"/>
                                         <p:tgtEl>
-                                          <p:spTgt spid="314"/>
+                                          <p:spTgt spid="317"/>
                                         </p:tgtEl>
                                         <p:attrNameLst>
                                           <p:attrName>style.visibility</p:attrName>
@@ -6926,7 +7132,7 @@
                                       <p:cBhvr>
                                         <p:cTn id="17" dur="600" fill="hold"/>
                                         <p:tgtEl>
-                                          <p:spTgt spid="314"/>
+                                          <p:spTgt spid="317"/>
                                         </p:tgtEl>
                                         <p:attrNameLst>
                                           <p:attrName>ppt_x</p:attrName>
@@ -6949,7 +7155,7 @@
                                       <p:cBhvr>
                                         <p:cTn id="18" dur="600" fill="hold"/>
                                         <p:tgtEl>
-                                          <p:spTgt spid="314"/>
+                                          <p:spTgt spid="317"/>
                                         </p:tgtEl>
                                         <p:attrNameLst>
                                           <p:attrName>ppt_y</p:attrName>
@@ -6999,9 +7205,9 @@
       </p:par>
     </p:tnLst>
     <p:bldLst>
-      <p:bldP build="whole" bldLvl="1" animBg="1" rev="0" advAuto="0" spid="314" grpId="3"/>
-      <p:bldP build="whole" bldLvl="1" animBg="1" rev="0" advAuto="0" spid="308" grpId="1"/>
-      <p:bldP build="whole" bldLvl="1" animBg="1" rev="0" advAuto="0" spid="311" grpId="2"/>
+      <p:bldP build="whole" bldLvl="1" animBg="1" rev="0" advAuto="0" spid="317" grpId="3"/>
+      <p:bldP build="whole" bldLvl="1" animBg="1" rev="0" advAuto="0" spid="311" grpId="1"/>
+      <p:bldP build="whole" bldLvl="1" animBg="1" rev="0" advAuto="0" spid="314" grpId="2"/>
     </p:bldLst>
   </p:timing>
 </p:sld>
@@ -7033,7 +7239,7 @@
       </p:grpSpPr>
       <p:sp>
         <p:nvSpPr>
-          <p:cNvPr id="316" name="Title 6"/>
+          <p:cNvPr id="319" name="Title 6"/>
           <p:cNvSpPr txBox="1"/>
           <p:nvPr>
             <p:ph type="title"/>
@@ -7069,7 +7275,7 @@
       </p:sp>
       <p:pic>
         <p:nvPicPr>
-          <p:cNvPr id="317" name="stopwatch (2).png" descr="stopwatch (2).png"/>
+          <p:cNvPr id="320" name="stopwatch (2).png" descr="stopwatch (2).png"/>
           <p:cNvPicPr>
             <a:picLocks noChangeAspect="1"/>
           </p:cNvPicPr>
@@ -7098,7 +7304,7 @@
       </p:pic>
       <p:grpSp>
         <p:nvGrpSpPr>
-          <p:cNvPr id="320" name="Group"/>
+          <p:cNvPr id="323" name="Group"/>
           <p:cNvGrpSpPr/>
           <p:nvPr/>
         </p:nvGrpSpPr>
@@ -7112,7 +7318,7 @@
         </p:grpSpPr>
         <p:sp>
           <p:nvSpPr>
-            <p:cNvPr id="318" name="Rounded Rectangle"/>
+            <p:cNvPr id="321" name="Rounded Rectangle"/>
             <p:cNvSpPr/>
             <p:nvPr/>
           </p:nvSpPr>
@@ -7169,7 +7375,7 @@
         </p:sp>
         <p:sp>
           <p:nvSpPr>
-            <p:cNvPr id="319" name="{…"/>
+            <p:cNvPr id="322" name="{…"/>
             <p:cNvSpPr txBox="1"/>
             <p:nvPr/>
           </p:nvSpPr>
@@ -7819,7 +8025,7 @@
                                       <p:cBhvr>
                                         <p:cTn id="6" fill="hold"/>
                                         <p:tgtEl>
-                                          <p:spTgt spid="320"/>
+                                          <p:spTgt spid="323"/>
                                         </p:tgtEl>
                                         <p:attrNameLst>
                                           <p:attrName>style.visibility</p:attrName>
@@ -7833,7 +8039,7 @@
                                       <p:cBhvr>
                                         <p:cTn id="7" dur="700" fill="hold"/>
                                         <p:tgtEl>
-                                          <p:spTgt spid="320"/>
+                                          <p:spTgt spid="323"/>
                                         </p:tgtEl>
                                         <p:attrNameLst>
                                           <p:attrName>ppt_x</p:attrName>
@@ -7856,7 +8062,7 @@
                                       <p:cBhvr>
                                         <p:cTn id="8" dur="700" fill="hold"/>
                                         <p:tgtEl>
-                                          <p:spTgt spid="320"/>
+                                          <p:spTgt spid="323"/>
                                         </p:tgtEl>
                                         <p:attrNameLst>
                                           <p:attrName>ppt_y</p:attrName>
@@ -7906,7 +8112,7 @@
       </p:par>
     </p:tnLst>
     <p:bldLst>
-      <p:bldP build="whole" bldLvl="1" animBg="1" rev="0" advAuto="0" spid="320" grpId="1"/>
+      <p:bldP build="whole" bldLvl="1" animBg="1" rev="0" advAuto="0" spid="323" grpId="1"/>
     </p:bldLst>
   </p:timing>
 </p:sld>
@@ -9933,19 +10139,19 @@
       </p:par>
     </p:tnLst>
     <p:bldLst>
+      <p:bldP build="whole" bldLvl="1" animBg="1" rev="0" advAuto="0" spid="212" grpId="12"/>
+      <p:bldP build="whole" bldLvl="1" animBg="1" rev="0" advAuto="0" spid="223" grpId="7"/>
+      <p:bldP build="whole" bldLvl="1" animBg="1" rev="0" advAuto="0" spid="193" grpId="1"/>
+      <p:bldP build="whole" bldLvl="1" animBg="1" rev="0" advAuto="0" spid="209" grpId="13"/>
+      <p:bldP build="whole" bldLvl="1" animBg="1" rev="0" advAuto="0" spid="196" grpId="5"/>
+      <p:bldP build="whole" bldLvl="1" animBg="1" rev="0" advAuto="0" spid="219" grpId="8"/>
+      <p:bldP build="whole" bldLvl="1" animBg="1" rev="0" advAuto="0" spid="202" grpId="11"/>
+      <p:bldP build="whole" bldLvl="1" animBg="1" rev="0" advAuto="0" spid="217" grpId="6"/>
+      <p:bldP build="whole" bldLvl="1" animBg="1" rev="0" advAuto="0" spid="199" grpId="3"/>
+      <p:bldP build="whole" bldLvl="1" animBg="1" rev="0" advAuto="0" spid="210" grpId="2"/>
+      <p:bldP build="whole" bldLvl="1" animBg="1" rev="0" advAuto="0" spid="205" grpId="10"/>
       <p:bldP build="whole" bldLvl="1" animBg="1" rev="0" advAuto="0" spid="216" grpId="9"/>
-      <p:bldP build="whole" bldLvl="1" animBg="1" rev="0" advAuto="0" spid="202" grpId="11"/>
       <p:bldP build="whole" bldLvl="1" animBg="1" rev="0" advAuto="0" spid="203" grpId="4"/>
-      <p:bldP build="whole" bldLvl="1" animBg="1" rev="0" advAuto="0" spid="196" grpId="5"/>
-      <p:bldP build="whole" bldLvl="1" animBg="1" rev="0" advAuto="0" spid="210" grpId="2"/>
-      <p:bldP build="whole" bldLvl="1" animBg="1" rev="0" advAuto="0" spid="193" grpId="1"/>
-      <p:bldP build="whole" bldLvl="1" animBg="1" rev="0" advAuto="0" spid="217" grpId="6"/>
-      <p:bldP build="whole" bldLvl="1" animBg="1" rev="0" advAuto="0" spid="205" grpId="10"/>
-      <p:bldP build="whole" bldLvl="1" animBg="1" rev="0" advAuto="0" spid="223" grpId="7"/>
-      <p:bldP build="whole" bldLvl="1" animBg="1" rev="0" advAuto="0" spid="209" grpId="13"/>
-      <p:bldP build="whole" bldLvl="1" animBg="1" rev="0" advAuto="0" spid="212" grpId="12"/>
-      <p:bldP build="whole" bldLvl="1" animBg="1" rev="0" advAuto="0" spid="199" grpId="3"/>
-      <p:bldP build="whole" bldLvl="1" animBg="1" rev="0" advAuto="0" spid="219" grpId="8"/>
     </p:bldLst>
   </p:timing>
 </p:sld>
@@ -11229,16 +11435,16 @@
       </p:par>
     </p:tnLst>
     <p:bldLst>
-      <p:bldP build="whole" bldLvl="1" animBg="1" rev="0" advAuto="0" spid="233" grpId="6"/>
-      <p:bldP build="whole" bldLvl="1" animBg="1" rev="0" advAuto="0" spid="229" grpId="5"/>
-      <p:bldP build="whole" bldLvl="1" animBg="1" rev="0" advAuto="0" spid="236" grpId="10"/>
       <p:bldP build="whole" bldLvl="1" animBg="1" rev="0" advAuto="0" spid="231" grpId="2"/>
       <p:bldP build="whole" bldLvl="1" animBg="1" rev="0" advAuto="0" spid="234" grpId="8"/>
+      <p:bldP build="whole" bldLvl="1" animBg="1" rev="0" advAuto="0" spid="227" grpId="1"/>
+      <p:bldP build="whole" bldLvl="1" animBg="1" rev="0" advAuto="0" spid="232" grpId="4"/>
+      <p:bldP build="whole" bldLvl="1" animBg="1" rev="0" advAuto="0" spid="229" grpId="5"/>
+      <p:bldP build="whole" bldLvl="1" animBg="1" rev="0" advAuto="0" spid="228" grpId="3"/>
+      <p:bldP build="whole" bldLvl="1" animBg="1" rev="0" advAuto="0" spid="235" grpId="9"/>
+      <p:bldP build="whole" bldLvl="1" animBg="1" rev="0" advAuto="0" spid="236" grpId="10"/>
+      <p:bldP build="whole" bldLvl="1" animBg="1" rev="0" advAuto="0" spid="233" grpId="6"/>
       <p:bldP build="whole" bldLvl="1" animBg="1" rev="0" advAuto="0" spid="230" grpId="7"/>
-      <p:bldP build="whole" bldLvl="1" animBg="1" rev="0" advAuto="0" spid="227" grpId="1"/>
-      <p:bldP build="whole" bldLvl="1" animBg="1" rev="0" advAuto="0" spid="235" grpId="9"/>
-      <p:bldP build="whole" bldLvl="1" animBg="1" rev="0" advAuto="0" spid="232" grpId="4"/>
-      <p:bldP build="whole" bldLvl="1" animBg="1" rev="0" advAuto="0" spid="228" grpId="3"/>
     </p:bldLst>
   </p:timing>
 </p:sld>
@@ -12304,14 +12510,14 @@
       </p:par>
     </p:tnLst>
     <p:bldLst>
+      <p:bldP build="whole" bldLvl="1" animBg="1" rev="0" advAuto="0" spid="240" grpId="1"/>
+      <p:bldP build="whole" bldLvl="1" animBg="1" rev="0" advAuto="0" spid="242" grpId="3"/>
+      <p:bldP build="whole" bldLvl="1" animBg="1" rev="0" advAuto="0" spid="241" grpId="2"/>
+      <p:bldP build="whole" bldLvl="1" animBg="1" rev="0" advAuto="0" spid="244" grpId="7"/>
+      <p:bldP build="whole" bldLvl="1" animBg="1" rev="0" advAuto="0" spid="247" grpId="8"/>
       <p:bldP build="whole" bldLvl="1" animBg="1" rev="0" advAuto="0" spid="245" grpId="4"/>
       <p:bldP build="whole" bldLvl="1" animBg="1" rev="0" advAuto="0" spid="243" grpId="5"/>
       <p:bldP build="whole" bldLvl="1" animBg="1" rev="0" advAuto="0" spid="246" grpId="6"/>
-      <p:bldP build="whole" bldLvl="1" animBg="1" rev="0" advAuto="0" spid="244" grpId="7"/>
-      <p:bldP build="whole" bldLvl="1" animBg="1" rev="0" advAuto="0" spid="241" grpId="2"/>
-      <p:bldP build="whole" bldLvl="1" animBg="1" rev="0" advAuto="0" spid="247" grpId="8"/>
-      <p:bldP build="whole" bldLvl="1" animBg="1" rev="0" advAuto="0" spid="240" grpId="1"/>
-      <p:bldP build="whole" bldLvl="1" animBg="1" rev="0" advAuto="0" spid="242" grpId="3"/>
     </p:bldLst>
   </p:timing>
 </p:sld>
@@ -13607,16 +13813,16 @@
       </p:par>
     </p:tnLst>
     <p:bldLst>
-      <p:bldP build="whole" bldLvl="1" animBg="1" rev="0" advAuto="0" spid="259" grpId="10"/>
-      <p:bldP build="whole" bldLvl="1" animBg="1" rev="0" advAuto="0" spid="252" grpId="2"/>
+      <p:bldP build="whole" bldLvl="1" animBg="1" rev="0" advAuto="0" spid="251" grpId="1"/>
+      <p:bldP build="whole" bldLvl="1" animBg="1" rev="0" advAuto="0" spid="257" grpId="6"/>
+      <p:bldP build="whole" bldLvl="1" animBg="1" rev="0" advAuto="0" spid="253" grpId="4"/>
+      <p:bldP build="whole" bldLvl="1" animBg="1" rev="0" advAuto="0" spid="256" grpId="9"/>
+      <p:bldP build="whole" bldLvl="1" animBg="1" rev="0" advAuto="0" spid="254" grpId="5"/>
       <p:bldP build="whole" bldLvl="1" animBg="1" rev="0" advAuto="0" spid="258" grpId="8"/>
       <p:bldP build="whole" bldLvl="1" animBg="1" rev="0" advAuto="0" spid="260" grpId="3"/>
-      <p:bldP build="whole" bldLvl="1" animBg="1" rev="0" advAuto="0" spid="251" grpId="1"/>
-      <p:bldP build="whole" bldLvl="1" animBg="1" rev="0" advAuto="0" spid="254" grpId="5"/>
-      <p:bldP build="whole" bldLvl="1" animBg="1" rev="0" advAuto="0" spid="257" grpId="6"/>
+      <p:bldP build="whole" bldLvl="1" animBg="1" rev="0" advAuto="0" spid="252" grpId="2"/>
       <p:bldP build="whole" bldLvl="1" animBg="1" rev="0" advAuto="0" spid="255" grpId="7"/>
-      <p:bldP build="whole" bldLvl="1" animBg="1" rev="0" advAuto="0" spid="253" grpId="4"/>
-      <p:bldP build="whole" bldLvl="1" animBg="1" rev="0" advAuto="0" spid="256" grpId="9"/>
+      <p:bldP build="whole" bldLvl="1" animBg="1" rev="0" advAuto="0" spid="259" grpId="10"/>
     </p:bldLst>
   </p:timing>
 </p:sld>
@@ -14226,9 +14432,9 @@
       </p:par>
     </p:tnLst>
     <p:bldLst>
+      <p:bldP build="whole" bldLvl="1" animBg="1" rev="0" advAuto="0" spid="266" grpId="4"/>
       <p:bldP build="whole" bldLvl="1" animBg="1" rev="0" advAuto="0" spid="267" grpId="3"/>
       <p:bldP build="whole" bldLvl="1" animBg="1" rev="0" advAuto="0" spid="265" grpId="2"/>
-      <p:bldP build="whole" bldLvl="1" animBg="1" rev="0" advAuto="0" spid="266" grpId="4"/>
       <p:bldP build="whole" bldLvl="1" animBg="1" rev="0" advAuto="0" spid="264" grpId="1"/>
     </p:bldLst>
   </p:timing>
@@ -14839,10 +15045,10 @@
       </p:par>
     </p:tnLst>
     <p:bldLst>
+      <p:bldP build="whole" bldLvl="1" animBg="1" rev="0" advAuto="0" spid="273" grpId="4"/>
+      <p:bldP build="whole" bldLvl="1" animBg="1" rev="0" advAuto="0" spid="272" grpId="2"/>
       <p:bldP build="whole" bldLvl="1" animBg="1" rev="0" advAuto="0" spid="274" grpId="3"/>
-      <p:bldP build="whole" bldLvl="1" animBg="1" rev="0" advAuto="0" spid="272" grpId="2"/>
       <p:bldP build="whole" bldLvl="1" animBg="1" rev="0" advAuto="0" spid="271" grpId="1"/>
-      <p:bldP build="whole" bldLvl="1" animBg="1" rev="0" advAuto="0" spid="273" grpId="4"/>
     </p:bldLst>
   </p:timing>
 </p:sld>
@@ -15448,10 +15654,10 @@
       </p:par>
     </p:tnLst>
     <p:bldLst>
+      <p:bldP build="whole" bldLvl="1" animBg="1" rev="0" advAuto="0" spid="280" grpId="3"/>
       <p:bldP build="whole" bldLvl="1" animBg="1" rev="0" advAuto="0" spid="279" grpId="2"/>
       <p:bldP build="whole" bldLvl="1" animBg="1" rev="0" advAuto="0" spid="281" grpId="4"/>
       <p:bldP build="whole" bldLvl="1" animBg="1" rev="0" advAuto="0" spid="278" grpId="1"/>
-      <p:bldP build="whole" bldLvl="1" animBg="1" rev="0" advAuto="0" spid="280" grpId="3"/>
     </p:bldLst>
   </p:timing>
 </p:sld>

</xml_diff>